<commit_message>
Tutorial Page is okay now
</commit_message>
<xml_diff>
--- a/Resources/TutorialPage.pptx
+++ b/Resources/TutorialPage.pptx
@@ -7,6 +7,7 @@
   <p:sldIdLst>
     <p:sldId id="256" r:id="rId2"/>
     <p:sldId id="257" r:id="rId3"/>
+    <p:sldId id="258" r:id="rId4"/>
   </p:sldIdLst>
   <p:sldSz cx="12192000" cy="6858000"/>
   <p:notesSz cx="6858000" cy="9144000"/>
@@ -3324,10 +3325,10 @@
       </p:grpSpPr>
       <p:grpSp>
         <p:nvGrpSpPr>
-          <p:cNvPr id="25" name="群組 24">
-            <a:extLst>
-              <a:ext uri="{FF2B5EF4-FFF2-40B4-BE49-F238E27FC236}">
-                <a16:creationId xmlns:a16="http://schemas.microsoft.com/office/drawing/2014/main" id="{5AE34032-A9BD-4917-A5EF-ED9497CE46B8}"/>
+          <p:cNvPr id="28" name="群組 27">
+            <a:extLst>
+              <a:ext uri="{FF2B5EF4-FFF2-40B4-BE49-F238E27FC236}">
+                <a16:creationId xmlns:a16="http://schemas.microsoft.com/office/drawing/2014/main" id="{A1666211-2A01-427A-A060-13578B35EA9D}"/>
               </a:ext>
             </a:extLst>
           </p:cNvPr>
@@ -3338,16 +3339,16 @@
           <a:xfrm>
             <a:off x="506427" y="134878"/>
             <a:ext cx="11179145" cy="6723122"/>
-            <a:chOff x="506427" y="67439"/>
+            <a:chOff x="506427" y="134878"/>
             <a:chExt cx="11179145" cy="6723122"/>
           </a:xfrm>
         </p:grpSpPr>
         <p:grpSp>
           <p:nvGrpSpPr>
-            <p:cNvPr id="20" name="群組 19">
+            <p:cNvPr id="25" name="群組 24">
               <a:extLst>
                 <a:ext uri="{FF2B5EF4-FFF2-40B4-BE49-F238E27FC236}">
-                  <a16:creationId xmlns:a16="http://schemas.microsoft.com/office/drawing/2014/main" id="{DD276C2B-E68E-471C-A3D5-3D5BB3FB7FD1}"/>
+                  <a16:creationId xmlns:a16="http://schemas.microsoft.com/office/drawing/2014/main" id="{5AE34032-A9BD-4917-A5EF-ED9497CE46B8}"/>
                 </a:ext>
               </a:extLst>
             </p:cNvPr>
@@ -3356,48 +3357,699 @@
           </p:nvGrpSpPr>
           <p:grpSpPr>
             <a:xfrm>
-              <a:off x="506427" y="67439"/>
+              <a:off x="506427" y="134878"/>
               <a:ext cx="11179145" cy="6723122"/>
-              <a:chOff x="331537" y="0"/>
+              <a:chOff x="506427" y="67439"/>
               <a:chExt cx="11179145" cy="6723122"/>
             </a:xfrm>
           </p:grpSpPr>
-          <p:pic>
-            <p:nvPicPr>
-              <p:cNvPr id="14" name="圖片 13">
+          <p:grpSp>
+            <p:nvGrpSpPr>
+              <p:cNvPr id="20" name="群組 19">
                 <a:extLst>
                   <a:ext uri="{FF2B5EF4-FFF2-40B4-BE49-F238E27FC236}">
-                    <a16:creationId xmlns:a16="http://schemas.microsoft.com/office/drawing/2014/main" id="{E842A562-4F23-4DA1-A950-1EFAABCD47CB}"/>
+                    <a16:creationId xmlns:a16="http://schemas.microsoft.com/office/drawing/2014/main" id="{DD276C2B-E68E-471C-A3D5-3D5BB3FB7FD1}"/>
                   </a:ext>
                 </a:extLst>
               </p:cNvPr>
-              <p:cNvPicPr>
-                <a:picLocks noChangeAspect="1"/>
-              </p:cNvPicPr>
+              <p:cNvGrpSpPr/>
               <p:nvPr/>
-            </p:nvPicPr>
-            <p:blipFill>
-              <a:blip r:embed="rId2"/>
-              <a:stretch>
-                <a:fillRect/>
-              </a:stretch>
-            </p:blipFill>
-            <p:spPr>
+            </p:nvGrpSpPr>
+            <p:grpSpPr>
               <a:xfrm>
-                <a:off x="331537" y="0"/>
+                <a:off x="506427" y="67439"/>
                 <a:ext cx="11179145" cy="6723122"/>
+                <a:chOff x="331537" y="0"/>
+                <a:chExt cx="11179145" cy="6723122"/>
               </a:xfrm>
-              <a:prstGeom prst="rect">
-                <a:avLst/>
-              </a:prstGeom>
-            </p:spPr>
-          </p:pic>
+            </p:grpSpPr>
+            <p:pic>
+              <p:nvPicPr>
+                <p:cNvPr id="14" name="圖片 13">
+                  <a:extLst>
+                    <a:ext uri="{FF2B5EF4-FFF2-40B4-BE49-F238E27FC236}">
+                      <a16:creationId xmlns:a16="http://schemas.microsoft.com/office/drawing/2014/main" id="{E842A562-4F23-4DA1-A950-1EFAABCD47CB}"/>
+                    </a:ext>
+                  </a:extLst>
+                </p:cNvPr>
+                <p:cNvPicPr>
+                  <a:picLocks noChangeAspect="1"/>
+                </p:cNvPicPr>
+                <p:nvPr/>
+              </p:nvPicPr>
+              <p:blipFill>
+                <a:blip r:embed="rId2"/>
+                <a:stretch>
+                  <a:fillRect/>
+                </a:stretch>
+              </p:blipFill>
+              <p:spPr>
+                <a:xfrm>
+                  <a:off x="331537" y="0"/>
+                  <a:ext cx="11179145" cy="6723122"/>
+                </a:xfrm>
+                <a:prstGeom prst="rect">
+                  <a:avLst/>
+                </a:prstGeom>
+              </p:spPr>
+            </p:pic>
+            <p:sp>
+              <p:nvSpPr>
+                <p:cNvPr id="7" name="箭號: 向右 6">
+                  <a:extLst>
+                    <a:ext uri="{FF2B5EF4-FFF2-40B4-BE49-F238E27FC236}">
+                      <a16:creationId xmlns:a16="http://schemas.microsoft.com/office/drawing/2014/main" id="{15AE5A35-FC5D-4442-A8AA-5CE879322530}"/>
+                    </a:ext>
+                  </a:extLst>
+                </p:cNvPr>
+                <p:cNvSpPr/>
+                <p:nvPr/>
+              </p:nvSpPr>
+              <p:spPr>
+                <a:xfrm rot="10800000">
+                  <a:off x="4597667" y="5805579"/>
+                  <a:ext cx="754262" cy="455336"/>
+                </a:xfrm>
+                <a:prstGeom prst="rightArrow">
+                  <a:avLst/>
+                </a:prstGeom>
+                <a:solidFill>
+                  <a:srgbClr val="FF0000"/>
+                </a:solidFill>
+                <a:ln w="19050">
+                  <a:solidFill>
+                    <a:srgbClr val="C00000"/>
+                  </a:solidFill>
+                </a:ln>
+              </p:spPr>
+              <p:style>
+                <a:lnRef idx="2">
+                  <a:schemeClr val="accent1">
+                    <a:shade val="50000"/>
+                  </a:schemeClr>
+                </a:lnRef>
+                <a:fillRef idx="1">
+                  <a:schemeClr val="accent1"/>
+                </a:fillRef>
+                <a:effectRef idx="0">
+                  <a:schemeClr val="accent1"/>
+                </a:effectRef>
+                <a:fontRef idx="minor">
+                  <a:schemeClr val="lt1"/>
+                </a:fontRef>
+              </p:style>
+              <p:txBody>
+                <a:bodyPr rtlCol="0" anchor="ctr"/>
+                <a:lstStyle/>
+                <a:p>
+                  <a:pPr algn="ctr"/>
+                  <a:endParaRPr lang="zh-TW" altLang="en-US"/>
+                </a:p>
+              </p:txBody>
+            </p:sp>
+            <p:sp>
+              <p:nvSpPr>
+                <p:cNvPr id="8" name="矩形: 圓角 7">
+                  <a:extLst>
+                    <a:ext uri="{FF2B5EF4-FFF2-40B4-BE49-F238E27FC236}">
+                      <a16:creationId xmlns:a16="http://schemas.microsoft.com/office/drawing/2014/main" id="{5FF69E1B-0B32-4F36-A20F-0ED2900F7ECA}"/>
+                    </a:ext>
+                  </a:extLst>
+                </p:cNvPr>
+                <p:cNvSpPr/>
+                <p:nvPr/>
+              </p:nvSpPr>
+              <p:spPr>
+                <a:xfrm>
+                  <a:off x="1316031" y="5629835"/>
+                  <a:ext cx="2673234" cy="806824"/>
+                </a:xfrm>
+                <a:prstGeom prst="roundRect">
+                  <a:avLst>
+                    <a:gd name="adj" fmla="val 36667"/>
+                  </a:avLst>
+                </a:prstGeom>
+                <a:noFill/>
+                <a:ln w="28575">
+                  <a:solidFill>
+                    <a:srgbClr val="FF0000"/>
+                  </a:solidFill>
+                </a:ln>
+              </p:spPr>
+              <p:style>
+                <a:lnRef idx="2">
+                  <a:schemeClr val="accent1">
+                    <a:shade val="50000"/>
+                  </a:schemeClr>
+                </a:lnRef>
+                <a:fillRef idx="1">
+                  <a:schemeClr val="accent1"/>
+                </a:fillRef>
+                <a:effectRef idx="0">
+                  <a:schemeClr val="accent1"/>
+                </a:effectRef>
+                <a:fontRef idx="minor">
+                  <a:schemeClr val="lt1"/>
+                </a:fontRef>
+              </p:style>
+              <p:txBody>
+                <a:bodyPr rtlCol="0" anchor="ctr"/>
+                <a:lstStyle/>
+                <a:p>
+                  <a:pPr algn="ctr"/>
+                  <a:endParaRPr lang="zh-TW" altLang="en-US"/>
+                </a:p>
+              </p:txBody>
+            </p:sp>
+            <p:sp>
+              <p:nvSpPr>
+                <p:cNvPr id="9" name="矩形: 圓角 8">
+                  <a:extLst>
+                    <a:ext uri="{FF2B5EF4-FFF2-40B4-BE49-F238E27FC236}">
+                      <a16:creationId xmlns:a16="http://schemas.microsoft.com/office/drawing/2014/main" id="{B517B7EA-C13B-4486-8839-D1224F1BA9A6}"/>
+                    </a:ext>
+                  </a:extLst>
+                </p:cNvPr>
+                <p:cNvSpPr/>
+                <p:nvPr/>
+              </p:nvSpPr>
+              <p:spPr>
+                <a:xfrm>
+                  <a:off x="5604094" y="5589494"/>
+                  <a:ext cx="3270963" cy="887506"/>
+                </a:xfrm>
+                <a:prstGeom prst="roundRect">
+                  <a:avLst>
+                    <a:gd name="adj" fmla="val 36667"/>
+                  </a:avLst>
+                </a:prstGeom>
+                <a:noFill/>
+                <a:ln w="28575">
+                  <a:solidFill>
+                    <a:srgbClr val="FF0000"/>
+                  </a:solidFill>
+                </a:ln>
+              </p:spPr>
+              <p:style>
+                <a:lnRef idx="2">
+                  <a:schemeClr val="accent1">
+                    <a:shade val="50000"/>
+                  </a:schemeClr>
+                </a:lnRef>
+                <a:fillRef idx="1">
+                  <a:schemeClr val="accent1"/>
+                </a:fillRef>
+                <a:effectRef idx="0">
+                  <a:schemeClr val="accent1"/>
+                </a:effectRef>
+                <a:fontRef idx="minor">
+                  <a:schemeClr val="lt1"/>
+                </a:fontRef>
+              </p:style>
+              <p:txBody>
+                <a:bodyPr rtlCol="0" anchor="ctr"/>
+                <a:lstStyle/>
+                <a:p>
+                  <a:pPr algn="ctr"/>
+                  <a:r>
+                    <a:rPr lang="zh-TW" altLang="en-US" b="1" dirty="0">
+                      <a:latin typeface="標楷體" panose="03000509000000000000" pitchFamily="65" charset="-120"/>
+                      <a:ea typeface="標楷體" panose="03000509000000000000" pitchFamily="65" charset="-120"/>
+                    </a:rPr>
+                    <a:t>購買處</a:t>
+                  </a:r>
+                  <a:br>
+                    <a:rPr lang="en-US" altLang="zh-TW" b="1" dirty="0">
+                      <a:latin typeface="標楷體" panose="03000509000000000000" pitchFamily="65" charset="-120"/>
+                      <a:ea typeface="標楷體" panose="03000509000000000000" pitchFamily="65" charset="-120"/>
+                    </a:rPr>
+                  </a:br>
+                  <a:r>
+                    <a:rPr lang="zh-TW" altLang="en-US" b="1" dirty="0">
+                      <a:latin typeface="標楷體" panose="03000509000000000000" pitchFamily="65" charset="-120"/>
+                      <a:ea typeface="標楷體" panose="03000509000000000000" pitchFamily="65" charset="-120"/>
+                    </a:rPr>
+                    <a:t>上方為花費 </a:t>
+                  </a:r>
+                  <a:endParaRPr lang="en-US" altLang="zh-TW" b="1" dirty="0">
+                    <a:latin typeface="標楷體" panose="03000509000000000000" pitchFamily="65" charset="-120"/>
+                    <a:ea typeface="標楷體" panose="03000509000000000000" pitchFamily="65" charset="-120"/>
+                  </a:endParaRPr>
+                </a:p>
+                <a:p>
+                  <a:pPr algn="ctr"/>
+                  <a:r>
+                    <a:rPr lang="zh-TW" altLang="en-US" b="1" dirty="0">
+                      <a:latin typeface="標楷體" panose="03000509000000000000" pitchFamily="65" charset="-120"/>
+                      <a:ea typeface="標楷體" panose="03000509000000000000" pitchFamily="65" charset="-120"/>
+                    </a:rPr>
+                    <a:t>下方為守護者 按下即可放置</a:t>
+                  </a:r>
+                </a:p>
+              </p:txBody>
+            </p:sp>
+            <p:sp>
+              <p:nvSpPr>
+                <p:cNvPr id="11" name="矩形: 圓角 10">
+                  <a:extLst>
+                    <a:ext uri="{FF2B5EF4-FFF2-40B4-BE49-F238E27FC236}">
+                      <a16:creationId xmlns:a16="http://schemas.microsoft.com/office/drawing/2014/main" id="{7A236FCC-97B9-455F-A487-2381D170DD2D}"/>
+                    </a:ext>
+                  </a:extLst>
+                </p:cNvPr>
+                <p:cNvSpPr/>
+                <p:nvPr/>
+              </p:nvSpPr>
+              <p:spPr>
+                <a:xfrm>
+                  <a:off x="2437801" y="229531"/>
+                  <a:ext cx="1668034" cy="559363"/>
+                </a:xfrm>
+                <a:prstGeom prst="roundRect">
+                  <a:avLst>
+                    <a:gd name="adj" fmla="val 36667"/>
+                  </a:avLst>
+                </a:prstGeom>
+                <a:noFill/>
+                <a:ln w="38100">
+                  <a:solidFill>
+                    <a:schemeClr val="accent5">
+                      <a:lumMod val="75000"/>
+                    </a:schemeClr>
+                  </a:solidFill>
+                </a:ln>
+              </p:spPr>
+              <p:style>
+                <a:lnRef idx="2">
+                  <a:schemeClr val="accent1">
+                    <a:shade val="50000"/>
+                  </a:schemeClr>
+                </a:lnRef>
+                <a:fillRef idx="1">
+                  <a:schemeClr val="accent1"/>
+                </a:fillRef>
+                <a:effectRef idx="0">
+                  <a:schemeClr val="accent1"/>
+                </a:effectRef>
+                <a:fontRef idx="minor">
+                  <a:schemeClr val="lt1"/>
+                </a:fontRef>
+              </p:style>
+              <p:txBody>
+                <a:bodyPr rtlCol="0" anchor="ctr"/>
+                <a:lstStyle/>
+                <a:p>
+                  <a:pPr algn="ctr"/>
+                  <a:endParaRPr lang="zh-TW" altLang="en-US"/>
+                </a:p>
+              </p:txBody>
+            </p:sp>
+            <p:sp>
+              <p:nvSpPr>
+                <p:cNvPr id="12" name="矩形: 圓角 11">
+                  <a:extLst>
+                    <a:ext uri="{FF2B5EF4-FFF2-40B4-BE49-F238E27FC236}">
+                      <a16:creationId xmlns:a16="http://schemas.microsoft.com/office/drawing/2014/main" id="{07881E85-864D-463E-91C9-F9EFE81458EF}"/>
+                    </a:ext>
+                  </a:extLst>
+                </p:cNvPr>
+                <p:cNvSpPr/>
+                <p:nvPr/>
+              </p:nvSpPr>
+              <p:spPr>
+                <a:xfrm>
+                  <a:off x="2652648" y="941045"/>
+                  <a:ext cx="1238340" cy="376393"/>
+                </a:xfrm>
+                <a:prstGeom prst="roundRect">
+                  <a:avLst>
+                    <a:gd name="adj" fmla="val 36667"/>
+                  </a:avLst>
+                </a:prstGeom>
+                <a:noFill/>
+                <a:ln w="28575">
+                  <a:solidFill>
+                    <a:schemeClr val="accent1"/>
+                  </a:solidFill>
+                </a:ln>
+              </p:spPr>
+              <p:style>
+                <a:lnRef idx="2">
+                  <a:schemeClr val="accent1">
+                    <a:shade val="50000"/>
+                  </a:schemeClr>
+                </a:lnRef>
+                <a:fillRef idx="1">
+                  <a:schemeClr val="accent1"/>
+                </a:fillRef>
+                <a:effectRef idx="0">
+                  <a:schemeClr val="accent1"/>
+                </a:effectRef>
+                <a:fontRef idx="minor">
+                  <a:schemeClr val="lt1"/>
+                </a:fontRef>
+              </p:style>
+              <p:txBody>
+                <a:bodyPr rtlCol="0" anchor="ctr"/>
+                <a:lstStyle/>
+                <a:p>
+                  <a:pPr algn="ctr"/>
+                  <a:r>
+                    <a:rPr lang="zh-TW" altLang="en-US" b="1" dirty="0">
+                      <a:latin typeface="標楷體" panose="03000509000000000000" pitchFamily="65" charset="-120"/>
+                      <a:ea typeface="標楷體" panose="03000509000000000000" pitchFamily="65" charset="-120"/>
+                    </a:rPr>
+                    <a:t>目前波數</a:t>
+                  </a:r>
+                </a:p>
+              </p:txBody>
+            </p:sp>
+            <p:sp>
+              <p:nvSpPr>
+                <p:cNvPr id="15" name="矩形: 圓角 14">
+                  <a:extLst>
+                    <a:ext uri="{FF2B5EF4-FFF2-40B4-BE49-F238E27FC236}">
+                      <a16:creationId xmlns:a16="http://schemas.microsoft.com/office/drawing/2014/main" id="{3A722503-9385-4E5D-8632-69E795C74767}"/>
+                    </a:ext>
+                  </a:extLst>
+                </p:cNvPr>
+                <p:cNvSpPr/>
+                <p:nvPr/>
+              </p:nvSpPr>
+              <p:spPr>
+                <a:xfrm>
+                  <a:off x="4320389" y="134878"/>
+                  <a:ext cx="1668034" cy="653767"/>
+                </a:xfrm>
+                <a:prstGeom prst="roundRect">
+                  <a:avLst>
+                    <a:gd name="adj" fmla="val 36667"/>
+                  </a:avLst>
+                </a:prstGeom>
+                <a:noFill/>
+                <a:ln w="38100">
+                  <a:solidFill>
+                    <a:schemeClr val="accent4"/>
+                  </a:solidFill>
+                </a:ln>
+              </p:spPr>
+              <p:style>
+                <a:lnRef idx="2">
+                  <a:schemeClr val="accent1">
+                    <a:shade val="50000"/>
+                  </a:schemeClr>
+                </a:lnRef>
+                <a:fillRef idx="1">
+                  <a:schemeClr val="accent1"/>
+                </a:fillRef>
+                <a:effectRef idx="0">
+                  <a:schemeClr val="accent1"/>
+                </a:effectRef>
+                <a:fontRef idx="minor">
+                  <a:schemeClr val="lt1"/>
+                </a:fontRef>
+              </p:style>
+              <p:txBody>
+                <a:bodyPr rtlCol="0" anchor="ctr"/>
+                <a:lstStyle/>
+                <a:p>
+                  <a:pPr algn="ctr"/>
+                  <a:endParaRPr lang="zh-TW" altLang="en-US"/>
+                </a:p>
+              </p:txBody>
+            </p:sp>
+            <p:sp>
+              <p:nvSpPr>
+                <p:cNvPr id="16" name="矩形: 圓角 15">
+                  <a:extLst>
+                    <a:ext uri="{FF2B5EF4-FFF2-40B4-BE49-F238E27FC236}">
+                      <a16:creationId xmlns:a16="http://schemas.microsoft.com/office/drawing/2014/main" id="{24E4D458-818B-4E2A-AFA2-A10CF550897E}"/>
+                    </a:ext>
+                  </a:extLst>
+                </p:cNvPr>
+                <p:cNvSpPr/>
+                <p:nvPr/>
+              </p:nvSpPr>
+              <p:spPr>
+                <a:xfrm>
+                  <a:off x="4253074" y="941045"/>
+                  <a:ext cx="1871235" cy="653767"/>
+                </a:xfrm>
+                <a:prstGeom prst="roundRect">
+                  <a:avLst>
+                    <a:gd name="adj" fmla="val 36667"/>
+                  </a:avLst>
+                </a:prstGeom>
+                <a:noFill/>
+                <a:ln w="28575">
+                  <a:solidFill>
+                    <a:schemeClr val="accent4"/>
+                  </a:solidFill>
+                </a:ln>
+              </p:spPr>
+              <p:style>
+                <a:lnRef idx="2">
+                  <a:schemeClr val="accent1">
+                    <a:shade val="50000"/>
+                  </a:schemeClr>
+                </a:lnRef>
+                <a:fillRef idx="1">
+                  <a:schemeClr val="accent1"/>
+                </a:fillRef>
+                <a:effectRef idx="0">
+                  <a:schemeClr val="accent1"/>
+                </a:effectRef>
+                <a:fontRef idx="minor">
+                  <a:schemeClr val="lt1"/>
+                </a:fontRef>
+              </p:style>
+              <p:txBody>
+                <a:bodyPr rtlCol="0" anchor="ctr"/>
+                <a:lstStyle/>
+                <a:p>
+                  <a:pPr algn="ctr"/>
+                  <a:r>
+                    <a:rPr lang="zh-TW" altLang="en-US" b="1" dirty="0">
+                      <a:latin typeface="標楷體" panose="03000509000000000000" pitchFamily="65" charset="-120"/>
+                      <a:ea typeface="標楷體" panose="03000509000000000000" pitchFamily="65" charset="-120"/>
+                    </a:rPr>
+                    <a:t>目前錢幣</a:t>
+                  </a:r>
+                  <a:endParaRPr lang="en-US" altLang="zh-TW" b="1" dirty="0">
+                    <a:latin typeface="標楷體" panose="03000509000000000000" pitchFamily="65" charset="-120"/>
+                    <a:ea typeface="標楷體" panose="03000509000000000000" pitchFamily="65" charset="-120"/>
+                  </a:endParaRPr>
+                </a:p>
+                <a:p>
+                  <a:pPr algn="ctr"/>
+                  <a:r>
+                    <a:rPr lang="zh-TW" altLang="en-US" b="1" dirty="0">
+                      <a:latin typeface="標楷體" panose="03000509000000000000" pitchFamily="65" charset="-120"/>
+                      <a:ea typeface="標楷體" panose="03000509000000000000" pitchFamily="65" charset="-120"/>
+                    </a:rPr>
+                    <a:t>擊殺怪物 </a:t>
+                  </a:r>
+                  <a:r>
+                    <a:rPr lang="en-US" altLang="zh-TW" b="1" dirty="0">
+                      <a:latin typeface="標楷體" panose="03000509000000000000" pitchFamily="65" charset="-120"/>
+                      <a:ea typeface="標楷體" panose="03000509000000000000" pitchFamily="65" charset="-120"/>
+                    </a:rPr>
+                    <a:t>+</a:t>
+                  </a:r>
+                  <a:r>
+                    <a:rPr lang="zh-TW" altLang="en-US" b="1" dirty="0">
+                      <a:latin typeface="標楷體" panose="03000509000000000000" pitchFamily="65" charset="-120"/>
+                      <a:ea typeface="標楷體" panose="03000509000000000000" pitchFamily="65" charset="-120"/>
+                    </a:rPr>
+                    <a:t> </a:t>
+                  </a:r>
+                  <a:r>
+                    <a:rPr lang="en-US" altLang="zh-TW" b="1" dirty="0">
+                      <a:latin typeface="標楷體" panose="03000509000000000000" pitchFamily="65" charset="-120"/>
+                      <a:ea typeface="標楷體" panose="03000509000000000000" pitchFamily="65" charset="-120"/>
+                    </a:rPr>
+                    <a:t>5</a:t>
+                  </a:r>
+                  <a:endParaRPr lang="zh-TW" altLang="en-US" b="1" dirty="0">
+                    <a:latin typeface="標楷體" panose="03000509000000000000" pitchFamily="65" charset="-120"/>
+                    <a:ea typeface="標楷體" panose="03000509000000000000" pitchFamily="65" charset="-120"/>
+                  </a:endParaRPr>
+                </a:p>
+              </p:txBody>
+            </p:sp>
+            <p:sp>
+              <p:nvSpPr>
+                <p:cNvPr id="17" name="矩形: 圓角 16">
+                  <a:extLst>
+                    <a:ext uri="{FF2B5EF4-FFF2-40B4-BE49-F238E27FC236}">
+                      <a16:creationId xmlns:a16="http://schemas.microsoft.com/office/drawing/2014/main" id="{FAEB1E4C-20E4-435A-8DC9-ACE09217BB7E}"/>
+                    </a:ext>
+                  </a:extLst>
+                </p:cNvPr>
+                <p:cNvSpPr/>
+                <p:nvPr/>
+              </p:nvSpPr>
+              <p:spPr>
+                <a:xfrm>
+                  <a:off x="7207022" y="134629"/>
+                  <a:ext cx="3514765" cy="653767"/>
+                </a:xfrm>
+                <a:prstGeom prst="roundRect">
+                  <a:avLst>
+                    <a:gd name="adj" fmla="val 36667"/>
+                  </a:avLst>
+                </a:prstGeom>
+                <a:noFill/>
+                <a:ln w="38100">
+                  <a:solidFill>
+                    <a:schemeClr val="accent2"/>
+                  </a:solidFill>
+                </a:ln>
+              </p:spPr>
+              <p:style>
+                <a:lnRef idx="2">
+                  <a:schemeClr val="accent1">
+                    <a:shade val="50000"/>
+                  </a:schemeClr>
+                </a:lnRef>
+                <a:fillRef idx="1">
+                  <a:schemeClr val="accent1"/>
+                </a:fillRef>
+                <a:effectRef idx="0">
+                  <a:schemeClr val="accent1"/>
+                </a:effectRef>
+                <a:fontRef idx="minor">
+                  <a:schemeClr val="lt1"/>
+                </a:fontRef>
+              </p:style>
+              <p:txBody>
+                <a:bodyPr rtlCol="0" anchor="ctr"/>
+                <a:lstStyle/>
+                <a:p>
+                  <a:pPr algn="ctr"/>
+                  <a:endParaRPr lang="zh-TW" altLang="en-US"/>
+                </a:p>
+              </p:txBody>
+            </p:sp>
+            <p:sp>
+              <p:nvSpPr>
+                <p:cNvPr id="19" name="矩形: 圓角 18">
+                  <a:extLst>
+                    <a:ext uri="{FF2B5EF4-FFF2-40B4-BE49-F238E27FC236}">
+                      <a16:creationId xmlns:a16="http://schemas.microsoft.com/office/drawing/2014/main" id="{0517E921-ACE8-4D19-9B64-09B2B3C17787}"/>
+                    </a:ext>
+                  </a:extLst>
+                </p:cNvPr>
+                <p:cNvSpPr/>
+                <p:nvPr/>
+              </p:nvSpPr>
+              <p:spPr>
+                <a:xfrm>
+                  <a:off x="6319512" y="923026"/>
+                  <a:ext cx="3963003" cy="586996"/>
+                </a:xfrm>
+                <a:prstGeom prst="roundRect">
+                  <a:avLst>
+                    <a:gd name="adj" fmla="val 36667"/>
+                  </a:avLst>
+                </a:prstGeom>
+                <a:noFill/>
+                <a:ln w="28575">
+                  <a:solidFill>
+                    <a:schemeClr val="accent2"/>
+                  </a:solidFill>
+                </a:ln>
+              </p:spPr>
+              <p:style>
+                <a:lnRef idx="2">
+                  <a:schemeClr val="accent1">
+                    <a:shade val="50000"/>
+                  </a:schemeClr>
+                </a:lnRef>
+                <a:fillRef idx="1">
+                  <a:schemeClr val="accent1"/>
+                </a:fillRef>
+                <a:effectRef idx="0">
+                  <a:schemeClr val="accent1"/>
+                </a:effectRef>
+                <a:fontRef idx="minor">
+                  <a:schemeClr val="lt1"/>
+                </a:fontRef>
+              </p:style>
+              <p:txBody>
+                <a:bodyPr rtlCol="0" anchor="ctr"/>
+                <a:lstStyle/>
+                <a:p>
+                  <a:pPr algn="ctr"/>
+                  <a:r>
+                    <a:rPr lang="zh-TW" altLang="en-US" b="1" dirty="0">
+                      <a:latin typeface="標楷體" panose="03000509000000000000" pitchFamily="65" charset="-120"/>
+                      <a:ea typeface="標楷體" panose="03000509000000000000" pitchFamily="65" charset="-120"/>
+                    </a:rPr>
+                    <a:t>目前血量 低於</a:t>
+                  </a:r>
+                  <a:r>
+                    <a:rPr lang="en-US" altLang="zh-TW" b="1" dirty="0">
+                      <a:latin typeface="標楷體" panose="03000509000000000000" pitchFamily="65" charset="-120"/>
+                      <a:ea typeface="標楷體" panose="03000509000000000000" pitchFamily="65" charset="-120"/>
+                    </a:rPr>
+                    <a:t>0</a:t>
+                  </a:r>
+                  <a:r>
+                    <a:rPr lang="zh-TW" altLang="en-US" b="1" dirty="0">
+                      <a:latin typeface="標楷體" panose="03000509000000000000" pitchFamily="65" charset="-120"/>
+                      <a:ea typeface="標楷體" panose="03000509000000000000" pitchFamily="65" charset="-120"/>
+                    </a:rPr>
+                    <a:t>時結束遊戲</a:t>
+                  </a:r>
+                  <a:br>
+                    <a:rPr lang="en-US" altLang="zh-TW" b="1" dirty="0">
+                      <a:latin typeface="標楷體" panose="03000509000000000000" pitchFamily="65" charset="-120"/>
+                      <a:ea typeface="標楷體" panose="03000509000000000000" pitchFamily="65" charset="-120"/>
+                    </a:rPr>
+                  </a:br>
+                  <a:r>
+                    <a:rPr lang="zh-TW" altLang="en-US" b="1" dirty="0">
+                      <a:latin typeface="標楷體" panose="03000509000000000000" pitchFamily="65" charset="-120"/>
+                      <a:ea typeface="標楷體" panose="03000509000000000000" pitchFamily="65" charset="-120"/>
+                    </a:rPr>
+                    <a:t>每隻敵人撞到城堡 血量</a:t>
+                  </a:r>
+                  <a:r>
+                    <a:rPr lang="en-US" altLang="zh-TW" b="1" dirty="0">
+                      <a:latin typeface="標楷體" panose="03000509000000000000" pitchFamily="65" charset="-120"/>
+                      <a:ea typeface="標楷體" panose="03000509000000000000" pitchFamily="65" charset="-120"/>
+                    </a:rPr>
+                    <a:t>-1</a:t>
+                  </a:r>
+                  <a:r>
+                    <a:rPr lang="zh-TW" altLang="en-US" b="1" dirty="0">
+                      <a:latin typeface="標楷體" panose="03000509000000000000" pitchFamily="65" charset="-120"/>
+                      <a:ea typeface="標楷體" panose="03000509000000000000" pitchFamily="65" charset="-120"/>
+                    </a:rPr>
+                    <a:t> 金幣</a:t>
+                  </a:r>
+                  <a:r>
+                    <a:rPr lang="en-US" altLang="zh-TW" b="1" dirty="0">
+                      <a:latin typeface="標楷體" panose="03000509000000000000" pitchFamily="65" charset="-120"/>
+                      <a:ea typeface="標楷體" panose="03000509000000000000" pitchFamily="65" charset="-120"/>
+                    </a:rPr>
+                    <a:t>+5</a:t>
+                  </a:r>
+                  <a:endParaRPr lang="zh-TW" altLang="en-US" b="1" dirty="0">
+                    <a:latin typeface="標楷體" panose="03000509000000000000" pitchFamily="65" charset="-120"/>
+                    <a:ea typeface="標楷體" panose="03000509000000000000" pitchFamily="65" charset="-120"/>
+                  </a:endParaRPr>
+                </a:p>
+              </p:txBody>
+            </p:sp>
+          </p:grpSp>
           <p:sp>
             <p:nvSpPr>
-              <p:cNvPr id="7" name="箭號: 向右 6">
+              <p:cNvPr id="21" name="矩形: 圓角 20">
                 <a:extLst>
                   <a:ext uri="{FF2B5EF4-FFF2-40B4-BE49-F238E27FC236}">
-                    <a16:creationId xmlns:a16="http://schemas.microsoft.com/office/drawing/2014/main" id="{15AE5A35-FC5D-4442-A8AA-5CE879322530}"/>
+                    <a16:creationId xmlns:a16="http://schemas.microsoft.com/office/drawing/2014/main" id="{082C5654-9A3C-432F-B92A-303260E5D69F}"/>
                   </a:ext>
                 </a:extLst>
               </p:cNvPr>
@@ -3405,19 +4057,19 @@
               <p:nvPr/>
             </p:nvSpPr>
             <p:spPr>
-              <a:xfrm rot="10800000">
-                <a:off x="4597667" y="5805579"/>
-                <a:ext cx="754262" cy="455336"/>
+              <a:xfrm>
+                <a:off x="1913444" y="1776146"/>
+                <a:ext cx="699247" cy="559363"/>
               </a:xfrm>
-              <a:prstGeom prst="rightArrow">
-                <a:avLst/>
+              <a:prstGeom prst="roundRect">
+                <a:avLst>
+                  <a:gd name="adj" fmla="val 36667"/>
+                </a:avLst>
               </a:prstGeom>
-              <a:solidFill>
-                <a:srgbClr val="FF0000"/>
-              </a:solidFill>
-              <a:ln w="19050">
+              <a:noFill/>
+              <a:ln w="38100">
                 <a:solidFill>
-                  <a:srgbClr val="C00000"/>
+                  <a:srgbClr val="7030A0"/>
                 </a:solidFill>
               </a:ln>
             </p:spPr>
@@ -3448,10 +4100,10 @@
           </p:sp>
           <p:sp>
             <p:nvSpPr>
-              <p:cNvPr id="8" name="矩形: 圓角 7">
+              <p:cNvPr id="22" name="矩形: 圓角 21">
                 <a:extLst>
                   <a:ext uri="{FF2B5EF4-FFF2-40B4-BE49-F238E27FC236}">
-                    <a16:creationId xmlns:a16="http://schemas.microsoft.com/office/drawing/2014/main" id="{5FF69E1B-0B32-4F36-A20F-0ED2900F7ECA}"/>
+                    <a16:creationId xmlns:a16="http://schemas.microsoft.com/office/drawing/2014/main" id="{E35907AE-EB98-4307-B48B-946C42AAB7F5}"/>
                   </a:ext>
                 </a:extLst>
               </p:cNvPr>
@@ -3460,8 +4112,8 @@
             </p:nvSpPr>
             <p:spPr>
               <a:xfrm>
-                <a:off x="1316031" y="5629835"/>
-                <a:ext cx="2673234" cy="806824"/>
+                <a:off x="1502745" y="2501170"/>
+                <a:ext cx="1520644" cy="376393"/>
               </a:xfrm>
               <a:prstGeom prst="roundRect">
                 <a:avLst>
@@ -3471,7 +4123,67 @@
               <a:noFill/>
               <a:ln w="28575">
                 <a:solidFill>
-                  <a:srgbClr val="FF0000"/>
+                  <a:srgbClr val="7030A0"/>
+                </a:solidFill>
+              </a:ln>
+            </p:spPr>
+            <p:style>
+              <a:lnRef idx="2">
+                <a:schemeClr val="accent1">
+                  <a:shade val="50000"/>
+                </a:schemeClr>
+              </a:lnRef>
+              <a:fillRef idx="1">
+                <a:schemeClr val="accent1"/>
+              </a:fillRef>
+              <a:effectRef idx="0">
+                <a:schemeClr val="accent1"/>
+              </a:effectRef>
+              <a:fontRef idx="minor">
+                <a:schemeClr val="lt1"/>
+              </a:fontRef>
+            </p:style>
+            <p:txBody>
+              <a:bodyPr rtlCol="0" anchor="ctr"/>
+              <a:lstStyle/>
+              <a:p>
+                <a:pPr algn="ctr"/>
+                <a:r>
+                  <a:rPr lang="zh-TW" altLang="en-US" b="1" dirty="0">
+                    <a:latin typeface="標楷體" panose="03000509000000000000" pitchFamily="65" charset="-120"/>
+                    <a:ea typeface="標楷體" panose="03000509000000000000" pitchFamily="65" charset="-120"/>
+                  </a:rPr>
+                  <a:t>敵人出生點</a:t>
+                </a:r>
+              </a:p>
+            </p:txBody>
+          </p:sp>
+          <p:sp>
+            <p:nvSpPr>
+              <p:cNvPr id="23" name="矩形: 圓角 22">
+                <a:extLst>
+                  <a:ext uri="{FF2B5EF4-FFF2-40B4-BE49-F238E27FC236}">
+                    <a16:creationId xmlns:a16="http://schemas.microsoft.com/office/drawing/2014/main" id="{62F3BAA7-0399-472C-81E0-160B7648977E}"/>
+                  </a:ext>
+                </a:extLst>
+              </p:cNvPr>
+              <p:cNvSpPr/>
+              <p:nvPr/>
+            </p:nvSpPr>
+            <p:spPr>
+              <a:xfrm>
+                <a:off x="8959702" y="2703976"/>
+                <a:ext cx="699247" cy="559363"/>
+              </a:xfrm>
+              <a:prstGeom prst="roundRect">
+                <a:avLst>
+                  <a:gd name="adj" fmla="val 36667"/>
+                </a:avLst>
+              </a:prstGeom>
+              <a:noFill/>
+              <a:ln w="38100">
+                <a:solidFill>
+                  <a:srgbClr val="92D050"/>
                 </a:solidFill>
               </a:ln>
             </p:spPr>
@@ -3502,10 +4214,10 @@
           </p:sp>
           <p:sp>
             <p:nvSpPr>
-              <p:cNvPr id="9" name="矩形: 圓角 8">
+              <p:cNvPr id="24" name="矩形: 圓角 23">
                 <a:extLst>
                   <a:ext uri="{FF2B5EF4-FFF2-40B4-BE49-F238E27FC236}">
-                    <a16:creationId xmlns:a16="http://schemas.microsoft.com/office/drawing/2014/main" id="{B517B7EA-C13B-4486-8839-D1224F1BA9A6}"/>
+                    <a16:creationId xmlns:a16="http://schemas.microsoft.com/office/drawing/2014/main" id="{7DE3A60B-6ED0-4BCE-9F79-CA56C7F669B5}"/>
                   </a:ext>
                 </a:extLst>
               </p:cNvPr>
@@ -3514,8 +4226,8 @@
             </p:nvSpPr>
             <p:spPr>
               <a:xfrm>
-                <a:off x="5604094" y="5589494"/>
-                <a:ext cx="3270963" cy="887506"/>
+                <a:off x="8690155" y="3429000"/>
+                <a:ext cx="1238340" cy="376393"/>
               </a:xfrm>
               <a:prstGeom prst="roundRect">
                 <a:avLst>
@@ -3525,7 +4237,7 @@
               <a:noFill/>
               <a:ln w="28575">
                 <a:solidFill>
-                  <a:srgbClr val="FF0000"/>
+                  <a:srgbClr val="92D050"/>
                 </a:solidFill>
               </a:ln>
             </p:spPr>
@@ -3555,441 +4267,18 @@
                     <a:latin typeface="標楷體" panose="03000509000000000000" pitchFamily="65" charset="-120"/>
                     <a:ea typeface="標楷體" panose="03000509000000000000" pitchFamily="65" charset="-120"/>
                   </a:rPr>
-                  <a:t>購買處</a:t>
+                  <a:t>自家城堡</a:t>
                 </a:r>
-                <a:br>
-                  <a:rPr lang="en-US" altLang="zh-TW" b="1" dirty="0">
-                    <a:latin typeface="標楷體" panose="03000509000000000000" pitchFamily="65" charset="-120"/>
-                    <a:ea typeface="標楷體" panose="03000509000000000000" pitchFamily="65" charset="-120"/>
-                  </a:rPr>
-                </a:br>
-                <a:r>
-                  <a:rPr lang="zh-TW" altLang="en-US" b="1" dirty="0">
-                    <a:latin typeface="標楷體" panose="03000509000000000000" pitchFamily="65" charset="-120"/>
-                    <a:ea typeface="標楷體" panose="03000509000000000000" pitchFamily="65" charset="-120"/>
-                  </a:rPr>
-                  <a:t>上方為花費 </a:t>
-                </a:r>
-                <a:endParaRPr lang="en-US" altLang="zh-TW" b="1" dirty="0">
-                  <a:latin typeface="標楷體" panose="03000509000000000000" pitchFamily="65" charset="-120"/>
-                  <a:ea typeface="標楷體" panose="03000509000000000000" pitchFamily="65" charset="-120"/>
-                </a:endParaRPr>
-              </a:p>
-              <a:p>
-                <a:pPr algn="ctr"/>
-                <a:r>
-                  <a:rPr lang="zh-TW" altLang="en-US" b="1" dirty="0">
-                    <a:latin typeface="標楷體" panose="03000509000000000000" pitchFamily="65" charset="-120"/>
-                    <a:ea typeface="標楷體" panose="03000509000000000000" pitchFamily="65" charset="-120"/>
-                  </a:rPr>
-                  <a:t>下方為守護者 按下即可放置</a:t>
-                </a:r>
-              </a:p>
-            </p:txBody>
-          </p:sp>
-          <p:sp>
-            <p:nvSpPr>
-              <p:cNvPr id="11" name="矩形: 圓角 10">
-                <a:extLst>
-                  <a:ext uri="{FF2B5EF4-FFF2-40B4-BE49-F238E27FC236}">
-                    <a16:creationId xmlns:a16="http://schemas.microsoft.com/office/drawing/2014/main" id="{7A236FCC-97B9-455F-A487-2381D170DD2D}"/>
-                  </a:ext>
-                </a:extLst>
-              </p:cNvPr>
-              <p:cNvSpPr/>
-              <p:nvPr/>
-            </p:nvSpPr>
-            <p:spPr>
-              <a:xfrm>
-                <a:off x="2437801" y="229531"/>
-                <a:ext cx="1668034" cy="559363"/>
-              </a:xfrm>
-              <a:prstGeom prst="roundRect">
-                <a:avLst>
-                  <a:gd name="adj" fmla="val 36667"/>
-                </a:avLst>
-              </a:prstGeom>
-              <a:noFill/>
-              <a:ln w="38100">
-                <a:solidFill>
-                  <a:schemeClr val="accent5">
-                    <a:lumMod val="75000"/>
-                  </a:schemeClr>
-                </a:solidFill>
-              </a:ln>
-            </p:spPr>
-            <p:style>
-              <a:lnRef idx="2">
-                <a:schemeClr val="accent1">
-                  <a:shade val="50000"/>
-                </a:schemeClr>
-              </a:lnRef>
-              <a:fillRef idx="1">
-                <a:schemeClr val="accent1"/>
-              </a:fillRef>
-              <a:effectRef idx="0">
-                <a:schemeClr val="accent1"/>
-              </a:effectRef>
-              <a:fontRef idx="minor">
-                <a:schemeClr val="lt1"/>
-              </a:fontRef>
-            </p:style>
-            <p:txBody>
-              <a:bodyPr rtlCol="0" anchor="ctr"/>
-              <a:lstStyle/>
-              <a:p>
-                <a:pPr algn="ctr"/>
-                <a:endParaRPr lang="zh-TW" altLang="en-US"/>
-              </a:p>
-            </p:txBody>
-          </p:sp>
-          <p:sp>
-            <p:nvSpPr>
-              <p:cNvPr id="12" name="矩形: 圓角 11">
-                <a:extLst>
-                  <a:ext uri="{FF2B5EF4-FFF2-40B4-BE49-F238E27FC236}">
-                    <a16:creationId xmlns:a16="http://schemas.microsoft.com/office/drawing/2014/main" id="{07881E85-864D-463E-91C9-F9EFE81458EF}"/>
-                  </a:ext>
-                </a:extLst>
-              </p:cNvPr>
-              <p:cNvSpPr/>
-              <p:nvPr/>
-            </p:nvSpPr>
-            <p:spPr>
-              <a:xfrm>
-                <a:off x="2652648" y="941045"/>
-                <a:ext cx="1238340" cy="376393"/>
-              </a:xfrm>
-              <a:prstGeom prst="roundRect">
-                <a:avLst>
-                  <a:gd name="adj" fmla="val 36667"/>
-                </a:avLst>
-              </a:prstGeom>
-              <a:noFill/>
-              <a:ln w="28575">
-                <a:solidFill>
-                  <a:schemeClr val="accent1"/>
-                </a:solidFill>
-              </a:ln>
-            </p:spPr>
-            <p:style>
-              <a:lnRef idx="2">
-                <a:schemeClr val="accent1">
-                  <a:shade val="50000"/>
-                </a:schemeClr>
-              </a:lnRef>
-              <a:fillRef idx="1">
-                <a:schemeClr val="accent1"/>
-              </a:fillRef>
-              <a:effectRef idx="0">
-                <a:schemeClr val="accent1"/>
-              </a:effectRef>
-              <a:fontRef idx="minor">
-                <a:schemeClr val="lt1"/>
-              </a:fontRef>
-            </p:style>
-            <p:txBody>
-              <a:bodyPr rtlCol="0" anchor="ctr"/>
-              <a:lstStyle/>
-              <a:p>
-                <a:pPr algn="ctr"/>
-                <a:r>
-                  <a:rPr lang="zh-TW" altLang="en-US" b="1" dirty="0">
-                    <a:latin typeface="標楷體" panose="03000509000000000000" pitchFamily="65" charset="-120"/>
-                    <a:ea typeface="標楷體" panose="03000509000000000000" pitchFamily="65" charset="-120"/>
-                  </a:rPr>
-                  <a:t>目前波數</a:t>
-                </a:r>
-              </a:p>
-            </p:txBody>
-          </p:sp>
-          <p:sp>
-            <p:nvSpPr>
-              <p:cNvPr id="15" name="矩形: 圓角 14">
-                <a:extLst>
-                  <a:ext uri="{FF2B5EF4-FFF2-40B4-BE49-F238E27FC236}">
-                    <a16:creationId xmlns:a16="http://schemas.microsoft.com/office/drawing/2014/main" id="{3A722503-9385-4E5D-8632-69E795C74767}"/>
-                  </a:ext>
-                </a:extLst>
-              </p:cNvPr>
-              <p:cNvSpPr/>
-              <p:nvPr/>
-            </p:nvSpPr>
-            <p:spPr>
-              <a:xfrm>
-                <a:off x="4320389" y="134878"/>
-                <a:ext cx="1668034" cy="653767"/>
-              </a:xfrm>
-              <a:prstGeom prst="roundRect">
-                <a:avLst>
-                  <a:gd name="adj" fmla="val 36667"/>
-                </a:avLst>
-              </a:prstGeom>
-              <a:noFill/>
-              <a:ln w="38100">
-                <a:solidFill>
-                  <a:schemeClr val="accent4"/>
-                </a:solidFill>
-              </a:ln>
-            </p:spPr>
-            <p:style>
-              <a:lnRef idx="2">
-                <a:schemeClr val="accent1">
-                  <a:shade val="50000"/>
-                </a:schemeClr>
-              </a:lnRef>
-              <a:fillRef idx="1">
-                <a:schemeClr val="accent1"/>
-              </a:fillRef>
-              <a:effectRef idx="0">
-                <a:schemeClr val="accent1"/>
-              </a:effectRef>
-              <a:fontRef idx="minor">
-                <a:schemeClr val="lt1"/>
-              </a:fontRef>
-            </p:style>
-            <p:txBody>
-              <a:bodyPr rtlCol="0" anchor="ctr"/>
-              <a:lstStyle/>
-              <a:p>
-                <a:pPr algn="ctr"/>
-                <a:endParaRPr lang="zh-TW" altLang="en-US"/>
-              </a:p>
-            </p:txBody>
-          </p:sp>
-          <p:sp>
-            <p:nvSpPr>
-              <p:cNvPr id="16" name="矩形: 圓角 15">
-                <a:extLst>
-                  <a:ext uri="{FF2B5EF4-FFF2-40B4-BE49-F238E27FC236}">
-                    <a16:creationId xmlns:a16="http://schemas.microsoft.com/office/drawing/2014/main" id="{24E4D458-818B-4E2A-AFA2-A10CF550897E}"/>
-                  </a:ext>
-                </a:extLst>
-              </p:cNvPr>
-              <p:cNvSpPr/>
-              <p:nvPr/>
-            </p:nvSpPr>
-            <p:spPr>
-              <a:xfrm>
-                <a:off x="4535236" y="941045"/>
-                <a:ext cx="1238340" cy="376393"/>
-              </a:xfrm>
-              <a:prstGeom prst="roundRect">
-                <a:avLst>
-                  <a:gd name="adj" fmla="val 36667"/>
-                </a:avLst>
-              </a:prstGeom>
-              <a:noFill/>
-              <a:ln w="28575">
-                <a:solidFill>
-                  <a:schemeClr val="accent4"/>
-                </a:solidFill>
-              </a:ln>
-            </p:spPr>
-            <p:style>
-              <a:lnRef idx="2">
-                <a:schemeClr val="accent1">
-                  <a:shade val="50000"/>
-                </a:schemeClr>
-              </a:lnRef>
-              <a:fillRef idx="1">
-                <a:schemeClr val="accent1"/>
-              </a:fillRef>
-              <a:effectRef idx="0">
-                <a:schemeClr val="accent1"/>
-              </a:effectRef>
-              <a:fontRef idx="minor">
-                <a:schemeClr val="lt1"/>
-              </a:fontRef>
-            </p:style>
-            <p:txBody>
-              <a:bodyPr rtlCol="0" anchor="ctr"/>
-              <a:lstStyle/>
-              <a:p>
-                <a:pPr algn="ctr"/>
-                <a:r>
-                  <a:rPr lang="zh-TW" altLang="en-US" b="1" dirty="0">
-                    <a:latin typeface="標楷體" panose="03000509000000000000" pitchFamily="65" charset="-120"/>
-                    <a:ea typeface="標楷體" panose="03000509000000000000" pitchFamily="65" charset="-120"/>
-                  </a:rPr>
-                  <a:t>目前錢幣</a:t>
-                </a:r>
-              </a:p>
-            </p:txBody>
-          </p:sp>
-          <p:sp>
-            <p:nvSpPr>
-              <p:cNvPr id="17" name="矩形: 圓角 16">
-                <a:extLst>
-                  <a:ext uri="{FF2B5EF4-FFF2-40B4-BE49-F238E27FC236}">
-                    <a16:creationId xmlns:a16="http://schemas.microsoft.com/office/drawing/2014/main" id="{FAEB1E4C-20E4-435A-8DC9-ACE09217BB7E}"/>
-                  </a:ext>
-                </a:extLst>
-              </p:cNvPr>
-              <p:cNvSpPr/>
-              <p:nvPr/>
-            </p:nvSpPr>
-            <p:spPr>
-              <a:xfrm>
-                <a:off x="7207022" y="134629"/>
-                <a:ext cx="3514765" cy="653767"/>
-              </a:xfrm>
-              <a:prstGeom prst="roundRect">
-                <a:avLst>
-                  <a:gd name="adj" fmla="val 36667"/>
-                </a:avLst>
-              </a:prstGeom>
-              <a:noFill/>
-              <a:ln w="38100">
-                <a:solidFill>
-                  <a:schemeClr val="accent2"/>
-                </a:solidFill>
-              </a:ln>
-            </p:spPr>
-            <p:style>
-              <a:lnRef idx="2">
-                <a:schemeClr val="accent1">
-                  <a:shade val="50000"/>
-                </a:schemeClr>
-              </a:lnRef>
-              <a:fillRef idx="1">
-                <a:schemeClr val="accent1"/>
-              </a:fillRef>
-              <a:effectRef idx="0">
-                <a:schemeClr val="accent1"/>
-              </a:effectRef>
-              <a:fontRef idx="minor">
-                <a:schemeClr val="lt1"/>
-              </a:fontRef>
-            </p:style>
-            <p:txBody>
-              <a:bodyPr rtlCol="0" anchor="ctr"/>
-              <a:lstStyle/>
-              <a:p>
-                <a:pPr algn="ctr"/>
-                <a:endParaRPr lang="zh-TW" altLang="en-US"/>
-              </a:p>
-            </p:txBody>
-          </p:sp>
-          <p:sp>
-            <p:nvSpPr>
-              <p:cNvPr id="19" name="矩形: 圓角 18">
-                <a:extLst>
-                  <a:ext uri="{FF2B5EF4-FFF2-40B4-BE49-F238E27FC236}">
-                    <a16:creationId xmlns:a16="http://schemas.microsoft.com/office/drawing/2014/main" id="{0517E921-ACE8-4D19-9B64-09B2B3C17787}"/>
-                  </a:ext>
-                </a:extLst>
-              </p:cNvPr>
-              <p:cNvSpPr/>
-              <p:nvPr/>
-            </p:nvSpPr>
-            <p:spPr>
-              <a:xfrm>
-                <a:off x="6319512" y="923025"/>
-                <a:ext cx="3963003" cy="653767"/>
-              </a:xfrm>
-              <a:prstGeom prst="roundRect">
-                <a:avLst>
-                  <a:gd name="adj" fmla="val 36667"/>
-                </a:avLst>
-              </a:prstGeom>
-              <a:noFill/>
-              <a:ln w="28575">
-                <a:solidFill>
-                  <a:schemeClr val="accent2"/>
-                </a:solidFill>
-              </a:ln>
-            </p:spPr>
-            <p:style>
-              <a:lnRef idx="2">
-                <a:schemeClr val="accent1">
-                  <a:shade val="50000"/>
-                </a:schemeClr>
-              </a:lnRef>
-              <a:fillRef idx="1">
-                <a:schemeClr val="accent1"/>
-              </a:fillRef>
-              <a:effectRef idx="0">
-                <a:schemeClr val="accent1"/>
-              </a:effectRef>
-              <a:fontRef idx="minor">
-                <a:schemeClr val="lt1"/>
-              </a:fontRef>
-            </p:style>
-            <p:txBody>
-              <a:bodyPr rtlCol="0" anchor="ctr"/>
-              <a:lstStyle/>
-              <a:p>
-                <a:pPr algn="ctr"/>
-                <a:r>
-                  <a:rPr lang="zh-TW" altLang="en-US" b="1" dirty="0">
-                    <a:latin typeface="標楷體" panose="03000509000000000000" pitchFamily="65" charset="-120"/>
-                    <a:ea typeface="標楷體" panose="03000509000000000000" pitchFamily="65" charset="-120"/>
-                  </a:rPr>
-                  <a:t>目前血量 低於</a:t>
-                </a:r>
-                <a:r>
-                  <a:rPr lang="en-US" altLang="zh-TW" b="1" dirty="0">
-                    <a:latin typeface="標楷體" panose="03000509000000000000" pitchFamily="65" charset="-120"/>
-                    <a:ea typeface="標楷體" panose="03000509000000000000" pitchFamily="65" charset="-120"/>
-                  </a:rPr>
-                  <a:t>0</a:t>
-                </a:r>
-                <a:r>
-                  <a:rPr lang="zh-TW" altLang="en-US" b="1" dirty="0">
-                    <a:latin typeface="標楷體" panose="03000509000000000000" pitchFamily="65" charset="-120"/>
-                    <a:ea typeface="標楷體" panose="03000509000000000000" pitchFamily="65" charset="-120"/>
-                  </a:rPr>
-                  <a:t>時結束遊戲</a:t>
-                </a:r>
-                <a:br>
-                  <a:rPr lang="en-US" altLang="zh-TW" b="1" dirty="0">
-                    <a:latin typeface="標楷體" panose="03000509000000000000" pitchFamily="65" charset="-120"/>
-                    <a:ea typeface="標楷體" panose="03000509000000000000" pitchFamily="65" charset="-120"/>
-                  </a:rPr>
-                </a:br>
-                <a:r>
-                  <a:rPr lang="zh-TW" altLang="en-US" b="1" dirty="0">
-                    <a:latin typeface="標楷體" panose="03000509000000000000" pitchFamily="65" charset="-120"/>
-                    <a:ea typeface="標楷體" panose="03000509000000000000" pitchFamily="65" charset="-120"/>
-                  </a:rPr>
-                  <a:t>每隻敵人撞到城堡 血量</a:t>
-                </a:r>
-                <a:r>
-                  <a:rPr lang="en-US" altLang="zh-TW" b="1" dirty="0">
-                    <a:latin typeface="標楷體" panose="03000509000000000000" pitchFamily="65" charset="-120"/>
-                    <a:ea typeface="標楷體" panose="03000509000000000000" pitchFamily="65" charset="-120"/>
-                  </a:rPr>
-                  <a:t>-1</a:t>
-                </a:r>
-                <a:r>
-                  <a:rPr lang="zh-TW" altLang="en-US" b="1" dirty="0">
-                    <a:latin typeface="標楷體" panose="03000509000000000000" pitchFamily="65" charset="-120"/>
-                    <a:ea typeface="標楷體" panose="03000509000000000000" pitchFamily="65" charset="-120"/>
-                  </a:rPr>
-                  <a:t> 金幣</a:t>
-                </a:r>
-                <a:r>
-                  <a:rPr lang="en-US" altLang="zh-TW" b="1" dirty="0">
-                    <a:latin typeface="標楷體" panose="03000509000000000000" pitchFamily="65" charset="-120"/>
-                    <a:ea typeface="標楷體" panose="03000509000000000000" pitchFamily="65" charset="-120"/>
-                  </a:rPr>
-                  <a:t>+10</a:t>
-                </a:r>
-                <a:endParaRPr lang="zh-TW" altLang="en-US" b="1" dirty="0">
-                  <a:latin typeface="標楷體" panose="03000509000000000000" pitchFamily="65" charset="-120"/>
-                  <a:ea typeface="標楷體" panose="03000509000000000000" pitchFamily="65" charset="-120"/>
-                </a:endParaRPr>
               </a:p>
             </p:txBody>
           </p:sp>
         </p:grpSp>
         <p:sp>
           <p:nvSpPr>
-            <p:cNvPr id="21" name="矩形: 圓角 20">
+            <p:cNvPr id="26" name="箭號: 向下 25">
               <a:extLst>
                 <a:ext uri="{FF2B5EF4-FFF2-40B4-BE49-F238E27FC236}">
-                  <a16:creationId xmlns:a16="http://schemas.microsoft.com/office/drawing/2014/main" id="{082C5654-9A3C-432F-B92A-303260E5D69F}"/>
+                  <a16:creationId xmlns:a16="http://schemas.microsoft.com/office/drawing/2014/main" id="{34CDF5F7-FF97-407B-B44C-6C6B80E235D7}"/>
                 </a:ext>
               </a:extLst>
             </p:cNvPr>
@@ -3997,21 +4286,19 @@
             <p:nvPr/>
           </p:nvSpPr>
           <p:spPr>
-            <a:xfrm>
-              <a:off x="1913444" y="1776146"/>
-              <a:ext cx="699247" cy="559363"/>
+            <a:xfrm rot="16200000">
+              <a:off x="7869113" y="1927836"/>
+              <a:ext cx="263358" cy="950223"/>
             </a:xfrm>
-            <a:prstGeom prst="roundRect">
-              <a:avLst>
-                <a:gd name="adj" fmla="val 36667"/>
-              </a:avLst>
+            <a:prstGeom prst="downArrow">
+              <a:avLst/>
             </a:prstGeom>
-            <a:noFill/>
-            <a:ln w="38100">
-              <a:solidFill>
-                <a:srgbClr val="7030A0"/>
-              </a:solidFill>
-            </a:ln>
+            <a:solidFill>
+              <a:schemeClr val="accent1">
+                <a:lumMod val="60000"/>
+                <a:lumOff val="40000"/>
+              </a:schemeClr>
+            </a:solidFill>
           </p:spPr>
           <p:style>
             <a:lnRef idx="2">
@@ -4040,10 +4327,10 @@
         </p:sp>
         <p:sp>
           <p:nvSpPr>
-            <p:cNvPr id="22" name="矩形: 圓角 21">
+            <p:cNvPr id="27" name="矩形: 圓角 26">
               <a:extLst>
                 <a:ext uri="{FF2B5EF4-FFF2-40B4-BE49-F238E27FC236}">
-                  <a16:creationId xmlns:a16="http://schemas.microsoft.com/office/drawing/2014/main" id="{E35907AE-EB98-4307-B48B-946C42AAB7F5}"/>
+                  <a16:creationId xmlns:a16="http://schemas.microsoft.com/office/drawing/2014/main" id="{9293AA11-0D41-455B-B437-D79886BF26A5}"/>
                 </a:ext>
               </a:extLst>
             </p:cNvPr>
@@ -4052,8 +4339,8 @@
           </p:nvSpPr>
           <p:spPr>
             <a:xfrm>
-              <a:off x="1502745" y="2501170"/>
-              <a:ext cx="1520644" cy="376393"/>
+              <a:off x="5303520" y="2201930"/>
+              <a:ext cx="2222159" cy="384016"/>
             </a:xfrm>
             <a:prstGeom prst="roundRect">
               <a:avLst>
@@ -4063,7 +4350,10 @@
             <a:noFill/>
             <a:ln w="28575">
               <a:solidFill>
-                <a:srgbClr val="7030A0"/>
+                <a:schemeClr val="accent1">
+                  <a:lumMod val="60000"/>
+                  <a:lumOff val="40000"/>
+                </a:schemeClr>
               </a:solidFill>
             </a:ln>
           </p:spPr>
@@ -4093,121 +4383,7 @@
                   <a:latin typeface="標楷體" panose="03000509000000000000" pitchFamily="65" charset="-120"/>
                   <a:ea typeface="標楷體" panose="03000509000000000000" pitchFamily="65" charset="-120"/>
                 </a:rPr>
-                <a:t>敵人出生點</a:t>
-              </a:r>
-            </a:p>
-          </p:txBody>
-        </p:sp>
-        <p:sp>
-          <p:nvSpPr>
-            <p:cNvPr id="23" name="矩形: 圓角 22">
-              <a:extLst>
-                <a:ext uri="{FF2B5EF4-FFF2-40B4-BE49-F238E27FC236}">
-                  <a16:creationId xmlns:a16="http://schemas.microsoft.com/office/drawing/2014/main" id="{62F3BAA7-0399-472C-81E0-160B7648977E}"/>
-                </a:ext>
-              </a:extLst>
-            </p:cNvPr>
-            <p:cNvSpPr/>
-            <p:nvPr/>
-          </p:nvSpPr>
-          <p:spPr>
-            <a:xfrm>
-              <a:off x="8959702" y="2703976"/>
-              <a:ext cx="699247" cy="559363"/>
-            </a:xfrm>
-            <a:prstGeom prst="roundRect">
-              <a:avLst>
-                <a:gd name="adj" fmla="val 36667"/>
-              </a:avLst>
-            </a:prstGeom>
-            <a:noFill/>
-            <a:ln w="38100">
-              <a:solidFill>
-                <a:srgbClr val="92D050"/>
-              </a:solidFill>
-            </a:ln>
-          </p:spPr>
-          <p:style>
-            <a:lnRef idx="2">
-              <a:schemeClr val="accent1">
-                <a:shade val="50000"/>
-              </a:schemeClr>
-            </a:lnRef>
-            <a:fillRef idx="1">
-              <a:schemeClr val="accent1"/>
-            </a:fillRef>
-            <a:effectRef idx="0">
-              <a:schemeClr val="accent1"/>
-            </a:effectRef>
-            <a:fontRef idx="minor">
-              <a:schemeClr val="lt1"/>
-            </a:fontRef>
-          </p:style>
-          <p:txBody>
-            <a:bodyPr rtlCol="0" anchor="ctr"/>
-            <a:lstStyle/>
-            <a:p>
-              <a:pPr algn="ctr"/>
-              <a:endParaRPr lang="zh-TW" altLang="en-US"/>
-            </a:p>
-          </p:txBody>
-        </p:sp>
-        <p:sp>
-          <p:nvSpPr>
-            <p:cNvPr id="24" name="矩形: 圓角 23">
-              <a:extLst>
-                <a:ext uri="{FF2B5EF4-FFF2-40B4-BE49-F238E27FC236}">
-                  <a16:creationId xmlns:a16="http://schemas.microsoft.com/office/drawing/2014/main" id="{7DE3A60B-6ED0-4BCE-9F79-CA56C7F669B5}"/>
-                </a:ext>
-              </a:extLst>
-            </p:cNvPr>
-            <p:cNvSpPr/>
-            <p:nvPr/>
-          </p:nvSpPr>
-          <p:spPr>
-            <a:xfrm>
-              <a:off x="8690155" y="3429000"/>
-              <a:ext cx="1238340" cy="376393"/>
-            </a:xfrm>
-            <a:prstGeom prst="roundRect">
-              <a:avLst>
-                <a:gd name="adj" fmla="val 36667"/>
-              </a:avLst>
-            </a:prstGeom>
-            <a:noFill/>
-            <a:ln w="28575">
-              <a:solidFill>
-                <a:srgbClr val="92D050"/>
-              </a:solidFill>
-            </a:ln>
-          </p:spPr>
-          <p:style>
-            <a:lnRef idx="2">
-              <a:schemeClr val="accent1">
-                <a:shade val="50000"/>
-              </a:schemeClr>
-            </a:lnRef>
-            <a:fillRef idx="1">
-              <a:schemeClr val="accent1"/>
-            </a:fillRef>
-            <a:effectRef idx="0">
-              <a:schemeClr val="accent1"/>
-            </a:effectRef>
-            <a:fontRef idx="minor">
-              <a:schemeClr val="lt1"/>
-            </a:fontRef>
-          </p:style>
-          <p:txBody>
-            <a:bodyPr rtlCol="0" anchor="ctr"/>
-            <a:lstStyle/>
-            <a:p>
-              <a:pPr algn="ctr"/>
-              <a:r>
-                <a:rPr lang="zh-TW" altLang="en-US" b="1" dirty="0">
-                  <a:latin typeface="標楷體" panose="03000509000000000000" pitchFamily="65" charset="-120"/>
-                  <a:ea typeface="標楷體" panose="03000509000000000000" pitchFamily="65" charset="-120"/>
-                </a:rPr>
-                <a:t>自家城堡</a:t>
+                <a:t>守護者攻擊冷卻條</a:t>
               </a:r>
             </a:p>
           </p:txBody>
@@ -4243,1060 +4419,1573 @@
           <a:chExt cx="0" cy="0"/>
         </a:xfrm>
       </p:grpSpPr>
-      <p:sp>
-        <p:nvSpPr>
-          <p:cNvPr id="4" name="矩形 3">
-            <a:extLst>
-              <a:ext uri="{FF2B5EF4-FFF2-40B4-BE49-F238E27FC236}">
-                <a16:creationId xmlns:a16="http://schemas.microsoft.com/office/drawing/2014/main" id="{7C52A14D-281A-4AD8-9149-3C7C52D6AECF}"/>
-              </a:ext>
-            </a:extLst>
-          </p:cNvPr>
-          <p:cNvSpPr/>
+      <p:grpSp>
+        <p:nvGrpSpPr>
+          <p:cNvPr id="24" name="群組 23">
+            <a:extLst>
+              <a:ext uri="{FF2B5EF4-FFF2-40B4-BE49-F238E27FC236}">
+                <a16:creationId xmlns:a16="http://schemas.microsoft.com/office/drawing/2014/main" id="{30034026-646D-4025-A097-5835690E5593}"/>
+              </a:ext>
+            </a:extLst>
+          </p:cNvPr>
+          <p:cNvGrpSpPr/>
           <p:nvPr/>
-        </p:nvSpPr>
-        <p:spPr>
+        </p:nvGrpSpPr>
+        <p:grpSpPr>
           <a:xfrm>
             <a:off x="579120" y="238760"/>
             <a:ext cx="10871200" cy="5816600"/>
+            <a:chOff x="579120" y="238760"/>
+            <a:chExt cx="10871200" cy="5816600"/>
           </a:xfrm>
-          <a:prstGeom prst="rect">
-            <a:avLst/>
-          </a:prstGeom>
-        </p:spPr>
-        <p:style>
-          <a:lnRef idx="2">
-            <a:schemeClr val="dk1">
-              <a:shade val="50000"/>
-            </a:schemeClr>
-          </a:lnRef>
-          <a:fillRef idx="1">
-            <a:schemeClr val="dk1"/>
-          </a:fillRef>
-          <a:effectRef idx="0">
-            <a:schemeClr val="dk1"/>
-          </a:effectRef>
-          <a:fontRef idx="minor">
-            <a:schemeClr val="lt1"/>
-          </a:fontRef>
-        </p:style>
-        <p:txBody>
-          <a:bodyPr rtlCol="0" anchor="ctr"/>
-          <a:lstStyle/>
-          <a:p>
-            <a:pPr algn="ctr"/>
-            <a:endParaRPr lang="zh-TW" altLang="en-US"/>
-          </a:p>
-        </p:txBody>
-      </p:sp>
-      <p:pic>
-        <p:nvPicPr>
-          <p:cNvPr id="6" name="圖片 5">
-            <a:extLst>
-              <a:ext uri="{FF2B5EF4-FFF2-40B4-BE49-F238E27FC236}">
-                <a16:creationId xmlns:a16="http://schemas.microsoft.com/office/drawing/2014/main" id="{961C5626-551C-4856-AD08-84BD22F46026}"/>
-              </a:ext>
-            </a:extLst>
-          </p:cNvPr>
-          <p:cNvPicPr>
-            <a:picLocks noChangeAspect="1"/>
-          </p:cNvPicPr>
+        </p:grpSpPr>
+        <p:sp>
+          <p:nvSpPr>
+            <p:cNvPr id="4" name="矩形 3">
+              <a:extLst>
+                <a:ext uri="{FF2B5EF4-FFF2-40B4-BE49-F238E27FC236}">
+                  <a16:creationId xmlns:a16="http://schemas.microsoft.com/office/drawing/2014/main" id="{7C52A14D-281A-4AD8-9149-3C7C52D6AECF}"/>
+                </a:ext>
+              </a:extLst>
+            </p:cNvPr>
+            <p:cNvSpPr/>
+            <p:nvPr/>
+          </p:nvSpPr>
+          <p:spPr>
+            <a:xfrm>
+              <a:off x="579120" y="238760"/>
+              <a:ext cx="10871200" cy="5816600"/>
+            </a:xfrm>
+            <a:prstGeom prst="rect">
+              <a:avLst/>
+            </a:prstGeom>
+          </p:spPr>
+          <p:style>
+            <a:lnRef idx="2">
+              <a:schemeClr val="dk1">
+                <a:shade val="50000"/>
+              </a:schemeClr>
+            </a:lnRef>
+            <a:fillRef idx="1">
+              <a:schemeClr val="dk1"/>
+            </a:fillRef>
+            <a:effectRef idx="0">
+              <a:schemeClr val="dk1"/>
+            </a:effectRef>
+            <a:fontRef idx="minor">
+              <a:schemeClr val="lt1"/>
+            </a:fontRef>
+          </p:style>
+          <p:txBody>
+            <a:bodyPr rtlCol="0" anchor="ctr"/>
+            <a:lstStyle/>
+            <a:p>
+              <a:pPr algn="ctr"/>
+              <a:endParaRPr lang="zh-TW" altLang="en-US" dirty="0"/>
+            </a:p>
+          </p:txBody>
+        </p:sp>
+        <p:pic>
+          <p:nvPicPr>
+            <p:cNvPr id="6" name="圖片 5">
+              <a:extLst>
+                <a:ext uri="{FF2B5EF4-FFF2-40B4-BE49-F238E27FC236}">
+                  <a16:creationId xmlns:a16="http://schemas.microsoft.com/office/drawing/2014/main" id="{961C5626-551C-4856-AD08-84BD22F46026}"/>
+                </a:ext>
+              </a:extLst>
+            </p:cNvPr>
+            <p:cNvPicPr>
+              <a:picLocks noChangeAspect="1"/>
+            </p:cNvPicPr>
+            <p:nvPr/>
+          </p:nvPicPr>
+          <p:blipFill>
+            <a:blip r:embed="rId2">
+              <a:extLst>
+                <a:ext uri="{28A0092B-C50C-407E-A947-70E740481C1C}">
+                  <a14:useLocalDpi xmlns:a14="http://schemas.microsoft.com/office/drawing/2010/main" val="0"/>
+                </a:ext>
+              </a:extLst>
+            </a:blip>
+            <a:stretch>
+              <a:fillRect/>
+            </a:stretch>
+          </p:blipFill>
+          <p:spPr>
+            <a:xfrm>
+              <a:off x="4480239" y="662299"/>
+              <a:ext cx="746760" cy="746760"/>
+            </a:xfrm>
+            <a:prstGeom prst="rect">
+              <a:avLst/>
+            </a:prstGeom>
+          </p:spPr>
+        </p:pic>
+        <p:pic>
+          <p:nvPicPr>
+            <p:cNvPr id="12" name="圖片 11">
+              <a:extLst>
+                <a:ext uri="{FF2B5EF4-FFF2-40B4-BE49-F238E27FC236}">
+                  <a16:creationId xmlns:a16="http://schemas.microsoft.com/office/drawing/2014/main" id="{E2F9DBE3-8549-4A0F-B26D-7013A4EFD728}"/>
+                </a:ext>
+              </a:extLst>
+            </p:cNvPr>
+            <p:cNvPicPr>
+              <a:picLocks noChangeAspect="1"/>
+            </p:cNvPicPr>
+            <p:nvPr/>
+          </p:nvPicPr>
+          <p:blipFill>
+            <a:blip r:embed="rId3">
+              <a:extLst>
+                <a:ext uri="{28A0092B-C50C-407E-A947-70E740481C1C}">
+                  <a14:useLocalDpi xmlns:a14="http://schemas.microsoft.com/office/drawing/2010/main" val="0"/>
+                </a:ext>
+              </a:extLst>
+            </a:blip>
+            <a:stretch>
+              <a:fillRect/>
+            </a:stretch>
+          </p:blipFill>
+          <p:spPr>
+            <a:xfrm>
+              <a:off x="4536596" y="3144383"/>
+              <a:ext cx="596900" cy="596900"/>
+            </a:xfrm>
+            <a:prstGeom prst="rect">
+              <a:avLst/>
+            </a:prstGeom>
+          </p:spPr>
+        </p:pic>
+        <p:pic>
+          <p:nvPicPr>
+            <p:cNvPr id="14" name="圖片 13">
+              <a:extLst>
+                <a:ext uri="{FF2B5EF4-FFF2-40B4-BE49-F238E27FC236}">
+                  <a16:creationId xmlns:a16="http://schemas.microsoft.com/office/drawing/2014/main" id="{6E9D6772-481C-49E7-B593-7EDDB47823AA}"/>
+                </a:ext>
+              </a:extLst>
+            </p:cNvPr>
+            <p:cNvPicPr>
+              <a:picLocks noChangeAspect="1"/>
+            </p:cNvPicPr>
+            <p:nvPr/>
+          </p:nvPicPr>
+          <p:blipFill>
+            <a:blip r:embed="rId4">
+              <a:extLst>
+                <a:ext uri="{28A0092B-C50C-407E-A947-70E740481C1C}">
+                  <a14:useLocalDpi xmlns:a14="http://schemas.microsoft.com/office/drawing/2010/main" val="0"/>
+                </a:ext>
+              </a:extLst>
+            </a:blip>
+            <a:stretch>
+              <a:fillRect/>
+            </a:stretch>
+          </p:blipFill>
+          <p:spPr>
+            <a:xfrm>
+              <a:off x="1045210" y="3114318"/>
+              <a:ext cx="807720" cy="807720"/>
+            </a:xfrm>
+            <a:prstGeom prst="rect">
+              <a:avLst/>
+            </a:prstGeom>
+          </p:spPr>
+        </p:pic>
+        <p:pic>
+          <p:nvPicPr>
+            <p:cNvPr id="16" name="圖片 15">
+              <a:extLst>
+                <a:ext uri="{FF2B5EF4-FFF2-40B4-BE49-F238E27FC236}">
+                  <a16:creationId xmlns:a16="http://schemas.microsoft.com/office/drawing/2014/main" id="{5544E5BA-41C8-48AC-BF3B-DB9CA330BEFE}"/>
+                </a:ext>
+              </a:extLst>
+            </p:cNvPr>
+            <p:cNvPicPr>
+              <a:picLocks noChangeAspect="1"/>
+            </p:cNvPicPr>
+            <p:nvPr/>
+          </p:nvPicPr>
+          <p:blipFill>
+            <a:blip r:embed="rId5">
+              <a:extLst>
+                <a:ext uri="{28A0092B-C50C-407E-A947-70E740481C1C}">
+                  <a14:useLocalDpi xmlns:a14="http://schemas.microsoft.com/office/drawing/2010/main" val="0"/>
+                </a:ext>
+              </a:extLst>
+            </a:blip>
+            <a:stretch>
+              <a:fillRect/>
+            </a:stretch>
+          </p:blipFill>
+          <p:spPr>
+            <a:xfrm>
+              <a:off x="1181100" y="737229"/>
+              <a:ext cx="671830" cy="671830"/>
+            </a:xfrm>
+            <a:prstGeom prst="rect">
+              <a:avLst/>
+            </a:prstGeom>
+          </p:spPr>
+        </p:pic>
+        <p:sp>
+          <p:nvSpPr>
+            <p:cNvPr id="18" name="文字方塊 17">
+              <a:extLst>
+                <a:ext uri="{FF2B5EF4-FFF2-40B4-BE49-F238E27FC236}">
+                  <a16:creationId xmlns:a16="http://schemas.microsoft.com/office/drawing/2014/main" id="{89C545A7-7871-4B4F-9B6A-4A462BE791FF}"/>
+                </a:ext>
+              </a:extLst>
+            </p:cNvPr>
+            <p:cNvSpPr txBox="1"/>
+            <p:nvPr/>
+          </p:nvSpPr>
+          <p:spPr>
+            <a:xfrm>
+              <a:off x="798194" y="1618734"/>
+              <a:ext cx="3397885" cy="923330"/>
+            </a:xfrm>
+            <a:prstGeom prst="rect">
+              <a:avLst/>
+            </a:prstGeom>
+            <a:noFill/>
+          </p:spPr>
+          <p:txBody>
+            <a:bodyPr wrap="square">
+              <a:spAutoFit/>
+            </a:bodyPr>
+            <a:lstStyle/>
+            <a:p>
+              <a:r>
+                <a:rPr lang="zh-TW" altLang="en-US" b="1" dirty="0">
+                  <a:solidFill>
+                    <a:schemeClr val="bg1"/>
+                  </a:solidFill>
+                  <a:latin typeface="標楷體" panose="03000509000000000000" pitchFamily="65" charset="-120"/>
+                  <a:ea typeface="標楷體" panose="03000509000000000000" pitchFamily="65" charset="-120"/>
+                </a:rPr>
+                <a:t>攻擊力：</a:t>
+              </a:r>
+              <a:r>
+                <a:rPr lang="en-US" altLang="zh-TW" b="1" dirty="0">
+                  <a:solidFill>
+                    <a:schemeClr val="bg1"/>
+                  </a:solidFill>
+                  <a:latin typeface="標楷體" panose="03000509000000000000" pitchFamily="65" charset="-120"/>
+                  <a:ea typeface="標楷體" panose="03000509000000000000" pitchFamily="65" charset="-120"/>
+                </a:rPr>
+                <a:t>18</a:t>
+              </a:r>
+              <a:r>
+                <a:rPr lang="zh-TW" altLang="en-US" b="1" dirty="0">
+                  <a:solidFill>
+                    <a:schemeClr val="bg1"/>
+                  </a:solidFill>
+                  <a:latin typeface="標楷體" panose="03000509000000000000" pitchFamily="65" charset="-120"/>
+                  <a:ea typeface="標楷體" panose="03000509000000000000" pitchFamily="65" charset="-120"/>
+                </a:rPr>
+                <a:t> </a:t>
+              </a:r>
+              <a:r>
+                <a:rPr lang="en-US" altLang="zh-TW" b="1" dirty="0">
+                  <a:solidFill>
+                    <a:schemeClr val="bg1"/>
+                  </a:solidFill>
+                  <a:latin typeface="標楷體" panose="03000509000000000000" pitchFamily="65" charset="-120"/>
+                  <a:ea typeface="標楷體" panose="03000509000000000000" pitchFamily="65" charset="-120"/>
+                </a:rPr>
+                <a:t>(+5</a:t>
+              </a:r>
+              <a:r>
+                <a:rPr lang="zh-TW" altLang="en-US" b="1" dirty="0">
+                  <a:solidFill>
+                    <a:schemeClr val="bg1"/>
+                  </a:solidFill>
+                  <a:latin typeface="標楷體" panose="03000509000000000000" pitchFamily="65" charset="-120"/>
+                  <a:ea typeface="標楷體" panose="03000509000000000000" pitchFamily="65" charset="-120"/>
+                </a:rPr>
+                <a:t> </a:t>
+              </a:r>
+              <a:r>
+                <a:rPr lang="en-US" altLang="zh-TW" b="1" dirty="0">
+                  <a:solidFill>
+                    <a:schemeClr val="bg1"/>
+                  </a:solidFill>
+                  <a:latin typeface="標楷體" panose="03000509000000000000" pitchFamily="65" charset="-120"/>
+                  <a:ea typeface="標楷體" panose="03000509000000000000" pitchFamily="65" charset="-120"/>
+                </a:rPr>
+                <a:t>/</a:t>
+              </a:r>
+              <a:r>
+                <a:rPr lang="zh-TW" altLang="en-US" b="1" dirty="0">
+                  <a:solidFill>
+                    <a:schemeClr val="bg1"/>
+                  </a:solidFill>
+                  <a:latin typeface="標楷體" panose="03000509000000000000" pitchFamily="65" charset="-120"/>
+                  <a:ea typeface="標楷體" panose="03000509000000000000" pitchFamily="65" charset="-120"/>
+                </a:rPr>
+                <a:t> </a:t>
+              </a:r>
+              <a:r>
+                <a:rPr lang="en-US" altLang="zh-TW" b="1" dirty="0">
+                  <a:solidFill>
+                    <a:schemeClr val="bg1"/>
+                  </a:solidFill>
+                  <a:latin typeface="標楷體" panose="03000509000000000000" pitchFamily="65" charset="-120"/>
+                  <a:ea typeface="標楷體" panose="03000509000000000000" pitchFamily="65" charset="-120"/>
+                </a:rPr>
+                <a:t>Level)</a:t>
+              </a:r>
+            </a:p>
+            <a:p>
+              <a:r>
+                <a:rPr lang="zh-TW" altLang="en-US" b="1" dirty="0">
+                  <a:solidFill>
+                    <a:schemeClr val="bg1"/>
+                  </a:solidFill>
+                  <a:latin typeface="標楷體" panose="03000509000000000000" pitchFamily="65" charset="-120"/>
+                  <a:ea typeface="標楷體" panose="03000509000000000000" pitchFamily="65" charset="-120"/>
+                </a:rPr>
+                <a:t>攻擊速度：</a:t>
+              </a:r>
+              <a:r>
+                <a:rPr lang="en-US" altLang="zh-TW" b="1" dirty="0">
+                  <a:solidFill>
+                    <a:schemeClr val="bg1"/>
+                  </a:solidFill>
+                  <a:latin typeface="標楷體" panose="03000509000000000000" pitchFamily="65" charset="-120"/>
+                  <a:ea typeface="標楷體" panose="03000509000000000000" pitchFamily="65" charset="-120"/>
+                </a:rPr>
+                <a:t> 1.5(</a:t>
+              </a:r>
+              <a:r>
+                <a:rPr lang="zh-TW" altLang="en-US" b="1" dirty="0">
+                  <a:solidFill>
+                    <a:schemeClr val="bg1"/>
+                  </a:solidFill>
+                  <a:latin typeface="標楷體" panose="03000509000000000000" pitchFamily="65" charset="-120"/>
+                  <a:ea typeface="標楷體" panose="03000509000000000000" pitchFamily="65" charset="-120"/>
+                </a:rPr>
+                <a:t>*</a:t>
+              </a:r>
+              <a:r>
+                <a:rPr lang="en-US" altLang="zh-TW" b="1" dirty="0">
+                  <a:solidFill>
+                    <a:schemeClr val="bg1"/>
+                  </a:solidFill>
+                  <a:latin typeface="標楷體" panose="03000509000000000000" pitchFamily="65" charset="-120"/>
+                  <a:ea typeface="標楷體" panose="03000509000000000000" pitchFamily="65" charset="-120"/>
+                </a:rPr>
+                <a:t>1.2</a:t>
+              </a:r>
+              <a:r>
+                <a:rPr lang="zh-TW" altLang="en-US" b="1" dirty="0">
+                  <a:solidFill>
+                    <a:schemeClr val="bg1"/>
+                  </a:solidFill>
+                  <a:latin typeface="標楷體" panose="03000509000000000000" pitchFamily="65" charset="-120"/>
+                  <a:ea typeface="標楷體" panose="03000509000000000000" pitchFamily="65" charset="-120"/>
+                </a:rPr>
+                <a:t> </a:t>
+              </a:r>
+              <a:r>
+                <a:rPr lang="en-US" altLang="zh-TW" b="1" dirty="0">
+                  <a:solidFill>
+                    <a:schemeClr val="bg1"/>
+                  </a:solidFill>
+                  <a:latin typeface="標楷體" panose="03000509000000000000" pitchFamily="65" charset="-120"/>
+                  <a:ea typeface="標楷體" panose="03000509000000000000" pitchFamily="65" charset="-120"/>
+                </a:rPr>
+                <a:t>/</a:t>
+              </a:r>
+              <a:r>
+                <a:rPr lang="zh-TW" altLang="en-US" b="1" dirty="0">
+                  <a:solidFill>
+                    <a:schemeClr val="bg1"/>
+                  </a:solidFill>
+                  <a:latin typeface="標楷體" panose="03000509000000000000" pitchFamily="65" charset="-120"/>
+                  <a:ea typeface="標楷體" panose="03000509000000000000" pitchFamily="65" charset="-120"/>
+                </a:rPr>
+                <a:t> </a:t>
+              </a:r>
+              <a:r>
+                <a:rPr lang="en-US" altLang="zh-TW" b="1" dirty="0">
+                  <a:solidFill>
+                    <a:schemeClr val="bg1"/>
+                  </a:solidFill>
+                  <a:latin typeface="標楷體" panose="03000509000000000000" pitchFamily="65" charset="-120"/>
+                  <a:ea typeface="標楷體" panose="03000509000000000000" pitchFamily="65" charset="-120"/>
+                </a:rPr>
+                <a:t>Level)</a:t>
+              </a:r>
+            </a:p>
+            <a:p>
+              <a:r>
+                <a:rPr lang="zh-TW" altLang="en-US" b="1" dirty="0">
+                  <a:solidFill>
+                    <a:schemeClr val="bg1"/>
+                  </a:solidFill>
+                  <a:latin typeface="標楷體" panose="03000509000000000000" pitchFamily="65" charset="-120"/>
+                  <a:ea typeface="標楷體" panose="03000509000000000000" pitchFamily="65" charset="-120"/>
+                </a:rPr>
+                <a:t>範圍： </a:t>
+              </a:r>
+              <a:r>
+                <a:rPr lang="en-US" altLang="zh-TW" b="1" dirty="0">
+                  <a:solidFill>
+                    <a:schemeClr val="bg1"/>
+                  </a:solidFill>
+                  <a:latin typeface="標楷體" panose="03000509000000000000" pitchFamily="65" charset="-120"/>
+                  <a:ea typeface="標楷體" panose="03000509000000000000" pitchFamily="65" charset="-120"/>
+                </a:rPr>
+                <a:t>1</a:t>
+              </a:r>
+            </a:p>
+          </p:txBody>
+        </p:sp>
+        <p:sp>
+          <p:nvSpPr>
+            <p:cNvPr id="19" name="文字方塊 18">
+              <a:extLst>
+                <a:ext uri="{FF2B5EF4-FFF2-40B4-BE49-F238E27FC236}">
+                  <a16:creationId xmlns:a16="http://schemas.microsoft.com/office/drawing/2014/main" id="{5101AE49-EB89-476C-9E41-97347BC0EE4D}"/>
+                </a:ext>
+              </a:extLst>
+            </p:cNvPr>
+            <p:cNvSpPr txBox="1"/>
+            <p:nvPr/>
+          </p:nvSpPr>
+          <p:spPr>
+            <a:xfrm>
+              <a:off x="798194" y="3924892"/>
+              <a:ext cx="3397885" cy="923330"/>
+            </a:xfrm>
+            <a:prstGeom prst="rect">
+              <a:avLst/>
+            </a:prstGeom>
+            <a:noFill/>
+          </p:spPr>
+          <p:txBody>
+            <a:bodyPr wrap="square">
+              <a:spAutoFit/>
+            </a:bodyPr>
+            <a:lstStyle/>
+            <a:p>
+              <a:r>
+                <a:rPr lang="zh-TW" altLang="en-US" b="1" dirty="0">
+                  <a:solidFill>
+                    <a:schemeClr val="bg1"/>
+                  </a:solidFill>
+                  <a:latin typeface="標楷體" panose="03000509000000000000" pitchFamily="65" charset="-120"/>
+                  <a:ea typeface="標楷體" panose="03000509000000000000" pitchFamily="65" charset="-120"/>
+                </a:rPr>
+                <a:t>攻擊力：</a:t>
+              </a:r>
+              <a:r>
+                <a:rPr lang="en-US" altLang="zh-TW" b="1" dirty="0">
+                  <a:solidFill>
+                    <a:schemeClr val="bg1"/>
+                  </a:solidFill>
+                  <a:latin typeface="標楷體" panose="03000509000000000000" pitchFamily="65" charset="-120"/>
+                  <a:ea typeface="標楷體" panose="03000509000000000000" pitchFamily="65" charset="-120"/>
+                </a:rPr>
+                <a:t>0.5</a:t>
+              </a:r>
+              <a:r>
+                <a:rPr lang="zh-TW" altLang="en-US" b="1" dirty="0">
+                  <a:solidFill>
+                    <a:schemeClr val="bg1"/>
+                  </a:solidFill>
+                  <a:latin typeface="標楷體" panose="03000509000000000000" pitchFamily="65" charset="-120"/>
+                  <a:ea typeface="標楷體" panose="03000509000000000000" pitchFamily="65" charset="-120"/>
+                </a:rPr>
+                <a:t> </a:t>
+              </a:r>
+              <a:r>
+                <a:rPr lang="en-US" altLang="zh-TW" b="1" dirty="0">
+                  <a:solidFill>
+                    <a:schemeClr val="bg1"/>
+                  </a:solidFill>
+                  <a:latin typeface="標楷體" panose="03000509000000000000" pitchFamily="65" charset="-120"/>
+                  <a:ea typeface="標楷體" panose="03000509000000000000" pitchFamily="65" charset="-120"/>
+                </a:rPr>
+                <a:t>(+0.5</a:t>
+              </a:r>
+              <a:r>
+                <a:rPr lang="zh-TW" altLang="en-US" b="1" dirty="0">
+                  <a:solidFill>
+                    <a:schemeClr val="bg1"/>
+                  </a:solidFill>
+                  <a:latin typeface="標楷體" panose="03000509000000000000" pitchFamily="65" charset="-120"/>
+                  <a:ea typeface="標楷體" panose="03000509000000000000" pitchFamily="65" charset="-120"/>
+                </a:rPr>
+                <a:t> </a:t>
+              </a:r>
+              <a:r>
+                <a:rPr lang="en-US" altLang="zh-TW" b="1" dirty="0">
+                  <a:solidFill>
+                    <a:schemeClr val="bg1"/>
+                  </a:solidFill>
+                  <a:latin typeface="標楷體" panose="03000509000000000000" pitchFamily="65" charset="-120"/>
+                  <a:ea typeface="標楷體" panose="03000509000000000000" pitchFamily="65" charset="-120"/>
+                </a:rPr>
+                <a:t>/</a:t>
+              </a:r>
+              <a:r>
+                <a:rPr lang="zh-TW" altLang="en-US" b="1" dirty="0">
+                  <a:solidFill>
+                    <a:schemeClr val="bg1"/>
+                  </a:solidFill>
+                  <a:latin typeface="標楷體" panose="03000509000000000000" pitchFamily="65" charset="-120"/>
+                  <a:ea typeface="標楷體" panose="03000509000000000000" pitchFamily="65" charset="-120"/>
+                </a:rPr>
+                <a:t> </a:t>
+              </a:r>
+              <a:r>
+                <a:rPr lang="en-US" altLang="zh-TW" b="1" dirty="0">
+                  <a:solidFill>
+                    <a:schemeClr val="bg1"/>
+                  </a:solidFill>
+                  <a:latin typeface="標楷體" panose="03000509000000000000" pitchFamily="65" charset="-120"/>
+                  <a:ea typeface="標楷體" panose="03000509000000000000" pitchFamily="65" charset="-120"/>
+                </a:rPr>
+                <a:t>Level)</a:t>
+              </a:r>
+            </a:p>
+            <a:p>
+              <a:r>
+                <a:rPr lang="zh-TW" altLang="en-US" b="1" dirty="0">
+                  <a:solidFill>
+                    <a:schemeClr val="bg1"/>
+                  </a:solidFill>
+                  <a:latin typeface="標楷體" panose="03000509000000000000" pitchFamily="65" charset="-120"/>
+                  <a:ea typeface="標楷體" panose="03000509000000000000" pitchFamily="65" charset="-120"/>
+                </a:rPr>
+                <a:t>攻擊速度：</a:t>
+              </a:r>
+              <a:r>
+                <a:rPr lang="en-US" altLang="zh-TW" b="1" dirty="0">
+                  <a:solidFill>
+                    <a:schemeClr val="bg1"/>
+                  </a:solidFill>
+                  <a:latin typeface="標楷體" panose="03000509000000000000" pitchFamily="65" charset="-120"/>
+                  <a:ea typeface="標楷體" panose="03000509000000000000" pitchFamily="65" charset="-120"/>
+                </a:rPr>
+                <a:t> 18(</a:t>
+              </a:r>
+              <a:r>
+                <a:rPr lang="zh-TW" altLang="en-US" b="1" dirty="0">
+                  <a:solidFill>
+                    <a:schemeClr val="bg1"/>
+                  </a:solidFill>
+                  <a:latin typeface="標楷體" panose="03000509000000000000" pitchFamily="65" charset="-120"/>
+                  <a:ea typeface="標楷體" panose="03000509000000000000" pitchFamily="65" charset="-120"/>
+                </a:rPr>
+                <a:t>*</a:t>
+              </a:r>
+              <a:r>
+                <a:rPr lang="en-US" altLang="zh-TW" b="1" dirty="0">
+                  <a:solidFill>
+                    <a:schemeClr val="bg1"/>
+                  </a:solidFill>
+                  <a:latin typeface="標楷體" panose="03000509000000000000" pitchFamily="65" charset="-120"/>
+                  <a:ea typeface="標楷體" panose="03000509000000000000" pitchFamily="65" charset="-120"/>
+                </a:rPr>
+                <a:t>1.2</a:t>
+              </a:r>
+              <a:r>
+                <a:rPr lang="zh-TW" altLang="en-US" b="1" dirty="0">
+                  <a:solidFill>
+                    <a:schemeClr val="bg1"/>
+                  </a:solidFill>
+                  <a:latin typeface="標楷體" panose="03000509000000000000" pitchFamily="65" charset="-120"/>
+                  <a:ea typeface="標楷體" panose="03000509000000000000" pitchFamily="65" charset="-120"/>
+                </a:rPr>
+                <a:t> </a:t>
+              </a:r>
+              <a:r>
+                <a:rPr lang="en-US" altLang="zh-TW" b="1" dirty="0">
+                  <a:solidFill>
+                    <a:schemeClr val="bg1"/>
+                  </a:solidFill>
+                  <a:latin typeface="標楷體" panose="03000509000000000000" pitchFamily="65" charset="-120"/>
+                  <a:ea typeface="標楷體" panose="03000509000000000000" pitchFamily="65" charset="-120"/>
+                </a:rPr>
+                <a:t>/</a:t>
+              </a:r>
+              <a:r>
+                <a:rPr lang="zh-TW" altLang="en-US" b="1" dirty="0">
+                  <a:solidFill>
+                    <a:schemeClr val="bg1"/>
+                  </a:solidFill>
+                  <a:latin typeface="標楷體" panose="03000509000000000000" pitchFamily="65" charset="-120"/>
+                  <a:ea typeface="標楷體" panose="03000509000000000000" pitchFamily="65" charset="-120"/>
+                </a:rPr>
+                <a:t> </a:t>
+              </a:r>
+              <a:r>
+                <a:rPr lang="en-US" altLang="zh-TW" b="1" dirty="0">
+                  <a:solidFill>
+                    <a:schemeClr val="bg1"/>
+                  </a:solidFill>
+                  <a:latin typeface="標楷體" panose="03000509000000000000" pitchFamily="65" charset="-120"/>
+                  <a:ea typeface="標楷體" panose="03000509000000000000" pitchFamily="65" charset="-120"/>
+                </a:rPr>
+                <a:t>Level)</a:t>
+              </a:r>
+            </a:p>
+            <a:p>
+              <a:r>
+                <a:rPr lang="zh-TW" altLang="en-US" b="1" dirty="0">
+                  <a:solidFill>
+                    <a:schemeClr val="bg1"/>
+                  </a:solidFill>
+                  <a:latin typeface="標楷體" panose="03000509000000000000" pitchFamily="65" charset="-120"/>
+                  <a:ea typeface="標楷體" panose="03000509000000000000" pitchFamily="65" charset="-120"/>
+                </a:rPr>
+                <a:t>範圍： </a:t>
+              </a:r>
+              <a:r>
+                <a:rPr lang="en-US" altLang="zh-TW" b="1" dirty="0">
+                  <a:solidFill>
+                    <a:schemeClr val="bg1"/>
+                  </a:solidFill>
+                  <a:latin typeface="標楷體" panose="03000509000000000000" pitchFamily="65" charset="-120"/>
+                  <a:ea typeface="標楷體" panose="03000509000000000000" pitchFamily="65" charset="-120"/>
+                </a:rPr>
+                <a:t>2</a:t>
+              </a:r>
+            </a:p>
+          </p:txBody>
+        </p:sp>
+        <p:sp>
+          <p:nvSpPr>
+            <p:cNvPr id="20" name="文字方塊 19">
+              <a:extLst>
+                <a:ext uri="{FF2B5EF4-FFF2-40B4-BE49-F238E27FC236}">
+                  <a16:creationId xmlns:a16="http://schemas.microsoft.com/office/drawing/2014/main" id="{9D0B2A3F-967D-4C36-821E-24F1BD5A678A}"/>
+                </a:ext>
+              </a:extLst>
+            </p:cNvPr>
+            <p:cNvSpPr txBox="1"/>
+            <p:nvPr/>
+          </p:nvSpPr>
+          <p:spPr>
+            <a:xfrm>
+              <a:off x="4536596" y="1496814"/>
+              <a:ext cx="3397885" cy="923330"/>
+            </a:xfrm>
+            <a:prstGeom prst="rect">
+              <a:avLst/>
+            </a:prstGeom>
+            <a:noFill/>
+          </p:spPr>
+          <p:txBody>
+            <a:bodyPr wrap="square">
+              <a:spAutoFit/>
+            </a:bodyPr>
+            <a:lstStyle/>
+            <a:p>
+              <a:r>
+                <a:rPr lang="zh-TW" altLang="en-US" b="1" dirty="0">
+                  <a:solidFill>
+                    <a:schemeClr val="bg1"/>
+                  </a:solidFill>
+                  <a:latin typeface="標楷體" panose="03000509000000000000" pitchFamily="65" charset="-120"/>
+                  <a:ea typeface="標楷體" panose="03000509000000000000" pitchFamily="65" charset="-120"/>
+                </a:rPr>
+                <a:t>攻擊力：</a:t>
+              </a:r>
+              <a:r>
+                <a:rPr lang="en-US" altLang="zh-TW" b="1" dirty="0">
+                  <a:solidFill>
+                    <a:schemeClr val="bg1"/>
+                  </a:solidFill>
+                  <a:latin typeface="標楷體" panose="03000509000000000000" pitchFamily="65" charset="-120"/>
+                  <a:ea typeface="標楷體" panose="03000509000000000000" pitchFamily="65" charset="-120"/>
+                </a:rPr>
+                <a:t>25</a:t>
+              </a:r>
+              <a:r>
+                <a:rPr lang="zh-TW" altLang="en-US" b="1" dirty="0">
+                  <a:solidFill>
+                    <a:schemeClr val="bg1"/>
+                  </a:solidFill>
+                  <a:latin typeface="標楷體" panose="03000509000000000000" pitchFamily="65" charset="-120"/>
+                  <a:ea typeface="標楷體" panose="03000509000000000000" pitchFamily="65" charset="-120"/>
+                </a:rPr>
+                <a:t> </a:t>
+              </a:r>
+              <a:r>
+                <a:rPr lang="en-US" altLang="zh-TW" b="1" dirty="0">
+                  <a:solidFill>
+                    <a:schemeClr val="bg1"/>
+                  </a:solidFill>
+                  <a:latin typeface="標楷體" panose="03000509000000000000" pitchFamily="65" charset="-120"/>
+                  <a:ea typeface="標楷體" panose="03000509000000000000" pitchFamily="65" charset="-120"/>
+                </a:rPr>
+                <a:t>(+15</a:t>
+              </a:r>
+              <a:r>
+                <a:rPr lang="zh-TW" altLang="en-US" b="1" dirty="0">
+                  <a:solidFill>
+                    <a:schemeClr val="bg1"/>
+                  </a:solidFill>
+                  <a:latin typeface="標楷體" panose="03000509000000000000" pitchFamily="65" charset="-120"/>
+                  <a:ea typeface="標楷體" panose="03000509000000000000" pitchFamily="65" charset="-120"/>
+                </a:rPr>
+                <a:t> </a:t>
+              </a:r>
+              <a:r>
+                <a:rPr lang="en-US" altLang="zh-TW" b="1" dirty="0">
+                  <a:solidFill>
+                    <a:schemeClr val="bg1"/>
+                  </a:solidFill>
+                  <a:latin typeface="標楷體" panose="03000509000000000000" pitchFamily="65" charset="-120"/>
+                  <a:ea typeface="標楷體" panose="03000509000000000000" pitchFamily="65" charset="-120"/>
+                </a:rPr>
+                <a:t>/</a:t>
+              </a:r>
+              <a:r>
+                <a:rPr lang="zh-TW" altLang="en-US" b="1" dirty="0">
+                  <a:solidFill>
+                    <a:schemeClr val="bg1"/>
+                  </a:solidFill>
+                  <a:latin typeface="標楷體" panose="03000509000000000000" pitchFamily="65" charset="-120"/>
+                  <a:ea typeface="標楷體" panose="03000509000000000000" pitchFamily="65" charset="-120"/>
+                </a:rPr>
+                <a:t> </a:t>
+              </a:r>
+              <a:r>
+                <a:rPr lang="en-US" altLang="zh-TW" b="1" dirty="0">
+                  <a:solidFill>
+                    <a:schemeClr val="bg1"/>
+                  </a:solidFill>
+                  <a:latin typeface="標楷體" panose="03000509000000000000" pitchFamily="65" charset="-120"/>
+                  <a:ea typeface="標楷體" panose="03000509000000000000" pitchFamily="65" charset="-120"/>
+                </a:rPr>
+                <a:t>Level)</a:t>
+              </a:r>
+            </a:p>
+            <a:p>
+              <a:r>
+                <a:rPr lang="zh-TW" altLang="en-US" b="1" dirty="0">
+                  <a:solidFill>
+                    <a:schemeClr val="bg1"/>
+                  </a:solidFill>
+                  <a:latin typeface="標楷體" panose="03000509000000000000" pitchFamily="65" charset="-120"/>
+                  <a:ea typeface="標楷體" panose="03000509000000000000" pitchFamily="65" charset="-120"/>
+                </a:rPr>
+                <a:t>攻擊速度：</a:t>
+              </a:r>
+              <a:r>
+                <a:rPr lang="en-US" altLang="zh-TW" b="1" dirty="0">
+                  <a:solidFill>
+                    <a:schemeClr val="bg1"/>
+                  </a:solidFill>
+                  <a:latin typeface="標楷體" panose="03000509000000000000" pitchFamily="65" charset="-120"/>
+                  <a:ea typeface="標楷體" panose="03000509000000000000" pitchFamily="65" charset="-120"/>
+                </a:rPr>
+                <a:t> 0.5(</a:t>
+              </a:r>
+              <a:r>
+                <a:rPr lang="zh-TW" altLang="en-US" b="1" dirty="0">
+                  <a:solidFill>
+                    <a:schemeClr val="bg1"/>
+                  </a:solidFill>
+                  <a:latin typeface="標楷體" panose="03000509000000000000" pitchFamily="65" charset="-120"/>
+                  <a:ea typeface="標楷體" panose="03000509000000000000" pitchFamily="65" charset="-120"/>
+                </a:rPr>
+                <a:t>*</a:t>
+              </a:r>
+              <a:r>
+                <a:rPr lang="en-US" altLang="zh-TW" b="1" dirty="0">
+                  <a:solidFill>
+                    <a:schemeClr val="bg1"/>
+                  </a:solidFill>
+                  <a:latin typeface="標楷體" panose="03000509000000000000" pitchFamily="65" charset="-120"/>
+                  <a:ea typeface="標楷體" panose="03000509000000000000" pitchFamily="65" charset="-120"/>
+                </a:rPr>
+                <a:t>1.1</a:t>
+              </a:r>
+              <a:r>
+                <a:rPr lang="zh-TW" altLang="en-US" b="1" dirty="0">
+                  <a:solidFill>
+                    <a:schemeClr val="bg1"/>
+                  </a:solidFill>
+                  <a:latin typeface="標楷體" panose="03000509000000000000" pitchFamily="65" charset="-120"/>
+                  <a:ea typeface="標楷體" panose="03000509000000000000" pitchFamily="65" charset="-120"/>
+                </a:rPr>
+                <a:t> </a:t>
+              </a:r>
+              <a:r>
+                <a:rPr lang="en-US" altLang="zh-TW" b="1" dirty="0">
+                  <a:solidFill>
+                    <a:schemeClr val="bg1"/>
+                  </a:solidFill>
+                  <a:latin typeface="標楷體" panose="03000509000000000000" pitchFamily="65" charset="-120"/>
+                  <a:ea typeface="標楷體" panose="03000509000000000000" pitchFamily="65" charset="-120"/>
+                </a:rPr>
+                <a:t>/</a:t>
+              </a:r>
+              <a:r>
+                <a:rPr lang="zh-TW" altLang="en-US" b="1" dirty="0">
+                  <a:solidFill>
+                    <a:schemeClr val="bg1"/>
+                  </a:solidFill>
+                  <a:latin typeface="標楷體" panose="03000509000000000000" pitchFamily="65" charset="-120"/>
+                  <a:ea typeface="標楷體" panose="03000509000000000000" pitchFamily="65" charset="-120"/>
+                </a:rPr>
+                <a:t> </a:t>
+              </a:r>
+              <a:r>
+                <a:rPr lang="en-US" altLang="zh-TW" b="1" dirty="0">
+                  <a:solidFill>
+                    <a:schemeClr val="bg1"/>
+                  </a:solidFill>
+                  <a:latin typeface="標楷體" panose="03000509000000000000" pitchFamily="65" charset="-120"/>
+                  <a:ea typeface="標楷體" panose="03000509000000000000" pitchFamily="65" charset="-120"/>
+                </a:rPr>
+                <a:t>Level)</a:t>
+              </a:r>
+            </a:p>
+            <a:p>
+              <a:r>
+                <a:rPr lang="zh-TW" altLang="en-US" b="1" dirty="0">
+                  <a:solidFill>
+                    <a:schemeClr val="bg1"/>
+                  </a:solidFill>
+                  <a:latin typeface="標楷體" panose="03000509000000000000" pitchFamily="65" charset="-120"/>
+                  <a:ea typeface="標楷體" panose="03000509000000000000" pitchFamily="65" charset="-120"/>
+                </a:rPr>
+                <a:t>範圍： </a:t>
+              </a:r>
+              <a:r>
+                <a:rPr lang="en-US" altLang="zh-TW" b="1" dirty="0">
+                  <a:solidFill>
+                    <a:schemeClr val="bg1"/>
+                  </a:solidFill>
+                  <a:latin typeface="標楷體" panose="03000509000000000000" pitchFamily="65" charset="-120"/>
+                  <a:ea typeface="標楷體" panose="03000509000000000000" pitchFamily="65" charset="-120"/>
+                </a:rPr>
+                <a:t>3</a:t>
+              </a:r>
+            </a:p>
+          </p:txBody>
+        </p:sp>
+        <p:sp>
+          <p:nvSpPr>
+            <p:cNvPr id="21" name="文字方塊 20">
+              <a:extLst>
+                <a:ext uri="{FF2B5EF4-FFF2-40B4-BE49-F238E27FC236}">
+                  <a16:creationId xmlns:a16="http://schemas.microsoft.com/office/drawing/2014/main" id="{DE5F96ED-53C7-4FA3-853A-9FE1D95B17FC}"/>
+                </a:ext>
+              </a:extLst>
+            </p:cNvPr>
+            <p:cNvSpPr txBox="1"/>
+            <p:nvPr/>
+          </p:nvSpPr>
+          <p:spPr>
+            <a:xfrm>
+              <a:off x="4536596" y="3849547"/>
+              <a:ext cx="3397885" cy="923330"/>
+            </a:xfrm>
+            <a:prstGeom prst="rect">
+              <a:avLst/>
+            </a:prstGeom>
+            <a:noFill/>
+          </p:spPr>
+          <p:txBody>
+            <a:bodyPr wrap="square">
+              <a:spAutoFit/>
+            </a:bodyPr>
+            <a:lstStyle/>
+            <a:p>
+              <a:r>
+                <a:rPr lang="zh-TW" altLang="en-US" b="1" dirty="0">
+                  <a:solidFill>
+                    <a:schemeClr val="bg1"/>
+                  </a:solidFill>
+                  <a:latin typeface="標楷體" panose="03000509000000000000" pitchFamily="65" charset="-120"/>
+                  <a:ea typeface="標楷體" panose="03000509000000000000" pitchFamily="65" charset="-120"/>
+                </a:rPr>
+                <a:t>獲得金幣：</a:t>
+              </a:r>
+              <a:r>
+                <a:rPr lang="en-US" altLang="zh-TW" b="1" dirty="0">
+                  <a:solidFill>
+                    <a:schemeClr val="bg1"/>
+                  </a:solidFill>
+                  <a:latin typeface="標楷體" panose="03000509000000000000" pitchFamily="65" charset="-120"/>
+                  <a:ea typeface="標楷體" panose="03000509000000000000" pitchFamily="65" charset="-120"/>
+                </a:rPr>
+                <a:t>10</a:t>
+              </a:r>
+              <a:r>
+                <a:rPr lang="zh-TW" altLang="en-US" b="1" dirty="0">
+                  <a:solidFill>
+                    <a:schemeClr val="bg1"/>
+                  </a:solidFill>
+                  <a:latin typeface="標楷體" panose="03000509000000000000" pitchFamily="65" charset="-120"/>
+                  <a:ea typeface="標楷體" panose="03000509000000000000" pitchFamily="65" charset="-120"/>
+                </a:rPr>
+                <a:t> </a:t>
+              </a:r>
+              <a:r>
+                <a:rPr lang="en-US" altLang="zh-TW" b="1" dirty="0">
+                  <a:solidFill>
+                    <a:schemeClr val="bg1"/>
+                  </a:solidFill>
+                  <a:latin typeface="標楷體" panose="03000509000000000000" pitchFamily="65" charset="-120"/>
+                  <a:ea typeface="標楷體" panose="03000509000000000000" pitchFamily="65" charset="-120"/>
+                </a:rPr>
+                <a:t>(+5</a:t>
+              </a:r>
+              <a:r>
+                <a:rPr lang="zh-TW" altLang="en-US" b="1" dirty="0">
+                  <a:solidFill>
+                    <a:schemeClr val="bg1"/>
+                  </a:solidFill>
+                  <a:latin typeface="標楷體" panose="03000509000000000000" pitchFamily="65" charset="-120"/>
+                  <a:ea typeface="標楷體" panose="03000509000000000000" pitchFamily="65" charset="-120"/>
+                </a:rPr>
+                <a:t> </a:t>
+              </a:r>
+              <a:r>
+                <a:rPr lang="en-US" altLang="zh-TW" b="1" dirty="0">
+                  <a:solidFill>
+                    <a:schemeClr val="bg1"/>
+                  </a:solidFill>
+                  <a:latin typeface="標楷體" panose="03000509000000000000" pitchFamily="65" charset="-120"/>
+                  <a:ea typeface="標楷體" panose="03000509000000000000" pitchFamily="65" charset="-120"/>
+                </a:rPr>
+                <a:t>/</a:t>
+              </a:r>
+              <a:r>
+                <a:rPr lang="zh-TW" altLang="en-US" b="1" dirty="0">
+                  <a:solidFill>
+                    <a:schemeClr val="bg1"/>
+                  </a:solidFill>
+                  <a:latin typeface="標楷體" panose="03000509000000000000" pitchFamily="65" charset="-120"/>
+                  <a:ea typeface="標楷體" panose="03000509000000000000" pitchFamily="65" charset="-120"/>
+                </a:rPr>
+                <a:t> </a:t>
+              </a:r>
+              <a:r>
+                <a:rPr lang="en-US" altLang="zh-TW" b="1" dirty="0">
+                  <a:solidFill>
+                    <a:schemeClr val="bg1"/>
+                  </a:solidFill>
+                  <a:latin typeface="標楷體" panose="03000509000000000000" pitchFamily="65" charset="-120"/>
+                  <a:ea typeface="標楷體" panose="03000509000000000000" pitchFamily="65" charset="-120"/>
+                </a:rPr>
+                <a:t>Level)</a:t>
+              </a:r>
+            </a:p>
+            <a:p>
+              <a:r>
+                <a:rPr lang="zh-TW" altLang="en-US" b="1" dirty="0">
+                  <a:solidFill>
+                    <a:schemeClr val="bg1"/>
+                  </a:solidFill>
+                  <a:latin typeface="標楷體" panose="03000509000000000000" pitchFamily="65" charset="-120"/>
+                  <a:ea typeface="標楷體" panose="03000509000000000000" pitchFamily="65" charset="-120"/>
+                </a:rPr>
+                <a:t>攻擊速度：</a:t>
+              </a:r>
+              <a:r>
+                <a:rPr lang="en-US" altLang="zh-TW" b="1" dirty="0">
+                  <a:solidFill>
+                    <a:schemeClr val="bg1"/>
+                  </a:solidFill>
+                  <a:latin typeface="標楷體" panose="03000509000000000000" pitchFamily="65" charset="-120"/>
+                  <a:ea typeface="標楷體" panose="03000509000000000000" pitchFamily="65" charset="-120"/>
+                </a:rPr>
+                <a:t> 0.5(</a:t>
+              </a:r>
+              <a:r>
+                <a:rPr lang="zh-TW" altLang="en-US" b="1" dirty="0">
+                  <a:solidFill>
+                    <a:schemeClr val="bg1"/>
+                  </a:solidFill>
+                  <a:latin typeface="標楷體" panose="03000509000000000000" pitchFamily="65" charset="-120"/>
+                  <a:ea typeface="標楷體" panose="03000509000000000000" pitchFamily="65" charset="-120"/>
+                </a:rPr>
+                <a:t>*</a:t>
+              </a:r>
+              <a:r>
+                <a:rPr lang="en-US" altLang="zh-TW" b="1" dirty="0">
+                  <a:solidFill>
+                    <a:schemeClr val="bg1"/>
+                  </a:solidFill>
+                  <a:latin typeface="標楷體" panose="03000509000000000000" pitchFamily="65" charset="-120"/>
+                  <a:ea typeface="標楷體" panose="03000509000000000000" pitchFamily="65" charset="-120"/>
+                </a:rPr>
+                <a:t>1.2</a:t>
+              </a:r>
+              <a:r>
+                <a:rPr lang="zh-TW" altLang="en-US" b="1" dirty="0">
+                  <a:solidFill>
+                    <a:schemeClr val="bg1"/>
+                  </a:solidFill>
+                  <a:latin typeface="標楷體" panose="03000509000000000000" pitchFamily="65" charset="-120"/>
+                  <a:ea typeface="標楷體" panose="03000509000000000000" pitchFamily="65" charset="-120"/>
+                </a:rPr>
+                <a:t> </a:t>
+              </a:r>
+              <a:r>
+                <a:rPr lang="en-US" altLang="zh-TW" b="1" dirty="0">
+                  <a:solidFill>
+                    <a:schemeClr val="bg1"/>
+                  </a:solidFill>
+                  <a:latin typeface="標楷體" panose="03000509000000000000" pitchFamily="65" charset="-120"/>
+                  <a:ea typeface="標楷體" panose="03000509000000000000" pitchFamily="65" charset="-120"/>
+                </a:rPr>
+                <a:t>/</a:t>
+              </a:r>
+              <a:r>
+                <a:rPr lang="zh-TW" altLang="en-US" b="1" dirty="0">
+                  <a:solidFill>
+                    <a:schemeClr val="bg1"/>
+                  </a:solidFill>
+                  <a:latin typeface="標楷體" panose="03000509000000000000" pitchFamily="65" charset="-120"/>
+                  <a:ea typeface="標楷體" panose="03000509000000000000" pitchFamily="65" charset="-120"/>
+                </a:rPr>
+                <a:t> </a:t>
+              </a:r>
+              <a:r>
+                <a:rPr lang="en-US" altLang="zh-TW" b="1" dirty="0">
+                  <a:solidFill>
+                    <a:schemeClr val="bg1"/>
+                  </a:solidFill>
+                  <a:latin typeface="標楷體" panose="03000509000000000000" pitchFamily="65" charset="-120"/>
+                  <a:ea typeface="標楷體" panose="03000509000000000000" pitchFamily="65" charset="-120"/>
+                </a:rPr>
+                <a:t>Level)</a:t>
+              </a:r>
+            </a:p>
+            <a:p>
+              <a:r>
+                <a:rPr lang="zh-TW" altLang="en-US" b="1" dirty="0">
+                  <a:solidFill>
+                    <a:schemeClr val="bg1"/>
+                  </a:solidFill>
+                  <a:latin typeface="標楷體" panose="03000509000000000000" pitchFamily="65" charset="-120"/>
+                  <a:ea typeface="標楷體" panose="03000509000000000000" pitchFamily="65" charset="-120"/>
+                </a:rPr>
+                <a:t>範圍： </a:t>
+              </a:r>
+              <a:r>
+                <a:rPr lang="en-US" altLang="zh-TW" b="1" dirty="0">
+                  <a:solidFill>
+                    <a:schemeClr val="bg1"/>
+                  </a:solidFill>
+                  <a:latin typeface="標楷體" panose="03000509000000000000" pitchFamily="65" charset="-120"/>
+                  <a:ea typeface="標楷體" panose="03000509000000000000" pitchFamily="65" charset="-120"/>
+                </a:rPr>
+                <a:t>0</a:t>
+              </a:r>
+            </a:p>
+          </p:txBody>
+        </p:sp>
+      </p:grpSp>
+    </p:spTree>
+    <p:extLst>
+      <p:ext uri="{BB962C8B-B14F-4D97-AF65-F5344CB8AC3E}">
+        <p14:creationId xmlns:p14="http://schemas.microsoft.com/office/powerpoint/2010/main" val="1045354091"/>
+      </p:ext>
+    </p:extLst>
+  </p:cSld>
+  <p:clrMapOvr>
+    <a:masterClrMapping/>
+  </p:clrMapOvr>
+</p:sld>
+</file>
+
+<file path=ppt/slides/slide3.xml><?xml version="1.0" encoding="utf-8"?>
+<p:sld xmlns:a="http://schemas.openxmlformats.org/drawingml/2006/main" xmlns:r="http://schemas.openxmlformats.org/officeDocument/2006/relationships" xmlns:p="http://schemas.openxmlformats.org/presentationml/2006/main">
+  <p:cSld>
+    <p:spTree>
+      <p:nvGrpSpPr>
+        <p:cNvPr id="1" name=""/>
+        <p:cNvGrpSpPr/>
+        <p:nvPr/>
+      </p:nvGrpSpPr>
+      <p:grpSpPr>
+        <a:xfrm>
+          <a:off x="0" y="0"/>
+          <a:ext cx="0" cy="0"/>
+          <a:chOff x="0" y="0"/>
+          <a:chExt cx="0" cy="0"/>
+        </a:xfrm>
+      </p:grpSpPr>
+      <p:grpSp>
+        <p:nvGrpSpPr>
+          <p:cNvPr id="38" name="群組 37">
+            <a:extLst>
+              <a:ext uri="{FF2B5EF4-FFF2-40B4-BE49-F238E27FC236}">
+                <a16:creationId xmlns:a16="http://schemas.microsoft.com/office/drawing/2014/main" id="{1926F84C-534D-4536-9EDF-94544CB3C8C2}"/>
+              </a:ext>
+            </a:extLst>
+          </p:cNvPr>
+          <p:cNvGrpSpPr/>
           <p:nvPr/>
-        </p:nvPicPr>
-        <p:blipFill>
-          <a:blip r:embed="rId2">
-            <a:extLst>
-              <a:ext uri="{28A0092B-C50C-407E-A947-70E740481C1C}">
-                <a14:useLocalDpi xmlns:a14="http://schemas.microsoft.com/office/drawing/2010/main" val="0"/>
-              </a:ext>
-            </a:extLst>
-          </a:blip>
-          <a:stretch>
-            <a:fillRect/>
-          </a:stretch>
-        </p:blipFill>
-        <p:spPr>
+        </p:nvGrpSpPr>
+        <p:grpSpPr>
           <a:xfrm>
-            <a:off x="4480239" y="662299"/>
-            <a:ext cx="746760" cy="746760"/>
+            <a:off x="660400" y="518023"/>
+            <a:ext cx="10871200" cy="5816600"/>
+            <a:chOff x="660400" y="518023"/>
+            <a:chExt cx="10871200" cy="5816600"/>
           </a:xfrm>
-          <a:prstGeom prst="rect">
-            <a:avLst/>
-          </a:prstGeom>
-        </p:spPr>
-      </p:pic>
-      <p:pic>
-        <p:nvPicPr>
-          <p:cNvPr id="12" name="圖片 11">
-            <a:extLst>
-              <a:ext uri="{FF2B5EF4-FFF2-40B4-BE49-F238E27FC236}">
-                <a16:creationId xmlns:a16="http://schemas.microsoft.com/office/drawing/2014/main" id="{E2F9DBE3-8549-4A0F-B26D-7013A4EFD728}"/>
-              </a:ext>
-            </a:extLst>
-          </p:cNvPr>
-          <p:cNvPicPr>
-            <a:picLocks noChangeAspect="1"/>
-          </p:cNvPicPr>
-          <p:nvPr/>
-        </p:nvPicPr>
-        <p:blipFill>
-          <a:blip r:embed="rId3">
-            <a:extLst>
-              <a:ext uri="{28A0092B-C50C-407E-A947-70E740481C1C}">
-                <a14:useLocalDpi xmlns:a14="http://schemas.microsoft.com/office/drawing/2010/main" val="0"/>
-              </a:ext>
-            </a:extLst>
-          </a:blip>
-          <a:stretch>
-            <a:fillRect/>
-          </a:stretch>
-        </p:blipFill>
-        <p:spPr>
-          <a:xfrm>
-            <a:off x="4536596" y="3144383"/>
-            <a:ext cx="596900" cy="596900"/>
-          </a:xfrm>
-          <a:prstGeom prst="rect">
-            <a:avLst/>
-          </a:prstGeom>
-        </p:spPr>
-      </p:pic>
-      <p:pic>
-        <p:nvPicPr>
-          <p:cNvPr id="14" name="圖片 13">
-            <a:extLst>
-              <a:ext uri="{FF2B5EF4-FFF2-40B4-BE49-F238E27FC236}">
-                <a16:creationId xmlns:a16="http://schemas.microsoft.com/office/drawing/2014/main" id="{6E9D6772-481C-49E7-B593-7EDDB47823AA}"/>
-              </a:ext>
-            </a:extLst>
-          </p:cNvPr>
-          <p:cNvPicPr>
-            <a:picLocks noChangeAspect="1"/>
-          </p:cNvPicPr>
-          <p:nvPr/>
-        </p:nvPicPr>
-        <p:blipFill>
-          <a:blip r:embed="rId4">
-            <a:extLst>
-              <a:ext uri="{28A0092B-C50C-407E-A947-70E740481C1C}">
-                <a14:useLocalDpi xmlns:a14="http://schemas.microsoft.com/office/drawing/2010/main" val="0"/>
-              </a:ext>
-            </a:extLst>
-          </a:blip>
-          <a:stretch>
-            <a:fillRect/>
-          </a:stretch>
-        </p:blipFill>
-        <p:spPr>
-          <a:xfrm>
-            <a:off x="1045210" y="3114318"/>
-            <a:ext cx="807720" cy="807720"/>
-          </a:xfrm>
-          <a:prstGeom prst="rect">
-            <a:avLst/>
-          </a:prstGeom>
-        </p:spPr>
-      </p:pic>
-      <p:pic>
-        <p:nvPicPr>
-          <p:cNvPr id="16" name="圖片 15">
-            <a:extLst>
-              <a:ext uri="{FF2B5EF4-FFF2-40B4-BE49-F238E27FC236}">
-                <a16:creationId xmlns:a16="http://schemas.microsoft.com/office/drawing/2014/main" id="{5544E5BA-41C8-48AC-BF3B-DB9CA330BEFE}"/>
-              </a:ext>
-            </a:extLst>
-          </p:cNvPr>
-          <p:cNvPicPr>
-            <a:picLocks noChangeAspect="1"/>
-          </p:cNvPicPr>
-          <p:nvPr/>
-        </p:nvPicPr>
-        <p:blipFill>
-          <a:blip r:embed="rId5">
-            <a:extLst>
-              <a:ext uri="{28A0092B-C50C-407E-A947-70E740481C1C}">
-                <a14:useLocalDpi xmlns:a14="http://schemas.microsoft.com/office/drawing/2010/main" val="0"/>
-              </a:ext>
-            </a:extLst>
-          </a:blip>
-          <a:stretch>
-            <a:fillRect/>
-          </a:stretch>
-        </p:blipFill>
-        <p:spPr>
-          <a:xfrm>
-            <a:off x="1181100" y="737229"/>
-            <a:ext cx="671830" cy="671830"/>
-          </a:xfrm>
-          <a:prstGeom prst="rect">
-            <a:avLst/>
-          </a:prstGeom>
-        </p:spPr>
-      </p:pic>
-      <p:sp>
-        <p:nvSpPr>
-          <p:cNvPr id="18" name="文字方塊 17">
-            <a:extLst>
-              <a:ext uri="{FF2B5EF4-FFF2-40B4-BE49-F238E27FC236}">
-                <a16:creationId xmlns:a16="http://schemas.microsoft.com/office/drawing/2014/main" id="{89C545A7-7871-4B4F-9B6A-4A462BE791FF}"/>
-              </a:ext>
-            </a:extLst>
-          </p:cNvPr>
-          <p:cNvSpPr txBox="1"/>
-          <p:nvPr/>
-        </p:nvSpPr>
-        <p:spPr>
-          <a:xfrm>
-            <a:off x="798194" y="1618734"/>
-            <a:ext cx="3397885" cy="923330"/>
-          </a:xfrm>
-          <a:prstGeom prst="rect">
-            <a:avLst/>
-          </a:prstGeom>
-          <a:noFill/>
-        </p:spPr>
-        <p:txBody>
-          <a:bodyPr wrap="square">
-            <a:spAutoFit/>
-          </a:bodyPr>
-          <a:lstStyle/>
-          <a:p>
-            <a:r>
-              <a:rPr lang="zh-TW" altLang="en-US" b="1" dirty="0">
+        </p:grpSpPr>
+        <p:sp>
+          <p:nvSpPr>
+            <p:cNvPr id="15" name="矩形 14">
+              <a:extLst>
+                <a:ext uri="{FF2B5EF4-FFF2-40B4-BE49-F238E27FC236}">
+                  <a16:creationId xmlns:a16="http://schemas.microsoft.com/office/drawing/2014/main" id="{713268FF-5E3D-4891-AFB0-FF80A27E6BA0}"/>
+                </a:ext>
+              </a:extLst>
+            </p:cNvPr>
+            <p:cNvSpPr/>
+            <p:nvPr/>
+          </p:nvSpPr>
+          <p:spPr>
+            <a:xfrm>
+              <a:off x="660400" y="518023"/>
+              <a:ext cx="10871200" cy="5816600"/>
+            </a:xfrm>
+            <a:prstGeom prst="rect">
+              <a:avLst/>
+            </a:prstGeom>
+          </p:spPr>
+          <p:style>
+            <a:lnRef idx="2">
+              <a:schemeClr val="dk1">
+                <a:shade val="50000"/>
+              </a:schemeClr>
+            </a:lnRef>
+            <a:fillRef idx="1">
+              <a:schemeClr val="dk1"/>
+            </a:fillRef>
+            <a:effectRef idx="0">
+              <a:schemeClr val="dk1"/>
+            </a:effectRef>
+            <a:fontRef idx="minor">
+              <a:schemeClr val="lt1"/>
+            </a:fontRef>
+          </p:style>
+          <p:txBody>
+            <a:bodyPr rtlCol="0" anchor="ctr"/>
+            <a:lstStyle/>
+            <a:p>
+              <a:pPr algn="ctr"/>
+              <a:endParaRPr lang="zh-TW" altLang="en-US" dirty="0"/>
+            </a:p>
+          </p:txBody>
+        </p:sp>
+        <p:pic>
+          <p:nvPicPr>
+            <p:cNvPr id="25" name="圖片 24">
+              <a:extLst>
+                <a:ext uri="{FF2B5EF4-FFF2-40B4-BE49-F238E27FC236}">
+                  <a16:creationId xmlns:a16="http://schemas.microsoft.com/office/drawing/2014/main" id="{AF787D88-C4F0-4904-A6E0-31C0342AAD12}"/>
+                </a:ext>
+              </a:extLst>
+            </p:cNvPr>
+            <p:cNvPicPr>
+              <a:picLocks noChangeAspect="1"/>
+            </p:cNvPicPr>
+            <p:nvPr/>
+          </p:nvPicPr>
+          <p:blipFill>
+            <a:blip r:embed="rId2"/>
+            <a:stretch>
+              <a:fillRect/>
+            </a:stretch>
+          </p:blipFill>
+          <p:spPr>
+            <a:xfrm>
+              <a:off x="6096000" y="720369"/>
+              <a:ext cx="2555779" cy="2482055"/>
+            </a:xfrm>
+            <a:prstGeom prst="rect">
+              <a:avLst/>
+            </a:prstGeom>
+          </p:spPr>
+        </p:pic>
+        <p:pic>
+          <p:nvPicPr>
+            <p:cNvPr id="27" name="圖片 26">
+              <a:extLst>
+                <a:ext uri="{FF2B5EF4-FFF2-40B4-BE49-F238E27FC236}">
+                  <a16:creationId xmlns:a16="http://schemas.microsoft.com/office/drawing/2014/main" id="{E4BBF0F3-E1DA-4CE9-BD1A-80EBF9A78A0D}"/>
+                </a:ext>
+              </a:extLst>
+            </p:cNvPr>
+            <p:cNvPicPr>
+              <a:picLocks noChangeAspect="1"/>
+            </p:cNvPicPr>
+            <p:nvPr/>
+          </p:nvPicPr>
+          <p:blipFill>
+            <a:blip r:embed="rId3"/>
+            <a:stretch>
+              <a:fillRect/>
+            </a:stretch>
+          </p:blipFill>
+          <p:spPr>
+            <a:xfrm>
+              <a:off x="1154781" y="825057"/>
+              <a:ext cx="1894302" cy="2037024"/>
+            </a:xfrm>
+            <a:prstGeom prst="rect">
+              <a:avLst/>
+            </a:prstGeom>
+          </p:spPr>
+        </p:pic>
+        <p:sp>
+          <p:nvSpPr>
+            <p:cNvPr id="28" name="文字方塊 27">
+              <a:extLst>
+                <a:ext uri="{FF2B5EF4-FFF2-40B4-BE49-F238E27FC236}">
+                  <a16:creationId xmlns:a16="http://schemas.microsoft.com/office/drawing/2014/main" id="{9DDB7EEB-1B0E-4058-89E2-6725FA62A08E}"/>
+                </a:ext>
+              </a:extLst>
+            </p:cNvPr>
+            <p:cNvSpPr txBox="1"/>
+            <p:nvPr/>
+          </p:nvSpPr>
+          <p:spPr>
+            <a:xfrm>
+              <a:off x="874935" y="3257006"/>
+              <a:ext cx="4129406" cy="1200329"/>
+            </a:xfrm>
+            <a:prstGeom prst="rect">
+              <a:avLst/>
+            </a:prstGeom>
+            <a:noFill/>
+          </p:spPr>
+          <p:txBody>
+            <a:bodyPr wrap="square">
+              <a:spAutoFit/>
+            </a:bodyPr>
+            <a:lstStyle/>
+            <a:p>
+              <a:r>
+                <a:rPr lang="zh-TW" altLang="en-US" b="1" dirty="0">
+                  <a:solidFill>
+                    <a:schemeClr val="bg1"/>
+                  </a:solidFill>
+                  <a:latin typeface="標楷體" panose="03000509000000000000" pitchFamily="65" charset="-120"/>
+                  <a:ea typeface="標楷體" panose="03000509000000000000" pitchFamily="65" charset="-120"/>
+                </a:rPr>
+                <a:t>對守護者按滑鼠左鍵可以打開升級面板</a:t>
+              </a:r>
+              <a:endParaRPr lang="en-US" altLang="zh-TW" b="1" dirty="0">
                 <a:solidFill>
                   <a:schemeClr val="bg1"/>
                 </a:solidFill>
                 <a:latin typeface="標楷體" panose="03000509000000000000" pitchFamily="65" charset="-120"/>
                 <a:ea typeface="標楷體" panose="03000509000000000000" pitchFamily="65" charset="-120"/>
-              </a:rPr>
-              <a:t>攻擊力：</a:t>
-            </a:r>
-            <a:r>
-              <a:rPr lang="en-US" altLang="zh-TW" b="1" dirty="0">
+              </a:endParaRPr>
+            </a:p>
+            <a:p>
+              <a:r>
+                <a:rPr lang="zh-TW" altLang="en-US" b="1" dirty="0">
+                  <a:solidFill>
+                    <a:schemeClr val="bg1"/>
+                  </a:solidFill>
+                  <a:latin typeface="標楷體" panose="03000509000000000000" pitchFamily="65" charset="-120"/>
+                  <a:ea typeface="標楷體" panose="03000509000000000000" pitchFamily="65" charset="-120"/>
+                </a:rPr>
+                <a:t>箭頭按鍵可以升級</a:t>
+              </a:r>
+              <a:endParaRPr lang="en-US" altLang="zh-TW" b="1" dirty="0">
                 <a:solidFill>
                   <a:schemeClr val="bg1"/>
                 </a:solidFill>
                 <a:latin typeface="標楷體" panose="03000509000000000000" pitchFamily="65" charset="-120"/>
                 <a:ea typeface="標楷體" panose="03000509000000000000" pitchFamily="65" charset="-120"/>
-              </a:rPr>
-              <a:t>18</a:t>
-            </a:r>
-            <a:r>
-              <a:rPr lang="zh-TW" altLang="en-US" b="1" dirty="0">
+              </a:endParaRPr>
+            </a:p>
+            <a:p>
+              <a:r>
+                <a:rPr lang="zh-TW" altLang="en-US" b="1" dirty="0">
+                  <a:solidFill>
+                    <a:schemeClr val="bg1"/>
+                  </a:solidFill>
+                  <a:latin typeface="標楷體" panose="03000509000000000000" pitchFamily="65" charset="-120"/>
+                  <a:ea typeface="標楷體" panose="03000509000000000000" pitchFamily="65" charset="-120"/>
+                </a:rPr>
+                <a:t>數字為升級花費</a:t>
+              </a:r>
+              <a:r>
+                <a:rPr lang="en-US" altLang="zh-TW" b="1" dirty="0">
+                  <a:solidFill>
+                    <a:schemeClr val="bg1"/>
+                  </a:solidFill>
+                  <a:latin typeface="標楷體" panose="03000509000000000000" pitchFamily="65" charset="-120"/>
+                  <a:ea typeface="標楷體" panose="03000509000000000000" pitchFamily="65" charset="-120"/>
+                </a:rPr>
+                <a:t>(Level * 10)</a:t>
+              </a:r>
+            </a:p>
+            <a:p>
+              <a:r>
+                <a:rPr lang="zh-TW" altLang="en-US" b="1" dirty="0">
+                  <a:solidFill>
+                    <a:schemeClr val="bg1"/>
+                  </a:solidFill>
+                  <a:latin typeface="標楷體" panose="03000509000000000000" pitchFamily="65" charset="-120"/>
+                  <a:ea typeface="標楷體" panose="03000509000000000000" pitchFamily="65" charset="-120"/>
+                </a:rPr>
+                <a:t>下方為目前等級</a:t>
+              </a:r>
+              <a:r>
+                <a:rPr lang="en-US" altLang="zh-TW" b="1" dirty="0">
+                  <a:solidFill>
+                    <a:schemeClr val="bg1"/>
+                  </a:solidFill>
+                  <a:latin typeface="標楷體" panose="03000509000000000000" pitchFamily="65" charset="-120"/>
+                  <a:ea typeface="標楷體" panose="03000509000000000000" pitchFamily="65" charset="-120"/>
+                </a:rPr>
+                <a:t>(</a:t>
+              </a:r>
+              <a:r>
+                <a:rPr lang="en-US" altLang="zh-TW" b="1" dirty="0" err="1">
+                  <a:solidFill>
+                    <a:schemeClr val="bg1"/>
+                  </a:solidFill>
+                  <a:latin typeface="標楷體" panose="03000509000000000000" pitchFamily="65" charset="-120"/>
+                  <a:ea typeface="標楷體" panose="03000509000000000000" pitchFamily="65" charset="-120"/>
+                </a:rPr>
+                <a:t>Max.Lv</a:t>
+              </a:r>
+              <a:r>
+                <a:rPr lang="en-US" altLang="zh-TW" b="1" dirty="0">
+                  <a:solidFill>
+                    <a:schemeClr val="bg1"/>
+                  </a:solidFill>
+                  <a:latin typeface="標楷體" panose="03000509000000000000" pitchFamily="65" charset="-120"/>
+                  <a:ea typeface="標楷體" panose="03000509000000000000" pitchFamily="65" charset="-120"/>
+                </a:rPr>
+                <a:t> is Level 3)</a:t>
+              </a:r>
+            </a:p>
+          </p:txBody>
+        </p:sp>
+        <p:sp>
+          <p:nvSpPr>
+            <p:cNvPr id="29" name="文字方塊 28">
+              <a:extLst>
+                <a:ext uri="{FF2B5EF4-FFF2-40B4-BE49-F238E27FC236}">
+                  <a16:creationId xmlns:a16="http://schemas.microsoft.com/office/drawing/2014/main" id="{726F54E5-4B73-4859-99A0-07B46BD49989}"/>
+                </a:ext>
+              </a:extLst>
+            </p:cNvPr>
+            <p:cNvSpPr txBox="1"/>
+            <p:nvPr/>
+          </p:nvSpPr>
+          <p:spPr>
+            <a:xfrm>
+              <a:off x="6096000" y="3655577"/>
+              <a:ext cx="4348480" cy="369332"/>
+            </a:xfrm>
+            <a:prstGeom prst="rect">
+              <a:avLst/>
+            </a:prstGeom>
+            <a:noFill/>
+          </p:spPr>
+          <p:txBody>
+            <a:bodyPr wrap="square">
+              <a:spAutoFit/>
+            </a:bodyPr>
+            <a:lstStyle/>
+            <a:p>
+              <a:r>
+                <a:rPr lang="zh-TW" altLang="en-US" b="1" dirty="0">
+                  <a:solidFill>
+                    <a:schemeClr val="bg1"/>
+                  </a:solidFill>
+                  <a:latin typeface="標楷體" panose="03000509000000000000" pitchFamily="65" charset="-120"/>
+                  <a:ea typeface="標楷體" panose="03000509000000000000" pitchFamily="65" charset="-120"/>
+                </a:rPr>
+                <a:t>對守護者按住滑鼠右鍵可以查看攻擊範圍</a:t>
+              </a:r>
+              <a:endParaRPr lang="en-US" altLang="zh-TW" b="1" dirty="0">
                 <a:solidFill>
                   <a:schemeClr val="bg1"/>
                 </a:solidFill>
                 <a:latin typeface="標楷體" panose="03000509000000000000" pitchFamily="65" charset="-120"/>
                 <a:ea typeface="標楷體" panose="03000509000000000000" pitchFamily="65" charset="-120"/>
-              </a:rPr>
-              <a:t> </a:t>
-            </a:r>
-            <a:r>
-              <a:rPr lang="en-US" altLang="zh-TW" b="1" dirty="0">
+              </a:endParaRPr>
+            </a:p>
+          </p:txBody>
+        </p:sp>
+        <p:pic>
+          <p:nvPicPr>
+            <p:cNvPr id="33" name="圖片 32">
+              <a:extLst>
+                <a:ext uri="{FF2B5EF4-FFF2-40B4-BE49-F238E27FC236}">
+                  <a16:creationId xmlns:a16="http://schemas.microsoft.com/office/drawing/2014/main" id="{22879441-2FC4-4BE8-B96D-C4BABCBE75BC}"/>
+                </a:ext>
+              </a:extLst>
+            </p:cNvPr>
+            <p:cNvPicPr>
+              <a:picLocks noChangeAspect="1"/>
+            </p:cNvPicPr>
+            <p:nvPr/>
+          </p:nvPicPr>
+          <p:blipFill>
+            <a:blip r:embed="rId4"/>
+            <a:stretch>
+              <a:fillRect/>
+            </a:stretch>
+          </p:blipFill>
+          <p:spPr>
+            <a:xfrm>
+              <a:off x="1154781" y="4862504"/>
+              <a:ext cx="1200318" cy="1066949"/>
+            </a:xfrm>
+            <a:prstGeom prst="rect">
+              <a:avLst/>
+            </a:prstGeom>
+          </p:spPr>
+        </p:pic>
+        <p:sp>
+          <p:nvSpPr>
+            <p:cNvPr id="34" name="文字方塊 33">
+              <a:extLst>
+                <a:ext uri="{FF2B5EF4-FFF2-40B4-BE49-F238E27FC236}">
+                  <a16:creationId xmlns:a16="http://schemas.microsoft.com/office/drawing/2014/main" id="{AB95DA78-6480-4B7A-A243-FFD9F6E9BFBC}"/>
+                </a:ext>
+              </a:extLst>
+            </p:cNvPr>
+            <p:cNvSpPr txBox="1"/>
+            <p:nvPr/>
+          </p:nvSpPr>
+          <p:spPr>
+            <a:xfrm>
+              <a:off x="2355099" y="5072812"/>
+              <a:ext cx="3629141" cy="646331"/>
+            </a:xfrm>
+            <a:prstGeom prst="rect">
+              <a:avLst/>
+            </a:prstGeom>
+            <a:noFill/>
+          </p:spPr>
+          <p:txBody>
+            <a:bodyPr wrap="square">
+              <a:spAutoFit/>
+            </a:bodyPr>
+            <a:lstStyle/>
+            <a:p>
+              <a:r>
+                <a:rPr lang="zh-TW" altLang="en-US" b="1" dirty="0">
+                  <a:solidFill>
+                    <a:schemeClr val="bg1"/>
+                  </a:solidFill>
+                  <a:latin typeface="標楷體" panose="03000509000000000000" pitchFamily="65" charset="-120"/>
+                  <a:ea typeface="標楷體" panose="03000509000000000000" pitchFamily="65" charset="-120"/>
+                </a:rPr>
+                <a:t>購買守護者時，若標註紅色區域即不可放置在此處</a:t>
+              </a:r>
+              <a:endParaRPr lang="en-US" altLang="zh-TW" b="1" dirty="0">
                 <a:solidFill>
                   <a:schemeClr val="bg1"/>
                 </a:solidFill>
                 <a:latin typeface="標楷體" panose="03000509000000000000" pitchFamily="65" charset="-120"/>
                 <a:ea typeface="標楷體" panose="03000509000000000000" pitchFamily="65" charset="-120"/>
-              </a:rPr>
-              <a:t>(+5</a:t>
-            </a:r>
-            <a:r>
-              <a:rPr lang="zh-TW" altLang="en-US" b="1" dirty="0">
+              </a:endParaRPr>
+            </a:p>
+          </p:txBody>
+        </p:sp>
+        <p:pic>
+          <p:nvPicPr>
+            <p:cNvPr id="36" name="圖片 35">
+              <a:extLst>
+                <a:ext uri="{FF2B5EF4-FFF2-40B4-BE49-F238E27FC236}">
+                  <a16:creationId xmlns:a16="http://schemas.microsoft.com/office/drawing/2014/main" id="{680820C7-08E1-4A44-B1AF-1D6DD7227FE7}"/>
+                </a:ext>
+              </a:extLst>
+            </p:cNvPr>
+            <p:cNvPicPr>
+              <a:picLocks noChangeAspect="1"/>
+            </p:cNvPicPr>
+            <p:nvPr/>
+          </p:nvPicPr>
+          <p:blipFill>
+            <a:blip r:embed="rId5"/>
+            <a:stretch>
+              <a:fillRect/>
+            </a:stretch>
+          </p:blipFill>
+          <p:spPr>
+            <a:xfrm>
+              <a:off x="6143138" y="4805344"/>
+              <a:ext cx="1600423" cy="1181265"/>
+            </a:xfrm>
+            <a:prstGeom prst="rect">
+              <a:avLst/>
+            </a:prstGeom>
+          </p:spPr>
+        </p:pic>
+        <p:sp>
+          <p:nvSpPr>
+            <p:cNvPr id="37" name="文字方塊 36">
+              <a:extLst>
+                <a:ext uri="{FF2B5EF4-FFF2-40B4-BE49-F238E27FC236}">
+                  <a16:creationId xmlns:a16="http://schemas.microsoft.com/office/drawing/2014/main" id="{044BCEC4-0A1F-4645-BDA2-290E3FDE3E00}"/>
+                </a:ext>
+              </a:extLst>
+            </p:cNvPr>
+            <p:cNvSpPr txBox="1"/>
+            <p:nvPr/>
+          </p:nvSpPr>
+          <p:spPr>
+            <a:xfrm>
+              <a:off x="7743561" y="5072810"/>
+              <a:ext cx="3629141" cy="646331"/>
+            </a:xfrm>
+            <a:prstGeom prst="rect">
+              <a:avLst/>
+            </a:prstGeom>
+            <a:noFill/>
+          </p:spPr>
+          <p:txBody>
+            <a:bodyPr wrap="square">
+              <a:spAutoFit/>
+            </a:bodyPr>
+            <a:lstStyle/>
+            <a:p>
+              <a:r>
+                <a:rPr lang="zh-TW" altLang="en-US" b="1" dirty="0">
+                  <a:solidFill>
+                    <a:schemeClr val="bg1"/>
+                  </a:solidFill>
+                  <a:latin typeface="標楷體" panose="03000509000000000000" pitchFamily="65" charset="-120"/>
+                  <a:ea typeface="標楷體" panose="03000509000000000000" pitchFamily="65" charset="-120"/>
+                </a:rPr>
+                <a:t>購買守護者時，若標註灰色區域即可放置於此處</a:t>
+              </a:r>
+              <a:endParaRPr lang="en-US" altLang="zh-TW" b="1" dirty="0">
                 <a:solidFill>
                   <a:schemeClr val="bg1"/>
                 </a:solidFill>
                 <a:latin typeface="標楷體" panose="03000509000000000000" pitchFamily="65" charset="-120"/>
                 <a:ea typeface="標楷體" panose="03000509000000000000" pitchFamily="65" charset="-120"/>
-              </a:rPr>
-              <a:t> </a:t>
-            </a:r>
-            <a:r>
-              <a:rPr lang="en-US" altLang="zh-TW" b="1" dirty="0">
-                <a:solidFill>
-                  <a:schemeClr val="bg1"/>
-                </a:solidFill>
-                <a:latin typeface="標楷體" panose="03000509000000000000" pitchFamily="65" charset="-120"/>
-                <a:ea typeface="標楷體" panose="03000509000000000000" pitchFamily="65" charset="-120"/>
-              </a:rPr>
-              <a:t>/</a:t>
-            </a:r>
-            <a:r>
-              <a:rPr lang="zh-TW" altLang="en-US" b="1" dirty="0">
-                <a:solidFill>
-                  <a:schemeClr val="bg1"/>
-                </a:solidFill>
-                <a:latin typeface="標楷體" panose="03000509000000000000" pitchFamily="65" charset="-120"/>
-                <a:ea typeface="標楷體" panose="03000509000000000000" pitchFamily="65" charset="-120"/>
-              </a:rPr>
-              <a:t> </a:t>
-            </a:r>
-            <a:r>
-              <a:rPr lang="en-US" altLang="zh-TW" b="1" dirty="0">
-                <a:solidFill>
-                  <a:schemeClr val="bg1"/>
-                </a:solidFill>
-                <a:latin typeface="標楷體" panose="03000509000000000000" pitchFamily="65" charset="-120"/>
-                <a:ea typeface="標楷體" panose="03000509000000000000" pitchFamily="65" charset="-120"/>
-              </a:rPr>
-              <a:t>Level)</a:t>
-            </a:r>
-          </a:p>
-          <a:p>
-            <a:r>
-              <a:rPr lang="zh-TW" altLang="en-US" b="1" dirty="0">
-                <a:solidFill>
-                  <a:schemeClr val="bg1"/>
-                </a:solidFill>
-                <a:latin typeface="標楷體" panose="03000509000000000000" pitchFamily="65" charset="-120"/>
-                <a:ea typeface="標楷體" panose="03000509000000000000" pitchFamily="65" charset="-120"/>
-              </a:rPr>
-              <a:t>攻擊速度：</a:t>
-            </a:r>
-            <a:r>
-              <a:rPr lang="en-US" altLang="zh-TW" b="1" dirty="0">
-                <a:solidFill>
-                  <a:schemeClr val="bg1"/>
-                </a:solidFill>
-                <a:latin typeface="標楷體" panose="03000509000000000000" pitchFamily="65" charset="-120"/>
-                <a:ea typeface="標楷體" panose="03000509000000000000" pitchFamily="65" charset="-120"/>
-              </a:rPr>
-              <a:t> 1.5(</a:t>
-            </a:r>
-            <a:r>
-              <a:rPr lang="zh-TW" altLang="en-US" b="1" dirty="0">
-                <a:solidFill>
-                  <a:schemeClr val="bg1"/>
-                </a:solidFill>
-                <a:latin typeface="標楷體" panose="03000509000000000000" pitchFamily="65" charset="-120"/>
-                <a:ea typeface="標楷體" panose="03000509000000000000" pitchFamily="65" charset="-120"/>
-              </a:rPr>
-              <a:t>*</a:t>
-            </a:r>
-            <a:r>
-              <a:rPr lang="en-US" altLang="zh-TW" b="1" dirty="0">
-                <a:solidFill>
-                  <a:schemeClr val="bg1"/>
-                </a:solidFill>
-                <a:latin typeface="標楷體" panose="03000509000000000000" pitchFamily="65" charset="-120"/>
-                <a:ea typeface="標楷體" panose="03000509000000000000" pitchFamily="65" charset="-120"/>
-              </a:rPr>
-              <a:t>1.2</a:t>
-            </a:r>
-            <a:r>
-              <a:rPr lang="zh-TW" altLang="en-US" b="1" dirty="0">
-                <a:solidFill>
-                  <a:schemeClr val="bg1"/>
-                </a:solidFill>
-                <a:latin typeface="標楷體" panose="03000509000000000000" pitchFamily="65" charset="-120"/>
-                <a:ea typeface="標楷體" panose="03000509000000000000" pitchFamily="65" charset="-120"/>
-              </a:rPr>
-              <a:t> </a:t>
-            </a:r>
-            <a:r>
-              <a:rPr lang="en-US" altLang="zh-TW" b="1" dirty="0">
-                <a:solidFill>
-                  <a:schemeClr val="bg1"/>
-                </a:solidFill>
-                <a:latin typeface="標楷體" panose="03000509000000000000" pitchFamily="65" charset="-120"/>
-                <a:ea typeface="標楷體" panose="03000509000000000000" pitchFamily="65" charset="-120"/>
-              </a:rPr>
-              <a:t>/</a:t>
-            </a:r>
-            <a:r>
-              <a:rPr lang="zh-TW" altLang="en-US" b="1" dirty="0">
-                <a:solidFill>
-                  <a:schemeClr val="bg1"/>
-                </a:solidFill>
-                <a:latin typeface="標楷體" panose="03000509000000000000" pitchFamily="65" charset="-120"/>
-                <a:ea typeface="標楷體" panose="03000509000000000000" pitchFamily="65" charset="-120"/>
-              </a:rPr>
-              <a:t> </a:t>
-            </a:r>
-            <a:r>
-              <a:rPr lang="en-US" altLang="zh-TW" b="1" dirty="0">
-                <a:solidFill>
-                  <a:schemeClr val="bg1"/>
-                </a:solidFill>
-                <a:latin typeface="標楷體" panose="03000509000000000000" pitchFamily="65" charset="-120"/>
-                <a:ea typeface="標楷體" panose="03000509000000000000" pitchFamily="65" charset="-120"/>
-              </a:rPr>
-              <a:t>Level)</a:t>
-            </a:r>
-          </a:p>
-          <a:p>
-            <a:r>
-              <a:rPr lang="zh-TW" altLang="en-US" b="1" dirty="0">
-                <a:solidFill>
-                  <a:schemeClr val="bg1"/>
-                </a:solidFill>
-                <a:latin typeface="標楷體" panose="03000509000000000000" pitchFamily="65" charset="-120"/>
-                <a:ea typeface="標楷體" panose="03000509000000000000" pitchFamily="65" charset="-120"/>
-              </a:rPr>
-              <a:t>範圍： </a:t>
-            </a:r>
-            <a:r>
-              <a:rPr lang="en-US" altLang="zh-TW" b="1" dirty="0">
-                <a:solidFill>
-                  <a:schemeClr val="bg1"/>
-                </a:solidFill>
-                <a:latin typeface="標楷體" panose="03000509000000000000" pitchFamily="65" charset="-120"/>
-                <a:ea typeface="標楷體" panose="03000509000000000000" pitchFamily="65" charset="-120"/>
-              </a:rPr>
-              <a:t>1</a:t>
-            </a:r>
-          </a:p>
-        </p:txBody>
-      </p:sp>
-      <p:sp>
-        <p:nvSpPr>
-          <p:cNvPr id="19" name="文字方塊 18">
-            <a:extLst>
-              <a:ext uri="{FF2B5EF4-FFF2-40B4-BE49-F238E27FC236}">
-                <a16:creationId xmlns:a16="http://schemas.microsoft.com/office/drawing/2014/main" id="{5101AE49-EB89-476C-9E41-97347BC0EE4D}"/>
-              </a:ext>
-            </a:extLst>
-          </p:cNvPr>
-          <p:cNvSpPr txBox="1"/>
-          <p:nvPr/>
-        </p:nvSpPr>
-        <p:spPr>
-          <a:xfrm>
-            <a:off x="798194" y="3924892"/>
-            <a:ext cx="3397885" cy="923330"/>
-          </a:xfrm>
-          <a:prstGeom prst="rect">
-            <a:avLst/>
-          </a:prstGeom>
-          <a:noFill/>
-        </p:spPr>
-        <p:txBody>
-          <a:bodyPr wrap="square">
-            <a:spAutoFit/>
-          </a:bodyPr>
-          <a:lstStyle/>
-          <a:p>
-            <a:r>
-              <a:rPr lang="zh-TW" altLang="en-US" b="1" dirty="0">
-                <a:solidFill>
-                  <a:schemeClr val="bg1"/>
-                </a:solidFill>
-                <a:latin typeface="標楷體" panose="03000509000000000000" pitchFamily="65" charset="-120"/>
-                <a:ea typeface="標楷體" panose="03000509000000000000" pitchFamily="65" charset="-120"/>
-              </a:rPr>
-              <a:t>攻擊力：</a:t>
-            </a:r>
-            <a:r>
-              <a:rPr lang="en-US" altLang="zh-TW" b="1" dirty="0">
-                <a:solidFill>
-                  <a:schemeClr val="bg1"/>
-                </a:solidFill>
-                <a:latin typeface="標楷體" panose="03000509000000000000" pitchFamily="65" charset="-120"/>
-                <a:ea typeface="標楷體" panose="03000509000000000000" pitchFamily="65" charset="-120"/>
-              </a:rPr>
-              <a:t>0.5</a:t>
-            </a:r>
-            <a:r>
-              <a:rPr lang="zh-TW" altLang="en-US" b="1" dirty="0">
-                <a:solidFill>
-                  <a:schemeClr val="bg1"/>
-                </a:solidFill>
-                <a:latin typeface="標楷體" panose="03000509000000000000" pitchFamily="65" charset="-120"/>
-                <a:ea typeface="標楷體" panose="03000509000000000000" pitchFamily="65" charset="-120"/>
-              </a:rPr>
-              <a:t> </a:t>
-            </a:r>
-            <a:r>
-              <a:rPr lang="en-US" altLang="zh-TW" b="1" dirty="0">
-                <a:solidFill>
-                  <a:schemeClr val="bg1"/>
-                </a:solidFill>
-                <a:latin typeface="標楷體" panose="03000509000000000000" pitchFamily="65" charset="-120"/>
-                <a:ea typeface="標楷體" panose="03000509000000000000" pitchFamily="65" charset="-120"/>
-              </a:rPr>
-              <a:t>(+0.5</a:t>
-            </a:r>
-            <a:r>
-              <a:rPr lang="zh-TW" altLang="en-US" b="1" dirty="0">
-                <a:solidFill>
-                  <a:schemeClr val="bg1"/>
-                </a:solidFill>
-                <a:latin typeface="標楷體" panose="03000509000000000000" pitchFamily="65" charset="-120"/>
-                <a:ea typeface="標楷體" panose="03000509000000000000" pitchFamily="65" charset="-120"/>
-              </a:rPr>
-              <a:t> </a:t>
-            </a:r>
-            <a:r>
-              <a:rPr lang="en-US" altLang="zh-TW" b="1" dirty="0">
-                <a:solidFill>
-                  <a:schemeClr val="bg1"/>
-                </a:solidFill>
-                <a:latin typeface="標楷體" panose="03000509000000000000" pitchFamily="65" charset="-120"/>
-                <a:ea typeface="標楷體" panose="03000509000000000000" pitchFamily="65" charset="-120"/>
-              </a:rPr>
-              <a:t>/</a:t>
-            </a:r>
-            <a:r>
-              <a:rPr lang="zh-TW" altLang="en-US" b="1" dirty="0">
-                <a:solidFill>
-                  <a:schemeClr val="bg1"/>
-                </a:solidFill>
-                <a:latin typeface="標楷體" panose="03000509000000000000" pitchFamily="65" charset="-120"/>
-                <a:ea typeface="標楷體" panose="03000509000000000000" pitchFamily="65" charset="-120"/>
-              </a:rPr>
-              <a:t> </a:t>
-            </a:r>
-            <a:r>
-              <a:rPr lang="en-US" altLang="zh-TW" b="1" dirty="0">
-                <a:solidFill>
-                  <a:schemeClr val="bg1"/>
-                </a:solidFill>
-                <a:latin typeface="標楷體" panose="03000509000000000000" pitchFamily="65" charset="-120"/>
-                <a:ea typeface="標楷體" panose="03000509000000000000" pitchFamily="65" charset="-120"/>
-              </a:rPr>
-              <a:t>Level)</a:t>
-            </a:r>
-          </a:p>
-          <a:p>
-            <a:r>
-              <a:rPr lang="zh-TW" altLang="en-US" b="1" dirty="0">
-                <a:solidFill>
-                  <a:schemeClr val="bg1"/>
-                </a:solidFill>
-                <a:latin typeface="標楷體" panose="03000509000000000000" pitchFamily="65" charset="-120"/>
-                <a:ea typeface="標楷體" panose="03000509000000000000" pitchFamily="65" charset="-120"/>
-              </a:rPr>
-              <a:t>攻擊速度：</a:t>
-            </a:r>
-            <a:r>
-              <a:rPr lang="en-US" altLang="zh-TW" b="1" dirty="0">
-                <a:solidFill>
-                  <a:schemeClr val="bg1"/>
-                </a:solidFill>
-                <a:latin typeface="標楷體" panose="03000509000000000000" pitchFamily="65" charset="-120"/>
-                <a:ea typeface="標楷體" panose="03000509000000000000" pitchFamily="65" charset="-120"/>
-              </a:rPr>
-              <a:t> 18(</a:t>
-            </a:r>
-            <a:r>
-              <a:rPr lang="zh-TW" altLang="en-US" b="1" dirty="0">
-                <a:solidFill>
-                  <a:schemeClr val="bg1"/>
-                </a:solidFill>
-                <a:latin typeface="標楷體" panose="03000509000000000000" pitchFamily="65" charset="-120"/>
-                <a:ea typeface="標楷體" panose="03000509000000000000" pitchFamily="65" charset="-120"/>
-              </a:rPr>
-              <a:t>*</a:t>
-            </a:r>
-            <a:r>
-              <a:rPr lang="en-US" altLang="zh-TW" b="1" dirty="0">
-                <a:solidFill>
-                  <a:schemeClr val="bg1"/>
-                </a:solidFill>
-                <a:latin typeface="標楷體" panose="03000509000000000000" pitchFamily="65" charset="-120"/>
-                <a:ea typeface="標楷體" panose="03000509000000000000" pitchFamily="65" charset="-120"/>
-              </a:rPr>
-              <a:t>1.2</a:t>
-            </a:r>
-            <a:r>
-              <a:rPr lang="zh-TW" altLang="en-US" b="1" dirty="0">
-                <a:solidFill>
-                  <a:schemeClr val="bg1"/>
-                </a:solidFill>
-                <a:latin typeface="標楷體" panose="03000509000000000000" pitchFamily="65" charset="-120"/>
-                <a:ea typeface="標楷體" panose="03000509000000000000" pitchFamily="65" charset="-120"/>
-              </a:rPr>
-              <a:t> </a:t>
-            </a:r>
-            <a:r>
-              <a:rPr lang="en-US" altLang="zh-TW" b="1" dirty="0">
-                <a:solidFill>
-                  <a:schemeClr val="bg1"/>
-                </a:solidFill>
-                <a:latin typeface="標楷體" panose="03000509000000000000" pitchFamily="65" charset="-120"/>
-                <a:ea typeface="標楷體" panose="03000509000000000000" pitchFamily="65" charset="-120"/>
-              </a:rPr>
-              <a:t>/</a:t>
-            </a:r>
-            <a:r>
-              <a:rPr lang="zh-TW" altLang="en-US" b="1" dirty="0">
-                <a:solidFill>
-                  <a:schemeClr val="bg1"/>
-                </a:solidFill>
-                <a:latin typeface="標楷體" panose="03000509000000000000" pitchFamily="65" charset="-120"/>
-                <a:ea typeface="標楷體" panose="03000509000000000000" pitchFamily="65" charset="-120"/>
-              </a:rPr>
-              <a:t> </a:t>
-            </a:r>
-            <a:r>
-              <a:rPr lang="en-US" altLang="zh-TW" b="1" dirty="0">
-                <a:solidFill>
-                  <a:schemeClr val="bg1"/>
-                </a:solidFill>
-                <a:latin typeface="標楷體" panose="03000509000000000000" pitchFamily="65" charset="-120"/>
-                <a:ea typeface="標楷體" panose="03000509000000000000" pitchFamily="65" charset="-120"/>
-              </a:rPr>
-              <a:t>Level)</a:t>
-            </a:r>
-          </a:p>
-          <a:p>
-            <a:r>
-              <a:rPr lang="zh-TW" altLang="en-US" b="1" dirty="0">
-                <a:solidFill>
-                  <a:schemeClr val="bg1"/>
-                </a:solidFill>
-                <a:latin typeface="標楷體" panose="03000509000000000000" pitchFamily="65" charset="-120"/>
-                <a:ea typeface="標楷體" panose="03000509000000000000" pitchFamily="65" charset="-120"/>
-              </a:rPr>
-              <a:t>範圍： </a:t>
-            </a:r>
-            <a:r>
-              <a:rPr lang="en-US" altLang="zh-TW" b="1" dirty="0">
-                <a:solidFill>
-                  <a:schemeClr val="bg1"/>
-                </a:solidFill>
-                <a:latin typeface="標楷體" panose="03000509000000000000" pitchFamily="65" charset="-120"/>
-                <a:ea typeface="標楷體" panose="03000509000000000000" pitchFamily="65" charset="-120"/>
-              </a:rPr>
-              <a:t>2</a:t>
-            </a:r>
-          </a:p>
-        </p:txBody>
-      </p:sp>
-      <p:sp>
-        <p:nvSpPr>
-          <p:cNvPr id="20" name="文字方塊 19">
-            <a:extLst>
-              <a:ext uri="{FF2B5EF4-FFF2-40B4-BE49-F238E27FC236}">
-                <a16:creationId xmlns:a16="http://schemas.microsoft.com/office/drawing/2014/main" id="{9D0B2A3F-967D-4C36-821E-24F1BD5A678A}"/>
-              </a:ext>
-            </a:extLst>
-          </p:cNvPr>
-          <p:cNvSpPr txBox="1"/>
-          <p:nvPr/>
-        </p:nvSpPr>
-        <p:spPr>
-          <a:xfrm>
-            <a:off x="4536596" y="1496814"/>
-            <a:ext cx="3397885" cy="923330"/>
-          </a:xfrm>
-          <a:prstGeom prst="rect">
-            <a:avLst/>
-          </a:prstGeom>
-          <a:noFill/>
-        </p:spPr>
-        <p:txBody>
-          <a:bodyPr wrap="square">
-            <a:spAutoFit/>
-          </a:bodyPr>
-          <a:lstStyle/>
-          <a:p>
-            <a:r>
-              <a:rPr lang="zh-TW" altLang="en-US" b="1" dirty="0">
-                <a:solidFill>
-                  <a:schemeClr val="bg1"/>
-                </a:solidFill>
-                <a:latin typeface="標楷體" panose="03000509000000000000" pitchFamily="65" charset="-120"/>
-                <a:ea typeface="標楷體" panose="03000509000000000000" pitchFamily="65" charset="-120"/>
-              </a:rPr>
-              <a:t>攻擊力：</a:t>
-            </a:r>
-            <a:r>
-              <a:rPr lang="en-US" altLang="zh-TW" b="1" dirty="0">
-                <a:solidFill>
-                  <a:schemeClr val="bg1"/>
-                </a:solidFill>
-                <a:latin typeface="標楷體" panose="03000509000000000000" pitchFamily="65" charset="-120"/>
-                <a:ea typeface="標楷體" panose="03000509000000000000" pitchFamily="65" charset="-120"/>
-              </a:rPr>
-              <a:t>25</a:t>
-            </a:r>
-            <a:r>
-              <a:rPr lang="zh-TW" altLang="en-US" b="1" dirty="0">
-                <a:solidFill>
-                  <a:schemeClr val="bg1"/>
-                </a:solidFill>
-                <a:latin typeface="標楷體" panose="03000509000000000000" pitchFamily="65" charset="-120"/>
-                <a:ea typeface="標楷體" panose="03000509000000000000" pitchFamily="65" charset="-120"/>
-              </a:rPr>
-              <a:t> </a:t>
-            </a:r>
-            <a:r>
-              <a:rPr lang="en-US" altLang="zh-TW" b="1" dirty="0">
-                <a:solidFill>
-                  <a:schemeClr val="bg1"/>
-                </a:solidFill>
-                <a:latin typeface="標楷體" panose="03000509000000000000" pitchFamily="65" charset="-120"/>
-                <a:ea typeface="標楷體" panose="03000509000000000000" pitchFamily="65" charset="-120"/>
-              </a:rPr>
-              <a:t>(+15</a:t>
-            </a:r>
-            <a:r>
-              <a:rPr lang="zh-TW" altLang="en-US" b="1" dirty="0">
-                <a:solidFill>
-                  <a:schemeClr val="bg1"/>
-                </a:solidFill>
-                <a:latin typeface="標楷體" panose="03000509000000000000" pitchFamily="65" charset="-120"/>
-                <a:ea typeface="標楷體" panose="03000509000000000000" pitchFamily="65" charset="-120"/>
-              </a:rPr>
-              <a:t> </a:t>
-            </a:r>
-            <a:r>
-              <a:rPr lang="en-US" altLang="zh-TW" b="1" dirty="0">
-                <a:solidFill>
-                  <a:schemeClr val="bg1"/>
-                </a:solidFill>
-                <a:latin typeface="標楷體" panose="03000509000000000000" pitchFamily="65" charset="-120"/>
-                <a:ea typeface="標楷體" panose="03000509000000000000" pitchFamily="65" charset="-120"/>
-              </a:rPr>
-              <a:t>/</a:t>
-            </a:r>
-            <a:r>
-              <a:rPr lang="zh-TW" altLang="en-US" b="1" dirty="0">
-                <a:solidFill>
-                  <a:schemeClr val="bg1"/>
-                </a:solidFill>
-                <a:latin typeface="標楷體" panose="03000509000000000000" pitchFamily="65" charset="-120"/>
-                <a:ea typeface="標楷體" panose="03000509000000000000" pitchFamily="65" charset="-120"/>
-              </a:rPr>
-              <a:t> </a:t>
-            </a:r>
-            <a:r>
-              <a:rPr lang="en-US" altLang="zh-TW" b="1" dirty="0">
-                <a:solidFill>
-                  <a:schemeClr val="bg1"/>
-                </a:solidFill>
-                <a:latin typeface="標楷體" panose="03000509000000000000" pitchFamily="65" charset="-120"/>
-                <a:ea typeface="標楷體" panose="03000509000000000000" pitchFamily="65" charset="-120"/>
-              </a:rPr>
-              <a:t>Level)</a:t>
-            </a:r>
-          </a:p>
-          <a:p>
-            <a:r>
-              <a:rPr lang="zh-TW" altLang="en-US" b="1" dirty="0">
-                <a:solidFill>
-                  <a:schemeClr val="bg1"/>
-                </a:solidFill>
-                <a:latin typeface="標楷體" panose="03000509000000000000" pitchFamily="65" charset="-120"/>
-                <a:ea typeface="標楷體" panose="03000509000000000000" pitchFamily="65" charset="-120"/>
-              </a:rPr>
-              <a:t>攻擊速度：</a:t>
-            </a:r>
-            <a:r>
-              <a:rPr lang="en-US" altLang="zh-TW" b="1" dirty="0">
-                <a:solidFill>
-                  <a:schemeClr val="bg1"/>
-                </a:solidFill>
-                <a:latin typeface="標楷體" panose="03000509000000000000" pitchFamily="65" charset="-120"/>
-                <a:ea typeface="標楷體" panose="03000509000000000000" pitchFamily="65" charset="-120"/>
-              </a:rPr>
-              <a:t> 0.5(</a:t>
-            </a:r>
-            <a:r>
-              <a:rPr lang="zh-TW" altLang="en-US" b="1" dirty="0">
-                <a:solidFill>
-                  <a:schemeClr val="bg1"/>
-                </a:solidFill>
-                <a:latin typeface="標楷體" panose="03000509000000000000" pitchFamily="65" charset="-120"/>
-                <a:ea typeface="標楷體" panose="03000509000000000000" pitchFamily="65" charset="-120"/>
-              </a:rPr>
-              <a:t>*</a:t>
-            </a:r>
-            <a:r>
-              <a:rPr lang="en-US" altLang="zh-TW" b="1" dirty="0">
-                <a:solidFill>
-                  <a:schemeClr val="bg1"/>
-                </a:solidFill>
-                <a:latin typeface="標楷體" panose="03000509000000000000" pitchFamily="65" charset="-120"/>
-                <a:ea typeface="標楷體" panose="03000509000000000000" pitchFamily="65" charset="-120"/>
-              </a:rPr>
-              <a:t>1.1</a:t>
-            </a:r>
-            <a:r>
-              <a:rPr lang="zh-TW" altLang="en-US" b="1" dirty="0">
-                <a:solidFill>
-                  <a:schemeClr val="bg1"/>
-                </a:solidFill>
-                <a:latin typeface="標楷體" panose="03000509000000000000" pitchFamily="65" charset="-120"/>
-                <a:ea typeface="標楷體" panose="03000509000000000000" pitchFamily="65" charset="-120"/>
-              </a:rPr>
-              <a:t> </a:t>
-            </a:r>
-            <a:r>
-              <a:rPr lang="en-US" altLang="zh-TW" b="1" dirty="0">
-                <a:solidFill>
-                  <a:schemeClr val="bg1"/>
-                </a:solidFill>
-                <a:latin typeface="標楷體" panose="03000509000000000000" pitchFamily="65" charset="-120"/>
-                <a:ea typeface="標楷體" panose="03000509000000000000" pitchFamily="65" charset="-120"/>
-              </a:rPr>
-              <a:t>/</a:t>
-            </a:r>
-            <a:r>
-              <a:rPr lang="zh-TW" altLang="en-US" b="1" dirty="0">
-                <a:solidFill>
-                  <a:schemeClr val="bg1"/>
-                </a:solidFill>
-                <a:latin typeface="標楷體" panose="03000509000000000000" pitchFamily="65" charset="-120"/>
-                <a:ea typeface="標楷體" panose="03000509000000000000" pitchFamily="65" charset="-120"/>
-              </a:rPr>
-              <a:t> </a:t>
-            </a:r>
-            <a:r>
-              <a:rPr lang="en-US" altLang="zh-TW" b="1" dirty="0">
-                <a:solidFill>
-                  <a:schemeClr val="bg1"/>
-                </a:solidFill>
-                <a:latin typeface="標楷體" panose="03000509000000000000" pitchFamily="65" charset="-120"/>
-                <a:ea typeface="標楷體" panose="03000509000000000000" pitchFamily="65" charset="-120"/>
-              </a:rPr>
-              <a:t>Level)</a:t>
-            </a:r>
-          </a:p>
-          <a:p>
-            <a:r>
-              <a:rPr lang="zh-TW" altLang="en-US" b="1" dirty="0">
-                <a:solidFill>
-                  <a:schemeClr val="bg1"/>
-                </a:solidFill>
-                <a:latin typeface="標楷體" panose="03000509000000000000" pitchFamily="65" charset="-120"/>
-                <a:ea typeface="標楷體" panose="03000509000000000000" pitchFamily="65" charset="-120"/>
-              </a:rPr>
-              <a:t>範圍： </a:t>
-            </a:r>
-            <a:r>
-              <a:rPr lang="en-US" altLang="zh-TW" b="1" dirty="0">
-                <a:solidFill>
-                  <a:schemeClr val="bg1"/>
-                </a:solidFill>
-                <a:latin typeface="標楷體" panose="03000509000000000000" pitchFamily="65" charset="-120"/>
-                <a:ea typeface="標楷體" panose="03000509000000000000" pitchFamily="65" charset="-120"/>
-              </a:rPr>
-              <a:t>3</a:t>
-            </a:r>
-          </a:p>
-        </p:txBody>
-      </p:sp>
-      <p:sp>
-        <p:nvSpPr>
-          <p:cNvPr id="21" name="文字方塊 20">
-            <a:extLst>
-              <a:ext uri="{FF2B5EF4-FFF2-40B4-BE49-F238E27FC236}">
-                <a16:creationId xmlns:a16="http://schemas.microsoft.com/office/drawing/2014/main" id="{DE5F96ED-53C7-4FA3-853A-9FE1D95B17FC}"/>
-              </a:ext>
-            </a:extLst>
-          </p:cNvPr>
-          <p:cNvSpPr txBox="1"/>
-          <p:nvPr/>
-        </p:nvSpPr>
-        <p:spPr>
-          <a:xfrm>
-            <a:off x="4536596" y="3849547"/>
-            <a:ext cx="3397885" cy="923330"/>
-          </a:xfrm>
-          <a:prstGeom prst="rect">
-            <a:avLst/>
-          </a:prstGeom>
-          <a:noFill/>
-        </p:spPr>
-        <p:txBody>
-          <a:bodyPr wrap="square">
-            <a:spAutoFit/>
-          </a:bodyPr>
-          <a:lstStyle/>
-          <a:p>
-            <a:r>
-              <a:rPr lang="zh-TW" altLang="en-US" b="1" dirty="0">
-                <a:solidFill>
-                  <a:schemeClr val="bg1"/>
-                </a:solidFill>
-                <a:latin typeface="標楷體" panose="03000509000000000000" pitchFamily="65" charset="-120"/>
-                <a:ea typeface="標楷體" panose="03000509000000000000" pitchFamily="65" charset="-120"/>
-              </a:rPr>
-              <a:t>獲得金幣：</a:t>
-            </a:r>
-            <a:r>
-              <a:rPr lang="en-US" altLang="zh-TW" b="1" dirty="0">
-                <a:solidFill>
-                  <a:schemeClr val="bg1"/>
-                </a:solidFill>
-                <a:latin typeface="標楷體" panose="03000509000000000000" pitchFamily="65" charset="-120"/>
-                <a:ea typeface="標楷體" panose="03000509000000000000" pitchFamily="65" charset="-120"/>
-              </a:rPr>
-              <a:t>10</a:t>
-            </a:r>
-            <a:r>
-              <a:rPr lang="zh-TW" altLang="en-US" b="1" dirty="0">
-                <a:solidFill>
-                  <a:schemeClr val="bg1"/>
-                </a:solidFill>
-                <a:latin typeface="標楷體" panose="03000509000000000000" pitchFamily="65" charset="-120"/>
-                <a:ea typeface="標楷體" panose="03000509000000000000" pitchFamily="65" charset="-120"/>
-              </a:rPr>
-              <a:t> </a:t>
-            </a:r>
-            <a:r>
-              <a:rPr lang="en-US" altLang="zh-TW" b="1" dirty="0">
-                <a:solidFill>
-                  <a:schemeClr val="bg1"/>
-                </a:solidFill>
-                <a:latin typeface="標楷體" panose="03000509000000000000" pitchFamily="65" charset="-120"/>
-                <a:ea typeface="標楷體" panose="03000509000000000000" pitchFamily="65" charset="-120"/>
-              </a:rPr>
-              <a:t>(+5</a:t>
-            </a:r>
-            <a:r>
-              <a:rPr lang="zh-TW" altLang="en-US" b="1" dirty="0">
-                <a:solidFill>
-                  <a:schemeClr val="bg1"/>
-                </a:solidFill>
-                <a:latin typeface="標楷體" panose="03000509000000000000" pitchFamily="65" charset="-120"/>
-                <a:ea typeface="標楷體" panose="03000509000000000000" pitchFamily="65" charset="-120"/>
-              </a:rPr>
-              <a:t> </a:t>
-            </a:r>
-            <a:r>
-              <a:rPr lang="en-US" altLang="zh-TW" b="1" dirty="0">
-                <a:solidFill>
-                  <a:schemeClr val="bg1"/>
-                </a:solidFill>
-                <a:latin typeface="標楷體" panose="03000509000000000000" pitchFamily="65" charset="-120"/>
-                <a:ea typeface="標楷體" panose="03000509000000000000" pitchFamily="65" charset="-120"/>
-              </a:rPr>
-              <a:t>/</a:t>
-            </a:r>
-            <a:r>
-              <a:rPr lang="zh-TW" altLang="en-US" b="1" dirty="0">
-                <a:solidFill>
-                  <a:schemeClr val="bg1"/>
-                </a:solidFill>
-                <a:latin typeface="標楷體" panose="03000509000000000000" pitchFamily="65" charset="-120"/>
-                <a:ea typeface="標楷體" panose="03000509000000000000" pitchFamily="65" charset="-120"/>
-              </a:rPr>
-              <a:t> </a:t>
-            </a:r>
-            <a:r>
-              <a:rPr lang="en-US" altLang="zh-TW" b="1" dirty="0">
-                <a:solidFill>
-                  <a:schemeClr val="bg1"/>
-                </a:solidFill>
-                <a:latin typeface="標楷體" panose="03000509000000000000" pitchFamily="65" charset="-120"/>
-                <a:ea typeface="標楷體" panose="03000509000000000000" pitchFamily="65" charset="-120"/>
-              </a:rPr>
-              <a:t>Level)</a:t>
-            </a:r>
-          </a:p>
-          <a:p>
-            <a:r>
-              <a:rPr lang="zh-TW" altLang="en-US" b="1" dirty="0">
-                <a:solidFill>
-                  <a:schemeClr val="bg1"/>
-                </a:solidFill>
-                <a:latin typeface="標楷體" panose="03000509000000000000" pitchFamily="65" charset="-120"/>
-                <a:ea typeface="標楷體" panose="03000509000000000000" pitchFamily="65" charset="-120"/>
-              </a:rPr>
-              <a:t>攻擊速度：</a:t>
-            </a:r>
-            <a:r>
-              <a:rPr lang="en-US" altLang="zh-TW" b="1" dirty="0">
-                <a:solidFill>
-                  <a:schemeClr val="bg1"/>
-                </a:solidFill>
-                <a:latin typeface="標楷體" panose="03000509000000000000" pitchFamily="65" charset="-120"/>
-                <a:ea typeface="標楷體" panose="03000509000000000000" pitchFamily="65" charset="-120"/>
-              </a:rPr>
-              <a:t> 0.5(</a:t>
-            </a:r>
-            <a:r>
-              <a:rPr lang="zh-TW" altLang="en-US" b="1" dirty="0">
-                <a:solidFill>
-                  <a:schemeClr val="bg1"/>
-                </a:solidFill>
-                <a:latin typeface="標楷體" panose="03000509000000000000" pitchFamily="65" charset="-120"/>
-                <a:ea typeface="標楷體" panose="03000509000000000000" pitchFamily="65" charset="-120"/>
-              </a:rPr>
-              <a:t>*</a:t>
-            </a:r>
-            <a:r>
-              <a:rPr lang="en-US" altLang="zh-TW" b="1" dirty="0">
-                <a:solidFill>
-                  <a:schemeClr val="bg1"/>
-                </a:solidFill>
-                <a:latin typeface="標楷體" panose="03000509000000000000" pitchFamily="65" charset="-120"/>
-                <a:ea typeface="標楷體" panose="03000509000000000000" pitchFamily="65" charset="-120"/>
-              </a:rPr>
-              <a:t>1.2</a:t>
-            </a:r>
-            <a:r>
-              <a:rPr lang="zh-TW" altLang="en-US" b="1" dirty="0">
-                <a:solidFill>
-                  <a:schemeClr val="bg1"/>
-                </a:solidFill>
-                <a:latin typeface="標楷體" panose="03000509000000000000" pitchFamily="65" charset="-120"/>
-                <a:ea typeface="標楷體" panose="03000509000000000000" pitchFamily="65" charset="-120"/>
-              </a:rPr>
-              <a:t> </a:t>
-            </a:r>
-            <a:r>
-              <a:rPr lang="en-US" altLang="zh-TW" b="1" dirty="0">
-                <a:solidFill>
-                  <a:schemeClr val="bg1"/>
-                </a:solidFill>
-                <a:latin typeface="標楷體" panose="03000509000000000000" pitchFamily="65" charset="-120"/>
-                <a:ea typeface="標楷體" panose="03000509000000000000" pitchFamily="65" charset="-120"/>
-              </a:rPr>
-              <a:t>/</a:t>
-            </a:r>
-            <a:r>
-              <a:rPr lang="zh-TW" altLang="en-US" b="1" dirty="0">
-                <a:solidFill>
-                  <a:schemeClr val="bg1"/>
-                </a:solidFill>
-                <a:latin typeface="標楷體" panose="03000509000000000000" pitchFamily="65" charset="-120"/>
-                <a:ea typeface="標楷體" panose="03000509000000000000" pitchFamily="65" charset="-120"/>
-              </a:rPr>
-              <a:t> </a:t>
-            </a:r>
-            <a:r>
-              <a:rPr lang="en-US" altLang="zh-TW" b="1" dirty="0">
-                <a:solidFill>
-                  <a:schemeClr val="bg1"/>
-                </a:solidFill>
-                <a:latin typeface="標楷體" panose="03000509000000000000" pitchFamily="65" charset="-120"/>
-                <a:ea typeface="標楷體" panose="03000509000000000000" pitchFamily="65" charset="-120"/>
-              </a:rPr>
-              <a:t>Level)</a:t>
-            </a:r>
-          </a:p>
-          <a:p>
-            <a:r>
-              <a:rPr lang="zh-TW" altLang="en-US" b="1" dirty="0">
-                <a:solidFill>
-                  <a:schemeClr val="bg1"/>
-                </a:solidFill>
-                <a:latin typeface="標楷體" panose="03000509000000000000" pitchFamily="65" charset="-120"/>
-                <a:ea typeface="標楷體" panose="03000509000000000000" pitchFamily="65" charset="-120"/>
-              </a:rPr>
-              <a:t>範圍： </a:t>
-            </a:r>
-            <a:r>
-              <a:rPr lang="en-US" altLang="zh-TW" b="1" dirty="0">
-                <a:solidFill>
-                  <a:schemeClr val="bg1"/>
-                </a:solidFill>
-                <a:latin typeface="標楷體" panose="03000509000000000000" pitchFamily="65" charset="-120"/>
-                <a:ea typeface="標楷體" panose="03000509000000000000" pitchFamily="65" charset="-120"/>
-              </a:rPr>
-              <a:t>0</a:t>
-            </a:r>
-          </a:p>
-        </p:txBody>
-      </p:sp>
+              </a:endParaRPr>
+            </a:p>
+          </p:txBody>
+        </p:sp>
+      </p:grpSp>
     </p:spTree>
     <p:extLst>
       <p:ext uri="{BB962C8B-B14F-4D97-AF65-F5344CB8AC3E}">
-        <p14:creationId xmlns:p14="http://schemas.microsoft.com/office/powerpoint/2010/main" val="1045354091"/>
+        <p14:creationId xmlns:p14="http://schemas.microsoft.com/office/powerpoint/2010/main" val="494246226"/>
       </p:ext>
     </p:extLst>
   </p:cSld>

</xml_diff>

<commit_message>
ShowMap.hpp and .cpp not okay but work
</commit_message>
<xml_diff>
--- a/Resources/TutorialPage.pptx
+++ b/Resources/TutorialPage.pptx
@@ -263,7 +263,7 @@
           <a:p>
             <a:fld id="{6F3EF30E-7623-4156-990F-A35E60E9F7CF}" type="datetimeFigureOut">
               <a:rPr lang="zh-TW" altLang="en-US" smtClean="0"/>
-              <a:t>2025/5/9</a:t>
+              <a:t>2025/5/10</a:t>
             </a:fld>
             <a:endParaRPr lang="zh-TW" altLang="en-US"/>
           </a:p>
@@ -461,7 +461,7 @@
           <a:p>
             <a:fld id="{6F3EF30E-7623-4156-990F-A35E60E9F7CF}" type="datetimeFigureOut">
               <a:rPr lang="zh-TW" altLang="en-US" smtClean="0"/>
-              <a:t>2025/5/9</a:t>
+              <a:t>2025/5/10</a:t>
             </a:fld>
             <a:endParaRPr lang="zh-TW" altLang="en-US"/>
           </a:p>
@@ -669,7 +669,7 @@
           <a:p>
             <a:fld id="{6F3EF30E-7623-4156-990F-A35E60E9F7CF}" type="datetimeFigureOut">
               <a:rPr lang="zh-TW" altLang="en-US" smtClean="0"/>
-              <a:t>2025/5/9</a:t>
+              <a:t>2025/5/10</a:t>
             </a:fld>
             <a:endParaRPr lang="zh-TW" altLang="en-US"/>
           </a:p>
@@ -867,7 +867,7 @@
           <a:p>
             <a:fld id="{6F3EF30E-7623-4156-990F-A35E60E9F7CF}" type="datetimeFigureOut">
               <a:rPr lang="zh-TW" altLang="en-US" smtClean="0"/>
-              <a:t>2025/5/9</a:t>
+              <a:t>2025/5/10</a:t>
             </a:fld>
             <a:endParaRPr lang="zh-TW" altLang="en-US"/>
           </a:p>
@@ -1142,7 +1142,7 @@
           <a:p>
             <a:fld id="{6F3EF30E-7623-4156-990F-A35E60E9F7CF}" type="datetimeFigureOut">
               <a:rPr lang="zh-TW" altLang="en-US" smtClean="0"/>
-              <a:t>2025/5/9</a:t>
+              <a:t>2025/5/10</a:t>
             </a:fld>
             <a:endParaRPr lang="zh-TW" altLang="en-US"/>
           </a:p>
@@ -1407,7 +1407,7 @@
           <a:p>
             <a:fld id="{6F3EF30E-7623-4156-990F-A35E60E9F7CF}" type="datetimeFigureOut">
               <a:rPr lang="zh-TW" altLang="en-US" smtClean="0"/>
-              <a:t>2025/5/9</a:t>
+              <a:t>2025/5/10</a:t>
             </a:fld>
             <a:endParaRPr lang="zh-TW" altLang="en-US"/>
           </a:p>
@@ -1819,7 +1819,7 @@
           <a:p>
             <a:fld id="{6F3EF30E-7623-4156-990F-A35E60E9F7CF}" type="datetimeFigureOut">
               <a:rPr lang="zh-TW" altLang="en-US" smtClean="0"/>
-              <a:t>2025/5/9</a:t>
+              <a:t>2025/5/10</a:t>
             </a:fld>
             <a:endParaRPr lang="zh-TW" altLang="en-US"/>
           </a:p>
@@ -1960,7 +1960,7 @@
           <a:p>
             <a:fld id="{6F3EF30E-7623-4156-990F-A35E60E9F7CF}" type="datetimeFigureOut">
               <a:rPr lang="zh-TW" altLang="en-US" smtClean="0"/>
-              <a:t>2025/5/9</a:t>
+              <a:t>2025/5/10</a:t>
             </a:fld>
             <a:endParaRPr lang="zh-TW" altLang="en-US"/>
           </a:p>
@@ -2073,7 +2073,7 @@
           <a:p>
             <a:fld id="{6F3EF30E-7623-4156-990F-A35E60E9F7CF}" type="datetimeFigureOut">
               <a:rPr lang="zh-TW" altLang="en-US" smtClean="0"/>
-              <a:t>2025/5/9</a:t>
+              <a:t>2025/5/10</a:t>
             </a:fld>
             <a:endParaRPr lang="zh-TW" altLang="en-US"/>
           </a:p>
@@ -2384,7 +2384,7 @@
           <a:p>
             <a:fld id="{6F3EF30E-7623-4156-990F-A35E60E9F7CF}" type="datetimeFigureOut">
               <a:rPr lang="zh-TW" altLang="en-US" smtClean="0"/>
-              <a:t>2025/5/9</a:t>
+              <a:t>2025/5/10</a:t>
             </a:fld>
             <a:endParaRPr lang="zh-TW" altLang="en-US"/>
           </a:p>
@@ -2672,7 +2672,7 @@
           <a:p>
             <a:fld id="{6F3EF30E-7623-4156-990F-A35E60E9F7CF}" type="datetimeFigureOut">
               <a:rPr lang="zh-TW" altLang="en-US" smtClean="0"/>
-              <a:t>2025/5/9</a:t>
+              <a:t>2025/5/10</a:t>
             </a:fld>
             <a:endParaRPr lang="zh-TW" altLang="en-US"/>
           </a:p>
@@ -2913,7 +2913,7 @@
           <a:p>
             <a:fld id="{6F3EF30E-7623-4156-990F-A35E60E9F7CF}" type="datetimeFigureOut">
               <a:rPr lang="zh-TW" altLang="en-US" smtClean="0"/>
-              <a:t>2025/5/9</a:t>
+              <a:t>2025/5/10</a:t>
             </a:fld>
             <a:endParaRPr lang="zh-TW" altLang="en-US"/>
           </a:p>
@@ -7246,6 +7246,79 @@
           </a:p>
         </p:txBody>
       </p:sp>
+      <p:sp>
+        <p:nvSpPr>
+          <p:cNvPr id="2" name="橢圓 1">
+            <a:extLst>
+              <a:ext uri="{FF2B5EF4-FFF2-40B4-BE49-F238E27FC236}">
+                <a16:creationId xmlns:a16="http://schemas.microsoft.com/office/drawing/2014/main" id="{1D5670A4-55A0-4F3F-B2B3-A51C5CD706F8}"/>
+              </a:ext>
+            </a:extLst>
+          </p:cNvPr>
+          <p:cNvSpPr/>
+          <p:nvPr/>
+        </p:nvSpPr>
+        <p:spPr>
+          <a:xfrm>
+            <a:off x="6589058" y="1479176"/>
+            <a:ext cx="268942" cy="286871"/>
+          </a:xfrm>
+          <a:prstGeom prst="ellipse">
+            <a:avLst/>
+          </a:prstGeom>
+          <a:solidFill>
+            <a:srgbClr val="FF0000"/>
+          </a:solidFill>
+          <a:ln>
+            <a:noFill/>
+          </a:ln>
+          <a:effectLst>
+            <a:glow rad="215900">
+              <a:schemeClr val="accent2">
+                <a:satMod val="175000"/>
+                <a:alpha val="63000"/>
+              </a:schemeClr>
+            </a:glow>
+          </a:effectLst>
+        </p:spPr>
+        <p:style>
+          <a:lnRef idx="2">
+            <a:schemeClr val="accent1">
+              <a:shade val="50000"/>
+            </a:schemeClr>
+          </a:lnRef>
+          <a:fillRef idx="1">
+            <a:schemeClr val="accent1"/>
+          </a:fillRef>
+          <a:effectRef idx="0">
+            <a:schemeClr val="accent1"/>
+          </a:effectRef>
+          <a:fontRef idx="minor">
+            <a:schemeClr val="lt1"/>
+          </a:fontRef>
+        </p:style>
+        <p:txBody>
+          <a:bodyPr rtlCol="0" anchor="ctr"/>
+          <a:lstStyle/>
+          <a:p>
+            <a:pPr algn="ctr"/>
+            <a:endParaRPr lang="zh-TW" altLang="en-US" b="1">
+              <a:ln w="22225">
+                <a:solidFill>
+                  <a:schemeClr val="accent2"/>
+                </a:solidFill>
+                <a:prstDash val="solid"/>
+              </a:ln>
+              <a:solidFill>
+                <a:schemeClr val="accent2">
+                  <a:lumMod val="40000"/>
+                  <a:lumOff val="60000"/>
+                </a:schemeClr>
+              </a:solidFill>
+            </a:endParaRPr>
+          </a:p>
+        </p:txBody>
+      </p:sp>
     </p:spTree>
     <p:extLst>
       <p:ext uri="{BB962C8B-B14F-4D97-AF65-F5344CB8AC3E}">

</xml_diff>

<commit_message>
Edit OOPL_Final.md and add some gaming page
</commit_message>
<xml_diff>
--- a/Resources/TutorialPage.pptx
+++ b/Resources/TutorialPage.pptx
@@ -263,7 +263,7 @@
           <a:p>
             <a:fld id="{6F3EF30E-7623-4156-990F-A35E60E9F7CF}" type="datetimeFigureOut">
               <a:rPr lang="zh-TW" altLang="en-US" smtClean="0"/>
-              <a:t>2025/5/20</a:t>
+              <a:t>2025/6/4</a:t>
             </a:fld>
             <a:endParaRPr lang="zh-TW" altLang="en-US"/>
           </a:p>
@@ -461,7 +461,7 @@
           <a:p>
             <a:fld id="{6F3EF30E-7623-4156-990F-A35E60E9F7CF}" type="datetimeFigureOut">
               <a:rPr lang="zh-TW" altLang="en-US" smtClean="0"/>
-              <a:t>2025/5/20</a:t>
+              <a:t>2025/6/4</a:t>
             </a:fld>
             <a:endParaRPr lang="zh-TW" altLang="en-US"/>
           </a:p>
@@ -669,7 +669,7 @@
           <a:p>
             <a:fld id="{6F3EF30E-7623-4156-990F-A35E60E9F7CF}" type="datetimeFigureOut">
               <a:rPr lang="zh-TW" altLang="en-US" smtClean="0"/>
-              <a:t>2025/5/20</a:t>
+              <a:t>2025/6/4</a:t>
             </a:fld>
             <a:endParaRPr lang="zh-TW" altLang="en-US"/>
           </a:p>
@@ -867,7 +867,7 @@
           <a:p>
             <a:fld id="{6F3EF30E-7623-4156-990F-A35E60E9F7CF}" type="datetimeFigureOut">
               <a:rPr lang="zh-TW" altLang="en-US" smtClean="0"/>
-              <a:t>2025/5/20</a:t>
+              <a:t>2025/6/4</a:t>
             </a:fld>
             <a:endParaRPr lang="zh-TW" altLang="en-US"/>
           </a:p>
@@ -1142,7 +1142,7 @@
           <a:p>
             <a:fld id="{6F3EF30E-7623-4156-990F-A35E60E9F7CF}" type="datetimeFigureOut">
               <a:rPr lang="zh-TW" altLang="en-US" smtClean="0"/>
-              <a:t>2025/5/20</a:t>
+              <a:t>2025/6/4</a:t>
             </a:fld>
             <a:endParaRPr lang="zh-TW" altLang="en-US"/>
           </a:p>
@@ -1407,7 +1407,7 @@
           <a:p>
             <a:fld id="{6F3EF30E-7623-4156-990F-A35E60E9F7CF}" type="datetimeFigureOut">
               <a:rPr lang="zh-TW" altLang="en-US" smtClean="0"/>
-              <a:t>2025/5/20</a:t>
+              <a:t>2025/6/4</a:t>
             </a:fld>
             <a:endParaRPr lang="zh-TW" altLang="en-US"/>
           </a:p>
@@ -1819,7 +1819,7 @@
           <a:p>
             <a:fld id="{6F3EF30E-7623-4156-990F-A35E60E9F7CF}" type="datetimeFigureOut">
               <a:rPr lang="zh-TW" altLang="en-US" smtClean="0"/>
-              <a:t>2025/5/20</a:t>
+              <a:t>2025/6/4</a:t>
             </a:fld>
             <a:endParaRPr lang="zh-TW" altLang="en-US"/>
           </a:p>
@@ -1960,7 +1960,7 @@
           <a:p>
             <a:fld id="{6F3EF30E-7623-4156-990F-A35E60E9F7CF}" type="datetimeFigureOut">
               <a:rPr lang="zh-TW" altLang="en-US" smtClean="0"/>
-              <a:t>2025/5/20</a:t>
+              <a:t>2025/6/4</a:t>
             </a:fld>
             <a:endParaRPr lang="zh-TW" altLang="en-US"/>
           </a:p>
@@ -2073,7 +2073,7 @@
           <a:p>
             <a:fld id="{6F3EF30E-7623-4156-990F-A35E60E9F7CF}" type="datetimeFigureOut">
               <a:rPr lang="zh-TW" altLang="en-US" smtClean="0"/>
-              <a:t>2025/5/20</a:t>
+              <a:t>2025/6/4</a:t>
             </a:fld>
             <a:endParaRPr lang="zh-TW" altLang="en-US"/>
           </a:p>
@@ -2384,7 +2384,7 @@
           <a:p>
             <a:fld id="{6F3EF30E-7623-4156-990F-A35E60E9F7CF}" type="datetimeFigureOut">
               <a:rPr lang="zh-TW" altLang="en-US" smtClean="0"/>
-              <a:t>2025/5/20</a:t>
+              <a:t>2025/6/4</a:t>
             </a:fld>
             <a:endParaRPr lang="zh-TW" altLang="en-US"/>
           </a:p>
@@ -2672,7 +2672,7 @@
           <a:p>
             <a:fld id="{6F3EF30E-7623-4156-990F-A35E60E9F7CF}" type="datetimeFigureOut">
               <a:rPr lang="zh-TW" altLang="en-US" smtClean="0"/>
-              <a:t>2025/5/20</a:t>
+              <a:t>2025/6/4</a:t>
             </a:fld>
             <a:endParaRPr lang="zh-TW" altLang="en-US"/>
           </a:p>
@@ -2913,7 +2913,7 @@
           <a:p>
             <a:fld id="{6F3EF30E-7623-4156-990F-A35E60E9F7CF}" type="datetimeFigureOut">
               <a:rPr lang="zh-TW" altLang="en-US" smtClean="0"/>
-              <a:t>2025/5/20</a:t>
+              <a:t>2025/6/4</a:t>
             </a:fld>
             <a:endParaRPr lang="zh-TW" altLang="en-US"/>
           </a:p>
@@ -3332,742 +3332,709 @@
       </p:grpSpPr>
       <p:grpSp>
         <p:nvGrpSpPr>
-          <p:cNvPr id="25" name="群組 24">
-            <a:extLst>
-              <a:ext uri="{FF2B5EF4-FFF2-40B4-BE49-F238E27FC236}">
-                <a16:creationId xmlns:a16="http://schemas.microsoft.com/office/drawing/2014/main" id="{5AE34032-A9BD-4917-A5EF-ED9497CE46B8}"/>
-              </a:ext>
-            </a:extLst>
-          </p:cNvPr>
+          <p:cNvPr id="4" name="群組 3"/>
           <p:cNvGrpSpPr/>
           <p:nvPr/>
         </p:nvGrpSpPr>
         <p:grpSpPr>
           <a:xfrm>
-            <a:off x="506427" y="134878"/>
-            <a:ext cx="11179145" cy="6723122"/>
-            <a:chOff x="506427" y="67439"/>
-            <a:chExt cx="11179145" cy="6723122"/>
+            <a:off x="0" y="0"/>
+            <a:ext cx="12248092" cy="6724289"/>
+            <a:chOff x="0" y="0"/>
+            <a:chExt cx="12248092" cy="6724289"/>
           </a:xfrm>
         </p:grpSpPr>
-        <p:grpSp>
-          <p:nvGrpSpPr>
-            <p:cNvPr id="20" name="群組 19">
+        <p:pic>
+          <p:nvPicPr>
+            <p:cNvPr id="3" name="圖片 2"/>
+            <p:cNvPicPr>
+              <a:picLocks noChangeAspect="1"/>
+            </p:cNvPicPr>
+            <p:nvPr/>
+          </p:nvPicPr>
+          <p:blipFill>
+            <a:blip r:embed="rId2"/>
+            <a:stretch>
+              <a:fillRect/>
+            </a:stretch>
+          </p:blipFill>
+          <p:spPr>
+            <a:xfrm>
+              <a:off x="0" y="0"/>
+              <a:ext cx="12248092" cy="6724289"/>
+            </a:xfrm>
+            <a:prstGeom prst="rect">
+              <a:avLst/>
+            </a:prstGeom>
+          </p:spPr>
+        </p:pic>
+        <p:sp>
+          <p:nvSpPr>
+            <p:cNvPr id="7" name="箭號: 向右 6">
               <a:extLst>
                 <a:ext uri="{FF2B5EF4-FFF2-40B4-BE49-F238E27FC236}">
-                  <a16:creationId xmlns:a16="http://schemas.microsoft.com/office/drawing/2014/main" id="{DD276C2B-E68E-471C-A3D5-3D5BB3FB7FD1}"/>
+                  <a16:creationId xmlns:a16="http://schemas.microsoft.com/office/drawing/2014/main" id="{15AE5A35-FC5D-4442-A8AA-5CE879322530}"/>
                 </a:ext>
               </a:extLst>
             </p:cNvPr>
-            <p:cNvGrpSpPr/>
+            <p:cNvSpPr/>
             <p:nvPr/>
-          </p:nvGrpSpPr>
-          <p:grpSpPr>
+          </p:nvSpPr>
+          <p:spPr>
+            <a:xfrm rot="10800000">
+              <a:off x="5369784" y="5940457"/>
+              <a:ext cx="754262" cy="455336"/>
+            </a:xfrm>
+            <a:prstGeom prst="rightArrow">
+              <a:avLst/>
+            </a:prstGeom>
+            <a:solidFill>
+              <a:srgbClr val="FF0000"/>
+            </a:solidFill>
+            <a:ln w="19050">
+              <a:solidFill>
+                <a:srgbClr val="C00000"/>
+              </a:solidFill>
+            </a:ln>
+          </p:spPr>
+          <p:style>
+            <a:lnRef idx="2">
+              <a:schemeClr val="accent1">
+                <a:shade val="50000"/>
+              </a:schemeClr>
+            </a:lnRef>
+            <a:fillRef idx="1">
+              <a:schemeClr val="accent1"/>
+            </a:fillRef>
+            <a:effectRef idx="0">
+              <a:schemeClr val="accent1"/>
+            </a:effectRef>
+            <a:fontRef idx="minor">
+              <a:schemeClr val="lt1"/>
+            </a:fontRef>
+          </p:style>
+          <p:txBody>
+            <a:bodyPr rtlCol="0" anchor="ctr"/>
+            <a:lstStyle/>
+            <a:p>
+              <a:pPr algn="ctr"/>
+              <a:endParaRPr lang="zh-TW" altLang="en-US"/>
+            </a:p>
+          </p:txBody>
+        </p:sp>
+        <p:sp>
+          <p:nvSpPr>
+            <p:cNvPr id="8" name="矩形: 圓角 7">
+              <a:extLst>
+                <a:ext uri="{FF2B5EF4-FFF2-40B4-BE49-F238E27FC236}">
+                  <a16:creationId xmlns:a16="http://schemas.microsoft.com/office/drawing/2014/main" id="{5FF69E1B-0B32-4F36-A20F-0ED2900F7ECA}"/>
+                </a:ext>
+              </a:extLst>
+            </p:cNvPr>
+            <p:cNvSpPr/>
+            <p:nvPr/>
+          </p:nvSpPr>
+          <p:spPr>
             <a:xfrm>
-              <a:off x="506427" y="67439"/>
-              <a:ext cx="11179145" cy="6723122"/>
-              <a:chOff x="331537" y="0"/>
-              <a:chExt cx="11179145" cy="6723122"/>
+              <a:off x="1490921" y="5684031"/>
+              <a:ext cx="3489452" cy="887506"/>
             </a:xfrm>
-          </p:grpSpPr>
-          <p:pic>
-            <p:nvPicPr>
-              <p:cNvPr id="14" name="圖片 13">
-                <a:extLst>
-                  <a:ext uri="{FF2B5EF4-FFF2-40B4-BE49-F238E27FC236}">
-                    <a16:creationId xmlns:a16="http://schemas.microsoft.com/office/drawing/2014/main" id="{E842A562-4F23-4DA1-A950-1EFAABCD47CB}"/>
-                  </a:ext>
-                </a:extLst>
-              </p:cNvPr>
-              <p:cNvPicPr>
-                <a:picLocks noChangeAspect="1"/>
-              </p:cNvPicPr>
-              <p:nvPr/>
-            </p:nvPicPr>
-            <p:blipFill>
-              <a:blip r:embed="rId2"/>
-              <a:stretch>
-                <a:fillRect/>
-              </a:stretch>
-            </p:blipFill>
-            <p:spPr>
-              <a:xfrm>
-                <a:off x="331537" y="0"/>
-                <a:ext cx="11179145" cy="6723122"/>
-              </a:xfrm>
-              <a:prstGeom prst="rect">
-                <a:avLst/>
-              </a:prstGeom>
-            </p:spPr>
-          </p:pic>
-          <p:sp>
-            <p:nvSpPr>
-              <p:cNvPr id="7" name="箭號: 向右 6">
-                <a:extLst>
-                  <a:ext uri="{FF2B5EF4-FFF2-40B4-BE49-F238E27FC236}">
-                    <a16:creationId xmlns:a16="http://schemas.microsoft.com/office/drawing/2014/main" id="{15AE5A35-FC5D-4442-A8AA-5CE879322530}"/>
-                  </a:ext>
-                </a:extLst>
-              </p:cNvPr>
-              <p:cNvSpPr/>
-              <p:nvPr/>
-            </p:nvSpPr>
-            <p:spPr>
-              <a:xfrm rot="10800000">
-                <a:off x="4597667" y="5805579"/>
-                <a:ext cx="754262" cy="455336"/>
-              </a:xfrm>
-              <a:prstGeom prst="rightArrow">
-                <a:avLst/>
-              </a:prstGeom>
+            <a:prstGeom prst="roundRect">
+              <a:avLst>
+                <a:gd name="adj" fmla="val 36667"/>
+              </a:avLst>
+            </a:prstGeom>
+            <a:noFill/>
+            <a:ln w="28575">
               <a:solidFill>
                 <a:srgbClr val="FF0000"/>
               </a:solidFill>
-              <a:ln w="19050">
-                <a:solidFill>
-                  <a:srgbClr val="C00000"/>
-                </a:solidFill>
-              </a:ln>
-            </p:spPr>
-            <p:style>
-              <a:lnRef idx="2">
-                <a:schemeClr val="accent1">
-                  <a:shade val="50000"/>
+            </a:ln>
+          </p:spPr>
+          <p:style>
+            <a:lnRef idx="2">
+              <a:schemeClr val="accent1">
+                <a:shade val="50000"/>
+              </a:schemeClr>
+            </a:lnRef>
+            <a:fillRef idx="1">
+              <a:schemeClr val="accent1"/>
+            </a:fillRef>
+            <a:effectRef idx="0">
+              <a:schemeClr val="accent1"/>
+            </a:effectRef>
+            <a:fontRef idx="minor">
+              <a:schemeClr val="lt1"/>
+            </a:fontRef>
+          </p:style>
+          <p:txBody>
+            <a:bodyPr rtlCol="0" anchor="ctr"/>
+            <a:lstStyle/>
+            <a:p>
+              <a:pPr algn="ctr"/>
+              <a:endParaRPr lang="zh-TW" altLang="en-US"/>
+            </a:p>
+          </p:txBody>
+        </p:sp>
+        <p:sp>
+          <p:nvSpPr>
+            <p:cNvPr id="9" name="矩形: 圓角 8">
+              <a:extLst>
+                <a:ext uri="{FF2B5EF4-FFF2-40B4-BE49-F238E27FC236}">
+                  <a16:creationId xmlns:a16="http://schemas.microsoft.com/office/drawing/2014/main" id="{B517B7EA-C13B-4486-8839-D1224F1BA9A6}"/>
+                </a:ext>
+              </a:extLst>
+            </p:cNvPr>
+            <p:cNvSpPr/>
+            <p:nvPr/>
+          </p:nvSpPr>
+          <p:spPr>
+            <a:xfrm>
+              <a:off x="6299199" y="5684031"/>
+              <a:ext cx="3270963" cy="887506"/>
+            </a:xfrm>
+            <a:prstGeom prst="roundRect">
+              <a:avLst>
+                <a:gd name="adj" fmla="val 36667"/>
+              </a:avLst>
+            </a:prstGeom>
+            <a:noFill/>
+            <a:ln w="28575">
+              <a:solidFill>
+                <a:srgbClr val="FF0000"/>
+              </a:solidFill>
+            </a:ln>
+          </p:spPr>
+          <p:style>
+            <a:lnRef idx="2">
+              <a:schemeClr val="accent1">
+                <a:shade val="50000"/>
+              </a:schemeClr>
+            </a:lnRef>
+            <a:fillRef idx="1">
+              <a:schemeClr val="accent1"/>
+            </a:fillRef>
+            <a:effectRef idx="0">
+              <a:schemeClr val="accent1"/>
+            </a:effectRef>
+            <a:fontRef idx="minor">
+              <a:schemeClr val="lt1"/>
+            </a:fontRef>
+          </p:style>
+          <p:txBody>
+            <a:bodyPr rtlCol="0" anchor="ctr"/>
+            <a:lstStyle/>
+            <a:p>
+              <a:pPr algn="ctr"/>
+              <a:r>
+                <a:rPr lang="zh-TW" altLang="en-US" b="1" dirty="0">
+                  <a:latin typeface="標楷體" panose="03000509000000000000" pitchFamily="65" charset="-120"/>
+                  <a:ea typeface="標楷體" panose="03000509000000000000" pitchFamily="65" charset="-120"/>
+                </a:rPr>
+                <a:t>購買處</a:t>
+              </a:r>
+              <a:r>
+                <a:rPr lang="en-US" altLang="zh-TW" b="1" dirty="0">
+                  <a:latin typeface="標楷體" panose="03000509000000000000" pitchFamily="65" charset="-120"/>
+                  <a:ea typeface="標楷體" panose="03000509000000000000" pitchFamily="65" charset="-120"/>
+                </a:rPr>
+                <a:t/>
+              </a:r>
+              <a:br>
+                <a:rPr lang="en-US" altLang="zh-TW" b="1" dirty="0">
+                  <a:latin typeface="標楷體" panose="03000509000000000000" pitchFamily="65" charset="-120"/>
+                  <a:ea typeface="標楷體" panose="03000509000000000000" pitchFamily="65" charset="-120"/>
+                </a:rPr>
+              </a:br>
+              <a:r>
+                <a:rPr lang="zh-TW" altLang="en-US" b="1" dirty="0">
+                  <a:latin typeface="標楷體" panose="03000509000000000000" pitchFamily="65" charset="-120"/>
+                  <a:ea typeface="標楷體" panose="03000509000000000000" pitchFamily="65" charset="-120"/>
+                </a:rPr>
+                <a:t>上方為花費 </a:t>
+              </a:r>
+              <a:endParaRPr lang="en-US" altLang="zh-TW" b="1" dirty="0">
+                <a:latin typeface="標楷體" panose="03000509000000000000" pitchFamily="65" charset="-120"/>
+                <a:ea typeface="標楷體" panose="03000509000000000000" pitchFamily="65" charset="-120"/>
+              </a:endParaRPr>
+            </a:p>
+            <a:p>
+              <a:pPr algn="ctr"/>
+              <a:r>
+                <a:rPr lang="zh-TW" altLang="en-US" b="1" dirty="0">
+                  <a:latin typeface="標楷體" panose="03000509000000000000" pitchFamily="65" charset="-120"/>
+                  <a:ea typeface="標楷體" panose="03000509000000000000" pitchFamily="65" charset="-120"/>
+                </a:rPr>
+                <a:t>下方為守護者 按下即可放置</a:t>
+              </a:r>
+            </a:p>
+          </p:txBody>
+        </p:sp>
+        <p:sp>
+          <p:nvSpPr>
+            <p:cNvPr id="11" name="矩形: 圓角 10">
+              <a:extLst>
+                <a:ext uri="{FF2B5EF4-FFF2-40B4-BE49-F238E27FC236}">
+                  <a16:creationId xmlns:a16="http://schemas.microsoft.com/office/drawing/2014/main" id="{7A236FCC-97B9-455F-A487-2381D170DD2D}"/>
+                </a:ext>
+              </a:extLst>
+            </p:cNvPr>
+            <p:cNvSpPr/>
+            <p:nvPr/>
+          </p:nvSpPr>
+          <p:spPr>
+            <a:xfrm>
+              <a:off x="2719223" y="248252"/>
+              <a:ext cx="1668034" cy="559363"/>
+            </a:xfrm>
+            <a:prstGeom prst="roundRect">
+              <a:avLst>
+                <a:gd name="adj" fmla="val 36667"/>
+              </a:avLst>
+            </a:prstGeom>
+            <a:noFill/>
+            <a:ln w="38100">
+              <a:solidFill>
+                <a:schemeClr val="accent5">
+                  <a:lumMod val="75000"/>
                 </a:schemeClr>
-              </a:lnRef>
-              <a:fillRef idx="1">
+              </a:solidFill>
+            </a:ln>
+          </p:spPr>
+          <p:style>
+            <a:lnRef idx="2">
+              <a:schemeClr val="accent1">
+                <a:shade val="50000"/>
+              </a:schemeClr>
+            </a:lnRef>
+            <a:fillRef idx="1">
+              <a:schemeClr val="accent1"/>
+            </a:fillRef>
+            <a:effectRef idx="0">
+              <a:schemeClr val="accent1"/>
+            </a:effectRef>
+            <a:fontRef idx="minor">
+              <a:schemeClr val="lt1"/>
+            </a:fontRef>
+          </p:style>
+          <p:txBody>
+            <a:bodyPr rtlCol="0" anchor="ctr"/>
+            <a:lstStyle/>
+            <a:p>
+              <a:pPr algn="ctr"/>
+              <a:endParaRPr lang="zh-TW" altLang="en-US"/>
+            </a:p>
+          </p:txBody>
+        </p:sp>
+        <p:sp>
+          <p:nvSpPr>
+            <p:cNvPr id="12" name="矩形: 圓角 11">
+              <a:extLst>
+                <a:ext uri="{FF2B5EF4-FFF2-40B4-BE49-F238E27FC236}">
+                  <a16:creationId xmlns:a16="http://schemas.microsoft.com/office/drawing/2014/main" id="{07881E85-864D-463E-91C9-F9EFE81458EF}"/>
+                </a:ext>
+              </a:extLst>
+            </p:cNvPr>
+            <p:cNvSpPr/>
+            <p:nvPr/>
+          </p:nvSpPr>
+          <p:spPr>
+            <a:xfrm>
+              <a:off x="2827538" y="1075923"/>
+              <a:ext cx="1238340" cy="376393"/>
+            </a:xfrm>
+            <a:prstGeom prst="roundRect">
+              <a:avLst>
+                <a:gd name="adj" fmla="val 36667"/>
+              </a:avLst>
+            </a:prstGeom>
+            <a:noFill/>
+            <a:ln w="28575">
+              <a:solidFill>
                 <a:schemeClr val="accent1"/>
-              </a:fillRef>
-              <a:effectRef idx="0">
-                <a:schemeClr val="accent1"/>
-              </a:effectRef>
-              <a:fontRef idx="minor">
-                <a:schemeClr val="lt1"/>
-              </a:fontRef>
-            </p:style>
-            <p:txBody>
-              <a:bodyPr rtlCol="0" anchor="ctr"/>
-              <a:lstStyle/>
-              <a:p>
-                <a:pPr algn="ctr"/>
-                <a:endParaRPr lang="zh-TW" altLang="en-US"/>
-              </a:p>
-            </p:txBody>
-          </p:sp>
-          <p:sp>
-            <p:nvSpPr>
-              <p:cNvPr id="8" name="矩形: 圓角 7">
-                <a:extLst>
-                  <a:ext uri="{FF2B5EF4-FFF2-40B4-BE49-F238E27FC236}">
-                    <a16:creationId xmlns:a16="http://schemas.microsoft.com/office/drawing/2014/main" id="{5FF69E1B-0B32-4F36-A20F-0ED2900F7ECA}"/>
-                  </a:ext>
-                </a:extLst>
-              </p:cNvPr>
-              <p:cNvSpPr/>
-              <p:nvPr/>
-            </p:nvSpPr>
-            <p:spPr>
-              <a:xfrm>
-                <a:off x="1316031" y="5629835"/>
-                <a:ext cx="2673234" cy="806824"/>
-              </a:xfrm>
-              <a:prstGeom prst="roundRect">
-                <a:avLst>
-                  <a:gd name="adj" fmla="val 36667"/>
-                </a:avLst>
-              </a:prstGeom>
-              <a:noFill/>
-              <a:ln w="28575">
-                <a:solidFill>
-                  <a:srgbClr val="FF0000"/>
-                </a:solidFill>
-              </a:ln>
-            </p:spPr>
-            <p:style>
-              <a:lnRef idx="2">
-                <a:schemeClr val="accent1">
-                  <a:shade val="50000"/>
-                </a:schemeClr>
-              </a:lnRef>
-              <a:fillRef idx="1">
-                <a:schemeClr val="accent1"/>
-              </a:fillRef>
-              <a:effectRef idx="0">
-                <a:schemeClr val="accent1"/>
-              </a:effectRef>
-              <a:fontRef idx="minor">
-                <a:schemeClr val="lt1"/>
-              </a:fontRef>
-            </p:style>
-            <p:txBody>
-              <a:bodyPr rtlCol="0" anchor="ctr"/>
-              <a:lstStyle/>
-              <a:p>
-                <a:pPr algn="ctr"/>
-                <a:endParaRPr lang="zh-TW" altLang="en-US"/>
-              </a:p>
-            </p:txBody>
-          </p:sp>
-          <p:sp>
-            <p:nvSpPr>
-              <p:cNvPr id="9" name="矩形: 圓角 8">
-                <a:extLst>
-                  <a:ext uri="{FF2B5EF4-FFF2-40B4-BE49-F238E27FC236}">
-                    <a16:creationId xmlns:a16="http://schemas.microsoft.com/office/drawing/2014/main" id="{B517B7EA-C13B-4486-8839-D1224F1BA9A6}"/>
-                  </a:ext>
-                </a:extLst>
-              </p:cNvPr>
-              <p:cNvSpPr/>
-              <p:nvPr/>
-            </p:nvSpPr>
-            <p:spPr>
-              <a:xfrm>
-                <a:off x="5604094" y="5589494"/>
-                <a:ext cx="3270963" cy="887506"/>
-              </a:xfrm>
-              <a:prstGeom prst="roundRect">
-                <a:avLst>
-                  <a:gd name="adj" fmla="val 36667"/>
-                </a:avLst>
-              </a:prstGeom>
-              <a:noFill/>
-              <a:ln w="28575">
-                <a:solidFill>
-                  <a:srgbClr val="FF0000"/>
-                </a:solidFill>
-              </a:ln>
-            </p:spPr>
-            <p:style>
-              <a:lnRef idx="2">
-                <a:schemeClr val="accent1">
-                  <a:shade val="50000"/>
-                </a:schemeClr>
-              </a:lnRef>
-              <a:fillRef idx="1">
-                <a:schemeClr val="accent1"/>
-              </a:fillRef>
-              <a:effectRef idx="0">
-                <a:schemeClr val="accent1"/>
-              </a:effectRef>
-              <a:fontRef idx="minor">
-                <a:schemeClr val="lt1"/>
-              </a:fontRef>
-            </p:style>
-            <p:txBody>
-              <a:bodyPr rtlCol="0" anchor="ctr"/>
-              <a:lstStyle/>
-              <a:p>
-                <a:pPr algn="ctr"/>
-                <a:r>
-                  <a:rPr lang="zh-TW" altLang="en-US" b="1" dirty="0">
-                    <a:latin typeface="標楷體" panose="03000509000000000000" pitchFamily="65" charset="-120"/>
-                    <a:ea typeface="標楷體" panose="03000509000000000000" pitchFamily="65" charset="-120"/>
-                  </a:rPr>
-                  <a:t>購買處</a:t>
-                </a:r>
-                <a:r>
-                  <a:rPr lang="en-US" altLang="zh-TW" b="1" dirty="0">
-                    <a:latin typeface="標楷體" panose="03000509000000000000" pitchFamily="65" charset="-120"/>
-                    <a:ea typeface="標楷體" panose="03000509000000000000" pitchFamily="65" charset="-120"/>
-                  </a:rPr>
-                  <a:t/>
-                </a:r>
-                <a:br>
-                  <a:rPr lang="en-US" altLang="zh-TW" b="1" dirty="0">
-                    <a:latin typeface="標楷體" panose="03000509000000000000" pitchFamily="65" charset="-120"/>
-                    <a:ea typeface="標楷體" panose="03000509000000000000" pitchFamily="65" charset="-120"/>
-                  </a:rPr>
-                </a:br>
-                <a:r>
-                  <a:rPr lang="zh-TW" altLang="en-US" b="1" dirty="0">
-                    <a:latin typeface="標楷體" panose="03000509000000000000" pitchFamily="65" charset="-120"/>
-                    <a:ea typeface="標楷體" panose="03000509000000000000" pitchFamily="65" charset="-120"/>
-                  </a:rPr>
-                  <a:t>上方為花費 </a:t>
-                </a:r>
-                <a:endParaRPr lang="en-US" altLang="zh-TW" b="1" dirty="0">
-                  <a:latin typeface="標楷體" panose="03000509000000000000" pitchFamily="65" charset="-120"/>
-                  <a:ea typeface="標楷體" panose="03000509000000000000" pitchFamily="65" charset="-120"/>
-                </a:endParaRPr>
-              </a:p>
-              <a:p>
-                <a:pPr algn="ctr"/>
-                <a:r>
-                  <a:rPr lang="zh-TW" altLang="en-US" b="1" dirty="0">
-                    <a:latin typeface="標楷體" panose="03000509000000000000" pitchFamily="65" charset="-120"/>
-                    <a:ea typeface="標楷體" panose="03000509000000000000" pitchFamily="65" charset="-120"/>
-                  </a:rPr>
-                  <a:t>下方為守護者 按下即可放置</a:t>
-                </a:r>
-              </a:p>
-            </p:txBody>
-          </p:sp>
-          <p:sp>
-            <p:nvSpPr>
-              <p:cNvPr id="11" name="矩形: 圓角 10">
-                <a:extLst>
-                  <a:ext uri="{FF2B5EF4-FFF2-40B4-BE49-F238E27FC236}">
-                    <a16:creationId xmlns:a16="http://schemas.microsoft.com/office/drawing/2014/main" id="{7A236FCC-97B9-455F-A487-2381D170DD2D}"/>
-                  </a:ext>
-                </a:extLst>
-              </p:cNvPr>
-              <p:cNvSpPr/>
-              <p:nvPr/>
-            </p:nvSpPr>
-            <p:spPr>
-              <a:xfrm>
-                <a:off x="2437801" y="229531"/>
-                <a:ext cx="1668034" cy="559363"/>
-              </a:xfrm>
-              <a:prstGeom prst="roundRect">
-                <a:avLst>
-                  <a:gd name="adj" fmla="val 36667"/>
-                </a:avLst>
-              </a:prstGeom>
-              <a:noFill/>
-              <a:ln w="38100">
-                <a:solidFill>
-                  <a:schemeClr val="accent5">
-                    <a:lumMod val="75000"/>
-                  </a:schemeClr>
-                </a:solidFill>
-              </a:ln>
-            </p:spPr>
-            <p:style>
-              <a:lnRef idx="2">
-                <a:schemeClr val="accent1">
-                  <a:shade val="50000"/>
-                </a:schemeClr>
-              </a:lnRef>
-              <a:fillRef idx="1">
-                <a:schemeClr val="accent1"/>
-              </a:fillRef>
-              <a:effectRef idx="0">
-                <a:schemeClr val="accent1"/>
-              </a:effectRef>
-              <a:fontRef idx="minor">
-                <a:schemeClr val="lt1"/>
-              </a:fontRef>
-            </p:style>
-            <p:txBody>
-              <a:bodyPr rtlCol="0" anchor="ctr"/>
-              <a:lstStyle/>
-              <a:p>
-                <a:pPr algn="ctr"/>
-                <a:endParaRPr lang="zh-TW" altLang="en-US"/>
-              </a:p>
-            </p:txBody>
-          </p:sp>
-          <p:sp>
-            <p:nvSpPr>
-              <p:cNvPr id="12" name="矩形: 圓角 11">
-                <a:extLst>
-                  <a:ext uri="{FF2B5EF4-FFF2-40B4-BE49-F238E27FC236}">
-                    <a16:creationId xmlns:a16="http://schemas.microsoft.com/office/drawing/2014/main" id="{07881E85-864D-463E-91C9-F9EFE81458EF}"/>
-                  </a:ext>
-                </a:extLst>
-              </p:cNvPr>
-              <p:cNvSpPr/>
-              <p:nvPr/>
-            </p:nvSpPr>
-            <p:spPr>
-              <a:xfrm>
-                <a:off x="2652648" y="941045"/>
-                <a:ext cx="1238340" cy="376393"/>
-              </a:xfrm>
-              <a:prstGeom prst="roundRect">
-                <a:avLst>
-                  <a:gd name="adj" fmla="val 36667"/>
-                </a:avLst>
-              </a:prstGeom>
-              <a:noFill/>
-              <a:ln w="28575">
-                <a:solidFill>
-                  <a:schemeClr val="accent1"/>
-                </a:solidFill>
-              </a:ln>
-            </p:spPr>
-            <p:style>
-              <a:lnRef idx="2">
-                <a:schemeClr val="accent1">
-                  <a:shade val="50000"/>
-                </a:schemeClr>
-              </a:lnRef>
-              <a:fillRef idx="1">
-                <a:schemeClr val="accent1"/>
-              </a:fillRef>
-              <a:effectRef idx="0">
-                <a:schemeClr val="accent1"/>
-              </a:effectRef>
-              <a:fontRef idx="minor">
-                <a:schemeClr val="lt1"/>
-              </a:fontRef>
-            </p:style>
-            <p:txBody>
-              <a:bodyPr rtlCol="0" anchor="ctr"/>
-              <a:lstStyle/>
-              <a:p>
-                <a:pPr algn="ctr"/>
-                <a:r>
-                  <a:rPr lang="zh-TW" altLang="en-US" b="1" dirty="0">
-                    <a:latin typeface="標楷體" panose="03000509000000000000" pitchFamily="65" charset="-120"/>
-                    <a:ea typeface="標楷體" panose="03000509000000000000" pitchFamily="65" charset="-120"/>
-                  </a:rPr>
-                  <a:t>目前波數</a:t>
-                </a:r>
-              </a:p>
-            </p:txBody>
-          </p:sp>
-          <p:sp>
-            <p:nvSpPr>
-              <p:cNvPr id="15" name="矩形: 圓角 14">
-                <a:extLst>
-                  <a:ext uri="{FF2B5EF4-FFF2-40B4-BE49-F238E27FC236}">
-                    <a16:creationId xmlns:a16="http://schemas.microsoft.com/office/drawing/2014/main" id="{3A722503-9385-4E5D-8632-69E795C74767}"/>
-                  </a:ext>
-                </a:extLst>
-              </p:cNvPr>
-              <p:cNvSpPr/>
-              <p:nvPr/>
-            </p:nvSpPr>
-            <p:spPr>
-              <a:xfrm>
-                <a:off x="4320389" y="134878"/>
-                <a:ext cx="1668034" cy="653767"/>
-              </a:xfrm>
-              <a:prstGeom prst="roundRect">
-                <a:avLst>
-                  <a:gd name="adj" fmla="val 36667"/>
-                </a:avLst>
-              </a:prstGeom>
-              <a:noFill/>
-              <a:ln w="38100">
-                <a:solidFill>
-                  <a:schemeClr val="accent4"/>
-                </a:solidFill>
-              </a:ln>
-            </p:spPr>
-            <p:style>
-              <a:lnRef idx="2">
-                <a:schemeClr val="accent1">
-                  <a:shade val="50000"/>
-                </a:schemeClr>
-              </a:lnRef>
-              <a:fillRef idx="1">
-                <a:schemeClr val="accent1"/>
-              </a:fillRef>
-              <a:effectRef idx="0">
-                <a:schemeClr val="accent1"/>
-              </a:effectRef>
-              <a:fontRef idx="minor">
-                <a:schemeClr val="lt1"/>
-              </a:fontRef>
-            </p:style>
-            <p:txBody>
-              <a:bodyPr rtlCol="0" anchor="ctr"/>
-              <a:lstStyle/>
-              <a:p>
-                <a:pPr algn="ctr"/>
-                <a:endParaRPr lang="zh-TW" altLang="en-US"/>
-              </a:p>
-            </p:txBody>
-          </p:sp>
-          <p:sp>
-            <p:nvSpPr>
-              <p:cNvPr id="16" name="矩形: 圓角 15">
-                <a:extLst>
-                  <a:ext uri="{FF2B5EF4-FFF2-40B4-BE49-F238E27FC236}">
-                    <a16:creationId xmlns:a16="http://schemas.microsoft.com/office/drawing/2014/main" id="{24E4D458-818B-4E2A-AFA2-A10CF550897E}"/>
-                  </a:ext>
-                </a:extLst>
-              </p:cNvPr>
-              <p:cNvSpPr/>
-              <p:nvPr/>
-            </p:nvSpPr>
-            <p:spPr>
-              <a:xfrm>
-                <a:off x="4105835" y="941045"/>
-                <a:ext cx="2018474" cy="1021818"/>
-              </a:xfrm>
-              <a:prstGeom prst="roundRect">
-                <a:avLst>
-                  <a:gd name="adj" fmla="val 36667"/>
-                </a:avLst>
-              </a:prstGeom>
-              <a:noFill/>
-              <a:ln w="28575">
-                <a:solidFill>
-                  <a:schemeClr val="accent4"/>
-                </a:solidFill>
-              </a:ln>
-            </p:spPr>
-            <p:style>
-              <a:lnRef idx="2">
-                <a:schemeClr val="accent1">
-                  <a:shade val="50000"/>
-                </a:schemeClr>
-              </a:lnRef>
-              <a:fillRef idx="1">
-                <a:schemeClr val="accent1"/>
-              </a:fillRef>
-              <a:effectRef idx="0">
-                <a:schemeClr val="accent1"/>
-              </a:effectRef>
-              <a:fontRef idx="minor">
-                <a:schemeClr val="lt1"/>
-              </a:fontRef>
-            </p:style>
-            <p:txBody>
-              <a:bodyPr rtlCol="0" anchor="ctr"/>
-              <a:lstStyle/>
-              <a:p>
-                <a:pPr algn="ctr"/>
-                <a:r>
-                  <a:rPr lang="zh-TW" altLang="en-US" b="1">
-                    <a:latin typeface="標楷體" panose="03000509000000000000" pitchFamily="65" charset="-120"/>
-                    <a:ea typeface="標楷體" panose="03000509000000000000" pitchFamily="65" charset="-120"/>
-                  </a:rPr>
-                  <a:t>目前錢幣</a:t>
-                </a:r>
-                <a:r>
-                  <a:rPr lang="en-US" altLang="zh-TW" b="1">
-                    <a:latin typeface="標楷體" panose="03000509000000000000" pitchFamily="65" charset="-120"/>
-                    <a:ea typeface="標楷體" panose="03000509000000000000" pitchFamily="65" charset="-120"/>
-                  </a:rPr>
-                  <a:t/>
-                </a:r>
-                <a:br>
-                  <a:rPr lang="en-US" altLang="zh-TW" b="1">
-                    <a:latin typeface="標楷體" panose="03000509000000000000" pitchFamily="65" charset="-120"/>
-                    <a:ea typeface="標楷體" panose="03000509000000000000" pitchFamily="65" charset="-120"/>
-                  </a:rPr>
-                </a:br>
-                <a:r>
-                  <a:rPr lang="zh-TW" altLang="en-US" b="1" dirty="0">
-                    <a:latin typeface="標楷體" panose="03000509000000000000" pitchFamily="65" charset="-120"/>
-                    <a:ea typeface="標楷體" panose="03000509000000000000" pitchFamily="65" charset="-120"/>
-                  </a:rPr>
-                  <a:t>初始金額為</a:t>
-                </a:r>
-                <a:r>
-                  <a:rPr lang="en-US" altLang="zh-TW" b="1" dirty="0">
-                    <a:latin typeface="標楷體" panose="03000509000000000000" pitchFamily="65" charset="-120"/>
-                    <a:ea typeface="標楷體" panose="03000509000000000000" pitchFamily="65" charset="-120"/>
-                  </a:rPr>
-                  <a:t>100</a:t>
-                </a:r>
-              </a:p>
-              <a:p>
-                <a:pPr algn="ctr"/>
-                <a:r>
-                  <a:rPr lang="zh-TW" altLang="en-US" b="1" dirty="0">
-                    <a:latin typeface="標楷體" panose="03000509000000000000" pitchFamily="65" charset="-120"/>
-                    <a:ea typeface="標楷體" panose="03000509000000000000" pitchFamily="65" charset="-120"/>
-                  </a:rPr>
-                  <a:t>擊殺怪物 </a:t>
-                </a:r>
-                <a:r>
-                  <a:rPr lang="en-US" altLang="zh-TW" b="1" dirty="0">
-                    <a:latin typeface="標楷體" panose="03000509000000000000" pitchFamily="65" charset="-120"/>
-                    <a:ea typeface="標楷體" panose="03000509000000000000" pitchFamily="65" charset="-120"/>
-                  </a:rPr>
-                  <a:t>+</a:t>
-                </a:r>
-                <a:r>
-                  <a:rPr lang="zh-TW" altLang="en-US" b="1" dirty="0">
-                    <a:latin typeface="標楷體" panose="03000509000000000000" pitchFamily="65" charset="-120"/>
-                    <a:ea typeface="標楷體" panose="03000509000000000000" pitchFamily="65" charset="-120"/>
-                  </a:rPr>
-                  <a:t> </a:t>
-                </a:r>
-                <a:r>
-                  <a:rPr lang="en-US" altLang="zh-TW" b="1" dirty="0">
-                    <a:latin typeface="標楷體" panose="03000509000000000000" pitchFamily="65" charset="-120"/>
-                    <a:ea typeface="標楷體" panose="03000509000000000000" pitchFamily="65" charset="-120"/>
-                  </a:rPr>
-                  <a:t>3</a:t>
-                </a:r>
-                <a:endParaRPr lang="zh-TW" altLang="en-US" b="1" dirty="0">
-                  <a:latin typeface="標楷體" panose="03000509000000000000" pitchFamily="65" charset="-120"/>
-                  <a:ea typeface="標楷體" panose="03000509000000000000" pitchFamily="65" charset="-120"/>
-                </a:endParaRPr>
-              </a:p>
-            </p:txBody>
-          </p:sp>
-          <p:sp>
-            <p:nvSpPr>
-              <p:cNvPr id="17" name="矩形: 圓角 16">
-                <a:extLst>
-                  <a:ext uri="{FF2B5EF4-FFF2-40B4-BE49-F238E27FC236}">
-                    <a16:creationId xmlns:a16="http://schemas.microsoft.com/office/drawing/2014/main" id="{FAEB1E4C-20E4-435A-8DC9-ACE09217BB7E}"/>
-                  </a:ext>
-                </a:extLst>
-              </p:cNvPr>
-              <p:cNvSpPr/>
-              <p:nvPr/>
-            </p:nvSpPr>
-            <p:spPr>
-              <a:xfrm>
-                <a:off x="7207022" y="134629"/>
-                <a:ext cx="3514765" cy="653767"/>
-              </a:xfrm>
-              <a:prstGeom prst="roundRect">
-                <a:avLst>
-                  <a:gd name="adj" fmla="val 36667"/>
-                </a:avLst>
-              </a:prstGeom>
-              <a:noFill/>
-              <a:ln w="38100">
-                <a:solidFill>
-                  <a:schemeClr val="accent2"/>
-                </a:solidFill>
-              </a:ln>
-            </p:spPr>
-            <p:style>
-              <a:lnRef idx="2">
-                <a:schemeClr val="accent1">
-                  <a:shade val="50000"/>
-                </a:schemeClr>
-              </a:lnRef>
-              <a:fillRef idx="1">
-                <a:schemeClr val="accent1"/>
-              </a:fillRef>
-              <a:effectRef idx="0">
-                <a:schemeClr val="accent1"/>
-              </a:effectRef>
-              <a:fontRef idx="minor">
-                <a:schemeClr val="lt1"/>
-              </a:fontRef>
-            </p:style>
-            <p:txBody>
-              <a:bodyPr rtlCol="0" anchor="ctr"/>
-              <a:lstStyle/>
-              <a:p>
-                <a:pPr algn="ctr"/>
-                <a:endParaRPr lang="zh-TW" altLang="en-US"/>
-              </a:p>
-            </p:txBody>
-          </p:sp>
-          <p:sp>
-            <p:nvSpPr>
-              <p:cNvPr id="19" name="矩形: 圓角 18">
-                <a:extLst>
-                  <a:ext uri="{FF2B5EF4-FFF2-40B4-BE49-F238E27FC236}">
-                    <a16:creationId xmlns:a16="http://schemas.microsoft.com/office/drawing/2014/main" id="{0517E921-ACE8-4D19-9B64-09B2B3C17787}"/>
-                  </a:ext>
-                </a:extLst>
-              </p:cNvPr>
-              <p:cNvSpPr/>
-              <p:nvPr/>
-            </p:nvSpPr>
-            <p:spPr>
-              <a:xfrm>
-                <a:off x="6319512" y="923026"/>
-                <a:ext cx="3963003" cy="586996"/>
-              </a:xfrm>
-              <a:prstGeom prst="roundRect">
-                <a:avLst>
-                  <a:gd name="adj" fmla="val 36667"/>
-                </a:avLst>
-              </a:prstGeom>
-              <a:noFill/>
-              <a:ln w="28575">
-                <a:solidFill>
-                  <a:schemeClr val="accent2"/>
-                </a:solidFill>
-              </a:ln>
-            </p:spPr>
-            <p:style>
-              <a:lnRef idx="2">
-                <a:schemeClr val="accent1">
-                  <a:shade val="50000"/>
-                </a:schemeClr>
-              </a:lnRef>
-              <a:fillRef idx="1">
-                <a:schemeClr val="accent1"/>
-              </a:fillRef>
-              <a:effectRef idx="0">
-                <a:schemeClr val="accent1"/>
-              </a:effectRef>
-              <a:fontRef idx="minor">
-                <a:schemeClr val="lt1"/>
-              </a:fontRef>
-            </p:style>
-            <p:txBody>
-              <a:bodyPr rtlCol="0" anchor="ctr"/>
-              <a:lstStyle/>
-              <a:p>
-                <a:pPr algn="ctr"/>
-                <a:r>
-                  <a:rPr lang="zh-TW" altLang="en-US" b="1" dirty="0">
-                    <a:latin typeface="標楷體" panose="03000509000000000000" pitchFamily="65" charset="-120"/>
-                    <a:ea typeface="標楷體" panose="03000509000000000000" pitchFamily="65" charset="-120"/>
-                  </a:rPr>
-                  <a:t>目前血量 低於</a:t>
-                </a:r>
-                <a:r>
-                  <a:rPr lang="en-US" altLang="zh-TW" b="1" dirty="0">
-                    <a:latin typeface="標楷體" panose="03000509000000000000" pitchFamily="65" charset="-120"/>
-                    <a:ea typeface="標楷體" panose="03000509000000000000" pitchFamily="65" charset="-120"/>
-                  </a:rPr>
-                  <a:t>0</a:t>
-                </a:r>
-                <a:r>
-                  <a:rPr lang="zh-TW" altLang="en-US" b="1" dirty="0">
-                    <a:latin typeface="標楷體" panose="03000509000000000000" pitchFamily="65" charset="-120"/>
-                    <a:ea typeface="標楷體" panose="03000509000000000000" pitchFamily="65" charset="-120"/>
-                  </a:rPr>
-                  <a:t>時結束遊戲</a:t>
-                </a:r>
-                <a:r>
-                  <a:rPr lang="en-US" altLang="zh-TW" b="1" dirty="0">
-                    <a:latin typeface="標楷體" panose="03000509000000000000" pitchFamily="65" charset="-120"/>
-                    <a:ea typeface="標楷體" panose="03000509000000000000" pitchFamily="65" charset="-120"/>
-                  </a:rPr>
-                  <a:t/>
-                </a:r>
-                <a:br>
-                  <a:rPr lang="en-US" altLang="zh-TW" b="1" dirty="0">
-                    <a:latin typeface="標楷體" panose="03000509000000000000" pitchFamily="65" charset="-120"/>
-                    <a:ea typeface="標楷體" panose="03000509000000000000" pitchFamily="65" charset="-120"/>
-                  </a:rPr>
-                </a:br>
-                <a:r>
-                  <a:rPr lang="zh-TW" altLang="en-US" b="1" dirty="0">
-                    <a:latin typeface="標楷體" panose="03000509000000000000" pitchFamily="65" charset="-120"/>
-                    <a:ea typeface="標楷體" panose="03000509000000000000" pitchFamily="65" charset="-120"/>
-                  </a:rPr>
-                  <a:t>每隻敵人撞到城堡 血量</a:t>
-                </a:r>
-                <a:r>
-                  <a:rPr lang="en-US" altLang="zh-TW" b="1" dirty="0">
-                    <a:latin typeface="標楷體" panose="03000509000000000000" pitchFamily="65" charset="-120"/>
-                    <a:ea typeface="標楷體" panose="03000509000000000000" pitchFamily="65" charset="-120"/>
-                  </a:rPr>
-                  <a:t>-1</a:t>
-                </a:r>
-                <a:r>
-                  <a:rPr lang="zh-TW" altLang="en-US" b="1" dirty="0">
-                    <a:latin typeface="標楷體" panose="03000509000000000000" pitchFamily="65" charset="-120"/>
-                    <a:ea typeface="標楷體" panose="03000509000000000000" pitchFamily="65" charset="-120"/>
-                  </a:rPr>
-                  <a:t> 金幣</a:t>
-                </a:r>
-                <a:r>
-                  <a:rPr lang="en-US" altLang="zh-TW" b="1" dirty="0">
-                    <a:latin typeface="標楷體" panose="03000509000000000000" pitchFamily="65" charset="-120"/>
-                    <a:ea typeface="標楷體" panose="03000509000000000000" pitchFamily="65" charset="-120"/>
-                  </a:rPr>
-                  <a:t>+3</a:t>
-                </a:r>
-                <a:endParaRPr lang="zh-TW" altLang="en-US" b="1" dirty="0">
-                  <a:latin typeface="標楷體" panose="03000509000000000000" pitchFamily="65" charset="-120"/>
-                  <a:ea typeface="標楷體" panose="03000509000000000000" pitchFamily="65" charset="-120"/>
-                </a:endParaRPr>
-              </a:p>
-            </p:txBody>
-          </p:sp>
-        </p:grpSp>
+              </a:solidFill>
+            </a:ln>
+          </p:spPr>
+          <p:style>
+            <a:lnRef idx="2">
+              <a:schemeClr val="accent1">
+                <a:shade val="50000"/>
+              </a:schemeClr>
+            </a:lnRef>
+            <a:fillRef idx="1">
+              <a:schemeClr val="accent1"/>
+            </a:fillRef>
+            <a:effectRef idx="0">
+              <a:schemeClr val="accent1"/>
+            </a:effectRef>
+            <a:fontRef idx="minor">
+              <a:schemeClr val="lt1"/>
+            </a:fontRef>
+          </p:style>
+          <p:txBody>
+            <a:bodyPr rtlCol="0" anchor="ctr"/>
+            <a:lstStyle/>
+            <a:p>
+              <a:pPr algn="ctr"/>
+              <a:r>
+                <a:rPr lang="zh-TW" altLang="en-US" b="1" dirty="0">
+                  <a:latin typeface="標楷體" panose="03000509000000000000" pitchFamily="65" charset="-120"/>
+                  <a:ea typeface="標楷體" panose="03000509000000000000" pitchFamily="65" charset="-120"/>
+                </a:rPr>
+                <a:t>目前波數</a:t>
+              </a:r>
+            </a:p>
+          </p:txBody>
+        </p:sp>
+        <p:sp>
+          <p:nvSpPr>
+            <p:cNvPr id="15" name="矩形: 圓角 14">
+              <a:extLst>
+                <a:ext uri="{FF2B5EF4-FFF2-40B4-BE49-F238E27FC236}">
+                  <a16:creationId xmlns:a16="http://schemas.microsoft.com/office/drawing/2014/main" id="{3A722503-9385-4E5D-8632-69E795C74767}"/>
+                </a:ext>
+              </a:extLst>
+            </p:cNvPr>
+            <p:cNvSpPr/>
+            <p:nvPr/>
+          </p:nvSpPr>
+          <p:spPr>
+            <a:xfrm>
+              <a:off x="4631165" y="143641"/>
+              <a:ext cx="1668034" cy="653767"/>
+            </a:xfrm>
+            <a:prstGeom prst="roundRect">
+              <a:avLst>
+                <a:gd name="adj" fmla="val 36667"/>
+              </a:avLst>
+            </a:prstGeom>
+            <a:noFill/>
+            <a:ln w="38100">
+              <a:solidFill>
+                <a:schemeClr val="accent4"/>
+              </a:solidFill>
+            </a:ln>
+          </p:spPr>
+          <p:style>
+            <a:lnRef idx="2">
+              <a:schemeClr val="accent1">
+                <a:shade val="50000"/>
+              </a:schemeClr>
+            </a:lnRef>
+            <a:fillRef idx="1">
+              <a:schemeClr val="accent1"/>
+            </a:fillRef>
+            <a:effectRef idx="0">
+              <a:schemeClr val="accent1"/>
+            </a:effectRef>
+            <a:fontRef idx="minor">
+              <a:schemeClr val="lt1"/>
+            </a:fontRef>
+          </p:style>
+          <p:txBody>
+            <a:bodyPr rtlCol="0" anchor="ctr"/>
+            <a:lstStyle/>
+            <a:p>
+              <a:pPr algn="ctr"/>
+              <a:endParaRPr lang="zh-TW" altLang="en-US"/>
+            </a:p>
+          </p:txBody>
+        </p:sp>
+        <p:sp>
+          <p:nvSpPr>
+            <p:cNvPr id="16" name="矩形: 圓角 15">
+              <a:extLst>
+                <a:ext uri="{FF2B5EF4-FFF2-40B4-BE49-F238E27FC236}">
+                  <a16:creationId xmlns:a16="http://schemas.microsoft.com/office/drawing/2014/main" id="{24E4D458-818B-4E2A-AFA2-A10CF550897E}"/>
+                </a:ext>
+              </a:extLst>
+            </p:cNvPr>
+            <p:cNvSpPr/>
+            <p:nvPr/>
+          </p:nvSpPr>
+          <p:spPr>
+            <a:xfrm>
+              <a:off x="4475928" y="922698"/>
+              <a:ext cx="2018474" cy="1021818"/>
+            </a:xfrm>
+            <a:prstGeom prst="roundRect">
+              <a:avLst>
+                <a:gd name="adj" fmla="val 36667"/>
+              </a:avLst>
+            </a:prstGeom>
+            <a:noFill/>
+            <a:ln w="28575">
+              <a:solidFill>
+                <a:schemeClr val="accent4"/>
+              </a:solidFill>
+            </a:ln>
+          </p:spPr>
+          <p:style>
+            <a:lnRef idx="2">
+              <a:schemeClr val="accent1">
+                <a:shade val="50000"/>
+              </a:schemeClr>
+            </a:lnRef>
+            <a:fillRef idx="1">
+              <a:schemeClr val="accent1"/>
+            </a:fillRef>
+            <a:effectRef idx="0">
+              <a:schemeClr val="accent1"/>
+            </a:effectRef>
+            <a:fontRef idx="minor">
+              <a:schemeClr val="lt1"/>
+            </a:fontRef>
+          </p:style>
+          <p:txBody>
+            <a:bodyPr rtlCol="0" anchor="ctr"/>
+            <a:lstStyle/>
+            <a:p>
+              <a:pPr algn="ctr"/>
+              <a:r>
+                <a:rPr lang="zh-TW" altLang="en-US" b="1" dirty="0">
+                  <a:latin typeface="標楷體" panose="03000509000000000000" pitchFamily="65" charset="-120"/>
+                  <a:ea typeface="標楷體" panose="03000509000000000000" pitchFamily="65" charset="-120"/>
+                </a:rPr>
+                <a:t>目前錢幣</a:t>
+              </a:r>
+              <a:r>
+                <a:rPr lang="en-US" altLang="zh-TW" b="1" dirty="0">
+                  <a:latin typeface="標楷體" panose="03000509000000000000" pitchFamily="65" charset="-120"/>
+                  <a:ea typeface="標楷體" panose="03000509000000000000" pitchFamily="65" charset="-120"/>
+                </a:rPr>
+                <a:t/>
+              </a:r>
+              <a:br>
+                <a:rPr lang="en-US" altLang="zh-TW" b="1" dirty="0">
+                  <a:latin typeface="標楷體" panose="03000509000000000000" pitchFamily="65" charset="-120"/>
+                  <a:ea typeface="標楷體" panose="03000509000000000000" pitchFamily="65" charset="-120"/>
+                </a:rPr>
+              </a:br>
+              <a:r>
+                <a:rPr lang="zh-TW" altLang="en-US" b="1" dirty="0">
+                  <a:latin typeface="標楷體" panose="03000509000000000000" pitchFamily="65" charset="-120"/>
+                  <a:ea typeface="標楷體" panose="03000509000000000000" pitchFamily="65" charset="-120"/>
+                </a:rPr>
+                <a:t>初始金額為</a:t>
+              </a:r>
+              <a:r>
+                <a:rPr lang="en-US" altLang="zh-TW" b="1" dirty="0">
+                  <a:latin typeface="標楷體" panose="03000509000000000000" pitchFamily="65" charset="-120"/>
+                  <a:ea typeface="標楷體" panose="03000509000000000000" pitchFamily="65" charset="-120"/>
+                </a:rPr>
+                <a:t>100</a:t>
+              </a:r>
+            </a:p>
+            <a:p>
+              <a:pPr algn="ctr"/>
+              <a:r>
+                <a:rPr lang="zh-TW" altLang="en-US" b="1" dirty="0">
+                  <a:latin typeface="標楷體" panose="03000509000000000000" pitchFamily="65" charset="-120"/>
+                  <a:ea typeface="標楷體" panose="03000509000000000000" pitchFamily="65" charset="-120"/>
+                </a:rPr>
+                <a:t>擊殺怪物 </a:t>
+              </a:r>
+              <a:r>
+                <a:rPr lang="en-US" altLang="zh-TW" b="1" dirty="0">
+                  <a:latin typeface="標楷體" panose="03000509000000000000" pitchFamily="65" charset="-120"/>
+                  <a:ea typeface="標楷體" panose="03000509000000000000" pitchFamily="65" charset="-120"/>
+                </a:rPr>
+                <a:t>+</a:t>
+              </a:r>
+              <a:r>
+                <a:rPr lang="zh-TW" altLang="en-US" b="1" dirty="0">
+                  <a:latin typeface="標楷體" panose="03000509000000000000" pitchFamily="65" charset="-120"/>
+                  <a:ea typeface="標楷體" panose="03000509000000000000" pitchFamily="65" charset="-120"/>
+                </a:rPr>
+                <a:t> </a:t>
+              </a:r>
+              <a:r>
+                <a:rPr lang="en-US" altLang="zh-TW" b="1" dirty="0">
+                  <a:latin typeface="標楷體" panose="03000509000000000000" pitchFamily="65" charset="-120"/>
+                  <a:ea typeface="標楷體" panose="03000509000000000000" pitchFamily="65" charset="-120"/>
+                </a:rPr>
+                <a:t>3</a:t>
+              </a:r>
+              <a:endParaRPr lang="zh-TW" altLang="en-US" b="1" dirty="0">
+                <a:latin typeface="標楷體" panose="03000509000000000000" pitchFamily="65" charset="-120"/>
+                <a:ea typeface="標楷體" panose="03000509000000000000" pitchFamily="65" charset="-120"/>
+              </a:endParaRPr>
+            </a:p>
+          </p:txBody>
+        </p:sp>
+        <p:sp>
+          <p:nvSpPr>
+            <p:cNvPr id="17" name="矩形: 圓角 16">
+              <a:extLst>
+                <a:ext uri="{FF2B5EF4-FFF2-40B4-BE49-F238E27FC236}">
+                  <a16:creationId xmlns:a16="http://schemas.microsoft.com/office/drawing/2014/main" id="{FAEB1E4C-20E4-435A-8DC9-ACE09217BB7E}"/>
+                </a:ext>
+              </a:extLst>
+            </p:cNvPr>
+            <p:cNvSpPr/>
+            <p:nvPr/>
+          </p:nvSpPr>
+          <p:spPr>
+            <a:xfrm>
+              <a:off x="7415599" y="159323"/>
+              <a:ext cx="3514765" cy="653767"/>
+            </a:xfrm>
+            <a:prstGeom prst="roundRect">
+              <a:avLst>
+                <a:gd name="adj" fmla="val 36667"/>
+              </a:avLst>
+            </a:prstGeom>
+            <a:noFill/>
+            <a:ln w="38100">
+              <a:solidFill>
+                <a:schemeClr val="accent2"/>
+              </a:solidFill>
+            </a:ln>
+          </p:spPr>
+          <p:style>
+            <a:lnRef idx="2">
+              <a:schemeClr val="accent1">
+                <a:shade val="50000"/>
+              </a:schemeClr>
+            </a:lnRef>
+            <a:fillRef idx="1">
+              <a:schemeClr val="accent1"/>
+            </a:fillRef>
+            <a:effectRef idx="0">
+              <a:schemeClr val="accent1"/>
+            </a:effectRef>
+            <a:fontRef idx="minor">
+              <a:schemeClr val="lt1"/>
+            </a:fontRef>
+          </p:style>
+          <p:txBody>
+            <a:bodyPr rtlCol="0" anchor="ctr"/>
+            <a:lstStyle/>
+            <a:p>
+              <a:pPr algn="ctr"/>
+              <a:endParaRPr lang="zh-TW" altLang="en-US"/>
+            </a:p>
+          </p:txBody>
+        </p:sp>
+        <p:sp>
+          <p:nvSpPr>
+            <p:cNvPr id="19" name="矩形: 圓角 18">
+              <a:extLst>
+                <a:ext uri="{FF2B5EF4-FFF2-40B4-BE49-F238E27FC236}">
+                  <a16:creationId xmlns:a16="http://schemas.microsoft.com/office/drawing/2014/main" id="{0517E921-ACE8-4D19-9B64-09B2B3C17787}"/>
+                </a:ext>
+              </a:extLst>
+            </p:cNvPr>
+            <p:cNvSpPr/>
+            <p:nvPr/>
+          </p:nvSpPr>
+          <p:spPr>
+            <a:xfrm>
+              <a:off x="6560304" y="938410"/>
+              <a:ext cx="3963003" cy="586996"/>
+            </a:xfrm>
+            <a:prstGeom prst="roundRect">
+              <a:avLst>
+                <a:gd name="adj" fmla="val 36667"/>
+              </a:avLst>
+            </a:prstGeom>
+            <a:noFill/>
+            <a:ln w="28575">
+              <a:solidFill>
+                <a:schemeClr val="accent2"/>
+              </a:solidFill>
+            </a:ln>
+          </p:spPr>
+          <p:style>
+            <a:lnRef idx="2">
+              <a:schemeClr val="accent1">
+                <a:shade val="50000"/>
+              </a:schemeClr>
+            </a:lnRef>
+            <a:fillRef idx="1">
+              <a:schemeClr val="accent1"/>
+            </a:fillRef>
+            <a:effectRef idx="0">
+              <a:schemeClr val="accent1"/>
+            </a:effectRef>
+            <a:fontRef idx="minor">
+              <a:schemeClr val="lt1"/>
+            </a:fontRef>
+          </p:style>
+          <p:txBody>
+            <a:bodyPr rtlCol="0" anchor="ctr"/>
+            <a:lstStyle/>
+            <a:p>
+              <a:pPr algn="ctr"/>
+              <a:r>
+                <a:rPr lang="zh-TW" altLang="en-US" b="1" dirty="0">
+                  <a:latin typeface="標楷體" panose="03000509000000000000" pitchFamily="65" charset="-120"/>
+                  <a:ea typeface="標楷體" panose="03000509000000000000" pitchFamily="65" charset="-120"/>
+                </a:rPr>
+                <a:t>目前血量 低於</a:t>
+              </a:r>
+              <a:r>
+                <a:rPr lang="en-US" altLang="zh-TW" b="1" dirty="0">
+                  <a:latin typeface="標楷體" panose="03000509000000000000" pitchFamily="65" charset="-120"/>
+                  <a:ea typeface="標楷體" panose="03000509000000000000" pitchFamily="65" charset="-120"/>
+                </a:rPr>
+                <a:t>0</a:t>
+              </a:r>
+              <a:r>
+                <a:rPr lang="zh-TW" altLang="en-US" b="1" dirty="0">
+                  <a:latin typeface="標楷體" panose="03000509000000000000" pitchFamily="65" charset="-120"/>
+                  <a:ea typeface="標楷體" panose="03000509000000000000" pitchFamily="65" charset="-120"/>
+                </a:rPr>
+                <a:t>時結束遊戲</a:t>
+              </a:r>
+              <a:r>
+                <a:rPr lang="en-US" altLang="zh-TW" b="1" dirty="0">
+                  <a:latin typeface="標楷體" panose="03000509000000000000" pitchFamily="65" charset="-120"/>
+                  <a:ea typeface="標楷體" panose="03000509000000000000" pitchFamily="65" charset="-120"/>
+                </a:rPr>
+                <a:t/>
+              </a:r>
+              <a:br>
+                <a:rPr lang="en-US" altLang="zh-TW" b="1" dirty="0">
+                  <a:latin typeface="標楷體" panose="03000509000000000000" pitchFamily="65" charset="-120"/>
+                  <a:ea typeface="標楷體" panose="03000509000000000000" pitchFamily="65" charset="-120"/>
+                </a:rPr>
+              </a:br>
+              <a:r>
+                <a:rPr lang="zh-TW" altLang="en-US" b="1" dirty="0">
+                  <a:latin typeface="標楷體" panose="03000509000000000000" pitchFamily="65" charset="-120"/>
+                  <a:ea typeface="標楷體" panose="03000509000000000000" pitchFamily="65" charset="-120"/>
+                </a:rPr>
+                <a:t>每隻敵人撞到城堡 血量</a:t>
+              </a:r>
+              <a:r>
+                <a:rPr lang="en-US" altLang="zh-TW" b="1" dirty="0">
+                  <a:latin typeface="標楷體" panose="03000509000000000000" pitchFamily="65" charset="-120"/>
+                  <a:ea typeface="標楷體" panose="03000509000000000000" pitchFamily="65" charset="-120"/>
+                </a:rPr>
+                <a:t>-1</a:t>
+              </a:r>
+              <a:r>
+                <a:rPr lang="zh-TW" altLang="en-US" b="1" dirty="0">
+                  <a:latin typeface="標楷體" panose="03000509000000000000" pitchFamily="65" charset="-120"/>
+                  <a:ea typeface="標楷體" panose="03000509000000000000" pitchFamily="65" charset="-120"/>
+                </a:rPr>
+                <a:t> 金幣</a:t>
+              </a:r>
+              <a:r>
+                <a:rPr lang="en-US" altLang="zh-TW" b="1" dirty="0">
+                  <a:latin typeface="標楷體" panose="03000509000000000000" pitchFamily="65" charset="-120"/>
+                  <a:ea typeface="標楷體" panose="03000509000000000000" pitchFamily="65" charset="-120"/>
+                </a:rPr>
+                <a:t>+3</a:t>
+              </a:r>
+              <a:endParaRPr lang="zh-TW" altLang="en-US" b="1" dirty="0">
+                <a:latin typeface="標楷體" panose="03000509000000000000" pitchFamily="65" charset="-120"/>
+                <a:ea typeface="標楷體" panose="03000509000000000000" pitchFamily="65" charset="-120"/>
+              </a:endParaRPr>
+            </a:p>
+          </p:txBody>
+        </p:sp>
         <p:sp>
           <p:nvSpPr>
             <p:cNvPr id="21" name="矩形: 圓角 20">
@@ -4082,8 +4049,8 @@
           </p:nvSpPr>
           <p:spPr>
             <a:xfrm>
-              <a:off x="1913444" y="1776146"/>
-              <a:ext cx="699247" cy="559363"/>
+              <a:off x="2077375" y="1753260"/>
+              <a:ext cx="641848" cy="560968"/>
             </a:xfrm>
             <a:prstGeom prst="roundRect">
               <a:avLst>
@@ -4136,7 +4103,7 @@
           </p:nvSpPr>
           <p:spPr>
             <a:xfrm>
-              <a:off x="1178052" y="2480856"/>
+              <a:off x="1178052" y="2548295"/>
               <a:ext cx="2222160" cy="806824"/>
             </a:xfrm>
             <a:prstGeom prst="roundRect">
@@ -4224,8 +4191,8 @@
           </p:nvSpPr>
           <p:spPr>
             <a:xfrm>
-              <a:off x="8959702" y="2703976"/>
-              <a:ext cx="699247" cy="559363"/>
+              <a:off x="9172982" y="2715201"/>
+              <a:ext cx="592456" cy="559363"/>
             </a:xfrm>
             <a:prstGeom prst="roundRect">
               <a:avLst>
@@ -4278,7 +4245,7 @@
           </p:nvSpPr>
           <p:spPr>
             <a:xfrm>
-              <a:off x="8690155" y="3429000"/>
+              <a:off x="8690155" y="3496439"/>
               <a:ext cx="1238340" cy="376393"/>
             </a:xfrm>
             <a:prstGeom prst="roundRect">
@@ -4324,122 +4291,271 @@
             </a:p>
           </p:txBody>
         </p:sp>
-      </p:grpSp>
-      <p:sp>
-        <p:nvSpPr>
-          <p:cNvPr id="26" name="箭號: 向下 25">
-            <a:extLst>
-              <a:ext uri="{FF2B5EF4-FFF2-40B4-BE49-F238E27FC236}">
-                <a16:creationId xmlns:a16="http://schemas.microsoft.com/office/drawing/2014/main" id="{34CDF5F7-FF97-407B-B44C-6C6B80E235D7}"/>
-              </a:ext>
-            </a:extLst>
-          </p:cNvPr>
-          <p:cNvSpPr/>
-          <p:nvPr/>
-        </p:nvSpPr>
-        <p:spPr>
-          <a:xfrm rot="16200000">
-            <a:off x="7869113" y="1927836"/>
-            <a:ext cx="263358" cy="950223"/>
-          </a:xfrm>
-          <a:prstGeom prst="downArrow">
-            <a:avLst/>
-          </a:prstGeom>
-          <a:solidFill>
-            <a:schemeClr val="accent1">
-              <a:lumMod val="60000"/>
-              <a:lumOff val="40000"/>
-            </a:schemeClr>
-          </a:solidFill>
-        </p:spPr>
-        <p:style>
-          <a:lnRef idx="2">
-            <a:schemeClr val="accent1">
-              <a:shade val="50000"/>
-            </a:schemeClr>
-          </a:lnRef>
-          <a:fillRef idx="1">
-            <a:schemeClr val="accent1"/>
-          </a:fillRef>
-          <a:effectRef idx="0">
-            <a:schemeClr val="accent1"/>
-          </a:effectRef>
-          <a:fontRef idx="minor">
-            <a:schemeClr val="lt1"/>
-          </a:fontRef>
-        </p:style>
-        <p:txBody>
-          <a:bodyPr rtlCol="0" anchor="ctr"/>
-          <a:lstStyle/>
-          <a:p>
-            <a:pPr algn="ctr"/>
-            <a:endParaRPr lang="zh-TW" altLang="en-US"/>
-          </a:p>
-        </p:txBody>
-      </p:sp>
-      <p:sp>
-        <p:nvSpPr>
-          <p:cNvPr id="27" name="矩形: 圓角 26">
-            <a:extLst>
-              <a:ext uri="{FF2B5EF4-FFF2-40B4-BE49-F238E27FC236}">
-                <a16:creationId xmlns:a16="http://schemas.microsoft.com/office/drawing/2014/main" id="{9293AA11-0D41-455B-B437-D79886BF26A5}"/>
-              </a:ext>
-            </a:extLst>
-          </p:cNvPr>
-          <p:cNvSpPr/>
-          <p:nvPr/>
-        </p:nvSpPr>
-        <p:spPr>
-          <a:xfrm>
-            <a:off x="5303520" y="2201930"/>
-            <a:ext cx="2222159" cy="384016"/>
-          </a:xfrm>
-          <a:prstGeom prst="roundRect">
-            <a:avLst>
-              <a:gd name="adj" fmla="val 36667"/>
-            </a:avLst>
-          </a:prstGeom>
-          <a:noFill/>
-          <a:ln w="28575">
+        <p:sp>
+          <p:nvSpPr>
+            <p:cNvPr id="26" name="箭號: 向下 25">
+              <a:extLst>
+                <a:ext uri="{FF2B5EF4-FFF2-40B4-BE49-F238E27FC236}">
+                  <a16:creationId xmlns:a16="http://schemas.microsoft.com/office/drawing/2014/main" id="{34CDF5F7-FF97-407B-B44C-6C6B80E235D7}"/>
+                </a:ext>
+              </a:extLst>
+            </p:cNvPr>
+            <p:cNvSpPr/>
+            <p:nvPr/>
+          </p:nvSpPr>
+          <p:spPr>
+            <a:xfrm rot="15472266">
+              <a:off x="7958124" y="2318425"/>
+              <a:ext cx="346365" cy="1164473"/>
+            </a:xfrm>
+            <a:prstGeom prst="downArrow">
+              <a:avLst/>
+            </a:prstGeom>
             <a:solidFill>
               <a:schemeClr val="accent1">
                 <a:lumMod val="60000"/>
                 <a:lumOff val="40000"/>
               </a:schemeClr>
             </a:solidFill>
-          </a:ln>
-        </p:spPr>
-        <p:style>
-          <a:lnRef idx="2">
-            <a:schemeClr val="accent1">
-              <a:shade val="50000"/>
-            </a:schemeClr>
-          </a:lnRef>
-          <a:fillRef idx="1">
-            <a:schemeClr val="accent1"/>
-          </a:fillRef>
-          <a:effectRef idx="0">
-            <a:schemeClr val="accent1"/>
-          </a:effectRef>
-          <a:fontRef idx="minor">
-            <a:schemeClr val="lt1"/>
-          </a:fontRef>
-        </p:style>
-        <p:txBody>
-          <a:bodyPr rtlCol="0" anchor="ctr"/>
-          <a:lstStyle/>
-          <a:p>
-            <a:pPr algn="ctr"/>
-            <a:r>
-              <a:rPr lang="zh-TW" altLang="en-US" b="1" dirty="0">
+          </p:spPr>
+          <p:style>
+            <a:lnRef idx="2">
+              <a:schemeClr val="accent1">
+                <a:shade val="50000"/>
+              </a:schemeClr>
+            </a:lnRef>
+            <a:fillRef idx="1">
+              <a:schemeClr val="accent1"/>
+            </a:fillRef>
+            <a:effectRef idx="0">
+              <a:schemeClr val="accent1"/>
+            </a:effectRef>
+            <a:fontRef idx="minor">
+              <a:schemeClr val="lt1"/>
+            </a:fontRef>
+          </p:style>
+          <p:txBody>
+            <a:bodyPr rtlCol="0" anchor="ctr"/>
+            <a:lstStyle/>
+            <a:p>
+              <a:pPr algn="ctr"/>
+              <a:endParaRPr lang="zh-TW" altLang="en-US"/>
+            </a:p>
+          </p:txBody>
+        </p:sp>
+        <p:sp>
+          <p:nvSpPr>
+            <p:cNvPr id="27" name="矩形: 圓角 26">
+              <a:extLst>
+                <a:ext uri="{FF2B5EF4-FFF2-40B4-BE49-F238E27FC236}">
+                  <a16:creationId xmlns:a16="http://schemas.microsoft.com/office/drawing/2014/main" id="{9293AA11-0D41-455B-B437-D79886BF26A5}"/>
+                </a:ext>
+              </a:extLst>
+            </p:cNvPr>
+            <p:cNvSpPr/>
+            <p:nvPr/>
+          </p:nvSpPr>
+          <p:spPr>
+            <a:xfrm>
+              <a:off x="5193440" y="2820825"/>
+              <a:ext cx="2222159" cy="384016"/>
+            </a:xfrm>
+            <a:prstGeom prst="roundRect">
+              <a:avLst>
+                <a:gd name="adj" fmla="val 36667"/>
+              </a:avLst>
+            </a:prstGeom>
+            <a:noFill/>
+            <a:ln w="28575">
+              <a:solidFill>
+                <a:schemeClr val="accent1">
+                  <a:lumMod val="60000"/>
+                  <a:lumOff val="40000"/>
+                </a:schemeClr>
+              </a:solidFill>
+            </a:ln>
+          </p:spPr>
+          <p:style>
+            <a:lnRef idx="2">
+              <a:schemeClr val="accent1">
+                <a:shade val="50000"/>
+              </a:schemeClr>
+            </a:lnRef>
+            <a:fillRef idx="1">
+              <a:schemeClr val="accent1"/>
+            </a:fillRef>
+            <a:effectRef idx="0">
+              <a:schemeClr val="accent1"/>
+            </a:effectRef>
+            <a:fontRef idx="minor">
+              <a:schemeClr val="lt1"/>
+            </a:fontRef>
+          </p:style>
+          <p:txBody>
+            <a:bodyPr rtlCol="0" anchor="ctr"/>
+            <a:lstStyle/>
+            <a:p>
+              <a:pPr algn="ctr"/>
+              <a:r>
+                <a:rPr lang="zh-TW" altLang="en-US" b="1" dirty="0">
+                  <a:latin typeface="標楷體" panose="03000509000000000000" pitchFamily="65" charset="-120"/>
+                  <a:ea typeface="標楷體" panose="03000509000000000000" pitchFamily="65" charset="-120"/>
+                </a:rPr>
+                <a:t>守護者攻擊冷卻條</a:t>
+              </a:r>
+            </a:p>
+          </p:txBody>
+        </p:sp>
+        <p:sp>
+          <p:nvSpPr>
+            <p:cNvPr id="28" name="矩形: 圓角 16">
+              <a:extLst>
+                <a:ext uri="{FF2B5EF4-FFF2-40B4-BE49-F238E27FC236}">
+                  <a16:creationId xmlns:a16="http://schemas.microsoft.com/office/drawing/2014/main" id="{FAEB1E4C-20E4-435A-8DC9-ACE09217BB7E}"/>
+                </a:ext>
+              </a:extLst>
+            </p:cNvPr>
+            <p:cNvSpPr/>
+            <p:nvPr/>
+          </p:nvSpPr>
+          <p:spPr>
+            <a:xfrm>
+              <a:off x="10821354" y="677826"/>
+              <a:ext cx="906048" cy="774490"/>
+            </a:xfrm>
+            <a:prstGeom prst="roundRect">
+              <a:avLst>
+                <a:gd name="adj" fmla="val 36667"/>
+              </a:avLst>
+            </a:prstGeom>
+            <a:noFill/>
+            <a:ln w="38100">
+              <a:solidFill>
+                <a:srgbClr val="00B0F0"/>
+              </a:solidFill>
+            </a:ln>
+          </p:spPr>
+          <p:style>
+            <a:lnRef idx="2">
+              <a:schemeClr val="accent1">
+                <a:shade val="50000"/>
+              </a:schemeClr>
+            </a:lnRef>
+            <a:fillRef idx="1">
+              <a:schemeClr val="accent1"/>
+            </a:fillRef>
+            <a:effectRef idx="0">
+              <a:schemeClr val="accent1"/>
+            </a:effectRef>
+            <a:fontRef idx="minor">
+              <a:schemeClr val="lt1"/>
+            </a:fontRef>
+          </p:style>
+          <p:txBody>
+            <a:bodyPr rtlCol="0" anchor="ctr"/>
+            <a:lstStyle/>
+            <a:p>
+              <a:pPr algn="ctr"/>
+              <a:endParaRPr lang="zh-TW" altLang="en-US"/>
+            </a:p>
+          </p:txBody>
+        </p:sp>
+        <p:sp>
+          <p:nvSpPr>
+            <p:cNvPr id="29" name="矩形: 圓角 18">
+              <a:extLst>
+                <a:ext uri="{FF2B5EF4-FFF2-40B4-BE49-F238E27FC236}">
+                  <a16:creationId xmlns:a16="http://schemas.microsoft.com/office/drawing/2014/main" id="{0517E921-ACE8-4D19-9B64-09B2B3C17787}"/>
+                </a:ext>
+              </a:extLst>
+            </p:cNvPr>
+            <p:cNvSpPr/>
+            <p:nvPr/>
+          </p:nvSpPr>
+          <p:spPr>
+            <a:xfrm>
+              <a:off x="10363651" y="1627860"/>
+              <a:ext cx="1821453" cy="963701"/>
+            </a:xfrm>
+            <a:prstGeom prst="roundRect">
+              <a:avLst>
+                <a:gd name="adj" fmla="val 36667"/>
+              </a:avLst>
+            </a:prstGeom>
+            <a:noFill/>
+            <a:ln w="28575">
+              <a:solidFill>
+                <a:srgbClr val="00B0F0"/>
+              </a:solidFill>
+            </a:ln>
+          </p:spPr>
+          <p:style>
+            <a:lnRef idx="2">
+              <a:schemeClr val="accent1">
+                <a:shade val="50000"/>
+              </a:schemeClr>
+            </a:lnRef>
+            <a:fillRef idx="1">
+              <a:schemeClr val="accent1"/>
+            </a:fillRef>
+            <a:effectRef idx="0">
+              <a:schemeClr val="accent1"/>
+            </a:effectRef>
+            <a:fontRef idx="minor">
+              <a:schemeClr val="lt1"/>
+            </a:fontRef>
+          </p:style>
+          <p:txBody>
+            <a:bodyPr rtlCol="0" anchor="ctr"/>
+            <a:lstStyle/>
+            <a:p>
+              <a:pPr algn="ctr"/>
+              <a:r>
+                <a:rPr lang="zh-TW" altLang="en-US" b="1" dirty="0" smtClean="0">
+                  <a:latin typeface="標楷體" panose="03000509000000000000" pitchFamily="65" charset="-120"/>
+                  <a:ea typeface="標楷體" panose="03000509000000000000" pitchFamily="65" charset="-120"/>
+                </a:rPr>
+                <a:t>可以點擊時鐘切換時間速度</a:t>
+              </a:r>
+              <a:endParaRPr lang="en-US" altLang="zh-TW" b="1" dirty="0" smtClean="0">
                 <a:latin typeface="標楷體" panose="03000509000000000000" pitchFamily="65" charset="-120"/>
                 <a:ea typeface="標楷體" panose="03000509000000000000" pitchFamily="65" charset="-120"/>
-              </a:rPr>
-              <a:t>守護者攻擊冷卻條</a:t>
-            </a:r>
-          </a:p>
-        </p:txBody>
-      </p:sp>
+              </a:endParaRPr>
+            </a:p>
+            <a:p>
+              <a:pPr algn="ctr"/>
+              <a:r>
+                <a:rPr lang="en-US" altLang="zh-TW" b="1" dirty="0" smtClean="0">
+                  <a:latin typeface="標楷體" panose="03000509000000000000" pitchFamily="65" charset="-120"/>
+                  <a:ea typeface="標楷體" panose="03000509000000000000" pitchFamily="65" charset="-120"/>
+                </a:rPr>
+                <a:t>X1 </a:t>
+              </a:r>
+              <a:r>
+                <a:rPr lang="zh-TW" altLang="en-US" b="1" dirty="0" smtClean="0">
+                  <a:latin typeface="標楷體" panose="03000509000000000000" pitchFamily="65" charset="-120"/>
+                  <a:ea typeface="標楷體" panose="03000509000000000000" pitchFamily="65" charset="-120"/>
+                </a:rPr>
+                <a:t>、 </a:t>
+              </a:r>
+              <a:r>
+                <a:rPr lang="en-US" altLang="zh-TW" b="1" dirty="0">
+                  <a:latin typeface="標楷體" panose="03000509000000000000" pitchFamily="65" charset="-120"/>
+                  <a:ea typeface="標楷體" panose="03000509000000000000" pitchFamily="65" charset="-120"/>
+                </a:rPr>
+                <a:t>X</a:t>
+              </a:r>
+              <a:r>
+                <a:rPr lang="en-US" altLang="zh-TW" b="1" dirty="0" smtClean="0">
+                  <a:latin typeface="標楷體" panose="03000509000000000000" pitchFamily="65" charset="-120"/>
+                  <a:ea typeface="標楷體" panose="03000509000000000000" pitchFamily="65" charset="-120"/>
+                </a:rPr>
+                <a:t>2</a:t>
+              </a:r>
+            </a:p>
+          </p:txBody>
+        </p:sp>
+      </p:grpSp>
     </p:spTree>
     <p:extLst>
       <p:ext uri="{BB962C8B-B14F-4D97-AF65-F5344CB8AC3E}">

</xml_diff>